<commit_message>
Atualizado Art 15 16 17
</commit_message>
<xml_diff>
--- a/15 - Arquitetura de Negócio para cada Cenário.pptx
+++ b/15 - Arquitetura de Negócio para cada Cenário.pptx
@@ -875,6 +875,22 @@
               <a:buNone/>
             </a:pPr>
             <a:r>
+              <a:rPr lang="pt-BR"/>
+              <a:t>correto</a:t>
+            </a:r>
+            <a:endParaRPr/>
+          </a:p>
+          <a:p>
+            <a:pPr indent="0" lvl="0" marL="0" rtl="0" algn="l">
+              <a:spcBef>
+                <a:spcPts val="0"/>
+              </a:spcBef>
+              <a:spcAft>
+                <a:spcPts val="0"/>
+              </a:spcAft>
+              <a:buNone/>
+            </a:pPr>
+            <a:r>
               <a:t/>
             </a:r>
             <a:endParaRPr/>
@@ -908,7 +924,7 @@
       </p:grpSpPr>
       <p:sp>
         <p:nvSpPr>
-          <p:cNvPr id="85" name="Google Shape;85;g7007d08d72_0_36:notes"/>
+          <p:cNvPr id="85" name="Google Shape;85;g7f77872d79_9_0:notes"/>
           <p:cNvSpPr/>
           <p:nvPr>
             <p:ph idx="2" type="sldImg"/>
@@ -943,7 +959,7 @@
       </p:sp>
       <p:sp>
         <p:nvSpPr>
-          <p:cNvPr id="86" name="Google Shape;86;g7007d08d72_0_36:notes"/>
+          <p:cNvPr id="86" name="Google Shape;86;g7f77872d79_9_0:notes"/>
           <p:cNvSpPr txBox="1"/>
           <p:nvPr>
             <p:ph idx="1" type="body"/>
@@ -993,7 +1009,7 @@
   <p:cSld>
     <p:spTree>
       <p:nvGrpSpPr>
-        <p:cNvPr id="109" name="Shape 109"/>
+        <p:cNvPr id="108" name="Shape 108"/>
         <p:cNvGrpSpPr/>
         <p:nvPr/>
       </p:nvGrpSpPr>
@@ -1007,7 +1023,7 @@
       </p:grpSpPr>
       <p:sp>
         <p:nvSpPr>
-          <p:cNvPr id="110" name="Google Shape;110;g7f77872d79_0_0:notes"/>
+          <p:cNvPr id="109" name="Google Shape;109;g7007d08d72_0_36:notes"/>
           <p:cNvSpPr/>
           <p:nvPr>
             <p:ph idx="2" type="sldImg"/>
@@ -1042,7 +1058,7 @@
       </p:sp>
       <p:sp>
         <p:nvSpPr>
-          <p:cNvPr id="111" name="Google Shape;111;g7f77872d79_0_0:notes"/>
+          <p:cNvPr id="110" name="Google Shape;110;g7007d08d72_0_36:notes"/>
           <p:cNvSpPr txBox="1"/>
           <p:nvPr>
             <p:ph idx="1" type="body"/>
@@ -1073,6 +1089,22 @@
               <a:buNone/>
             </a:pPr>
             <a:r>
+              <a:rPr lang="pt-BR"/>
+              <a:t>certo</a:t>
+            </a:r>
+            <a:endParaRPr/>
+          </a:p>
+          <a:p>
+            <a:pPr indent="0" lvl="0" marL="0" rtl="0" algn="l">
+              <a:spcBef>
+                <a:spcPts val="0"/>
+              </a:spcBef>
+              <a:spcAft>
+                <a:spcPts val="0"/>
+              </a:spcAft>
+              <a:buNone/>
+            </a:pPr>
+            <a:r>
               <a:t/>
             </a:r>
             <a:endParaRPr/>
@@ -1092,7 +1124,7 @@
   <p:cSld>
     <p:spTree>
       <p:nvGrpSpPr>
-        <p:cNvPr id="129" name="Shape 129"/>
+        <p:cNvPr id="128" name="Shape 128"/>
         <p:cNvGrpSpPr/>
         <p:nvPr/>
       </p:nvGrpSpPr>
@@ -1106,7 +1138,7 @@
       </p:grpSpPr>
       <p:sp>
         <p:nvSpPr>
-          <p:cNvPr id="130" name="Google Shape;130;g7007d08d72_2_0:notes"/>
+          <p:cNvPr id="129" name="Google Shape;129;g7f77872d79_10_0:notes"/>
           <p:cNvSpPr/>
           <p:nvPr>
             <p:ph idx="2" type="sldImg"/>
@@ -1141,7 +1173,7 @@
       </p:sp>
       <p:sp>
         <p:nvSpPr>
-          <p:cNvPr id="131" name="Google Shape;131;g7007d08d72_2_0:notes"/>
+          <p:cNvPr id="130" name="Google Shape;130;g7f77872d79_10_0:notes"/>
           <p:cNvSpPr txBox="1"/>
           <p:nvPr>
             <p:ph idx="1" type="body"/>
@@ -1172,6 +1204,22 @@
               <a:buNone/>
             </a:pPr>
             <a:r>
+              <a:rPr lang="pt-BR"/>
+              <a:t>ta ok</a:t>
+            </a:r>
+            <a:endParaRPr/>
+          </a:p>
+          <a:p>
+            <a:pPr indent="0" lvl="0" marL="0" rtl="0" algn="l">
+              <a:spcBef>
+                <a:spcPts val="0"/>
+              </a:spcBef>
+              <a:spcAft>
+                <a:spcPts val="0"/>
+              </a:spcAft>
+              <a:buNone/>
+            </a:pPr>
+            <a:r>
               <a:t/>
             </a:r>
             <a:endParaRPr/>
@@ -1191,7 +1239,7 @@
   <p:cSld>
     <p:spTree>
       <p:nvGrpSpPr>
-        <p:cNvPr id="159" name="Shape 159"/>
+        <p:cNvPr id="152" name="Shape 152"/>
         <p:cNvGrpSpPr/>
         <p:nvPr/>
       </p:nvGrpSpPr>
@@ -1205,7 +1253,7 @@
       </p:grpSpPr>
       <p:sp>
         <p:nvSpPr>
-          <p:cNvPr id="160" name="Google Shape;160;g7007d08d72_2_31:notes"/>
+          <p:cNvPr id="153" name="Google Shape;153;g7007d08d72_2_0:notes"/>
           <p:cNvSpPr/>
           <p:nvPr>
             <p:ph idx="2" type="sldImg"/>
@@ -1240,7 +1288,7 @@
       </p:sp>
       <p:sp>
         <p:nvSpPr>
-          <p:cNvPr id="161" name="Google Shape;161;g7007d08d72_2_31:notes"/>
+          <p:cNvPr id="154" name="Google Shape;154;g7007d08d72_2_0:notes"/>
           <p:cNvSpPr txBox="1"/>
           <p:nvPr>
             <p:ph idx="1" type="body"/>
@@ -6218,7 +6266,7 @@
         </p:nvGrpSpPr>
         <p:grpSpPr>
           <a:xfrm>
-            <a:off x="136938" y="1139320"/>
+            <a:off x="408917" y="2328082"/>
             <a:ext cx="635031" cy="1430885"/>
             <a:chOff x="947328" y="1157275"/>
             <a:chExt cx="733800" cy="1682800"/>
@@ -6414,7 +6462,7 @@
         </p:nvGrpSpPr>
         <p:grpSpPr>
           <a:xfrm>
-            <a:off x="136938" y="3395379"/>
+            <a:off x="6137088" y="2328079"/>
             <a:ext cx="635031" cy="1430885"/>
             <a:chOff x="947328" y="1157275"/>
             <a:chExt cx="733800" cy="1682800"/>
@@ -6610,7 +6658,7 @@
         </p:nvSpPr>
         <p:spPr>
           <a:xfrm>
-            <a:off x="3394800" y="2594225"/>
+            <a:off x="3598200" y="3797875"/>
             <a:ext cx="1947600" cy="757800"/>
           </a:xfrm>
           <a:prstGeom prst="roundRect">
@@ -6648,7 +6696,7 @@
             </a:pPr>
             <a:r>
               <a:rPr lang="pt-BR"/>
-              <a:t>Operação dos Voluntários para uma Peruíbe Melhor</a:t>
+              <a:t>Peruíbe Melhor</a:t>
             </a:r>
             <a:endParaRPr/>
           </a:p>
@@ -6658,15 +6706,14 @@
         <p:nvCxnSpPr>
           <p:cNvPr id="76" name="Google Shape;76;p14"/>
           <p:cNvCxnSpPr>
-            <a:stCxn id="77" idx="3"/>
-            <a:endCxn id="75" idx="2"/>
+            <a:endCxn id="75" idx="0"/>
           </p:cNvCxnSpPr>
           <p:nvPr/>
         </p:nvCxnSpPr>
         <p:spPr>
-          <a:xfrm flipH="1" rot="10800000">
-            <a:off x="3010275" y="3352125"/>
-            <a:ext cx="1358400" cy="859500"/>
+          <a:xfrm flipH="1">
+            <a:off x="4572000" y="3090175"/>
+            <a:ext cx="1319100" cy="707700"/>
           </a:xfrm>
           <a:prstGeom prst="curvedConnector2">
             <a:avLst/>
@@ -6685,17 +6732,17 @@
       </p:cxnSp>
       <p:cxnSp>
         <p:nvCxnSpPr>
-          <p:cNvPr id="78" name="Google Shape;78;p14"/>
+          <p:cNvPr id="77" name="Google Shape;77;p14"/>
           <p:cNvCxnSpPr>
-            <a:stCxn id="79" idx="3"/>
+            <a:stCxn id="78" idx="3"/>
             <a:endCxn id="75" idx="0"/>
           </p:cNvCxnSpPr>
           <p:nvPr/>
         </p:nvCxnSpPr>
         <p:spPr>
           <a:xfrm>
-            <a:off x="3224550" y="1994375"/>
-            <a:ext cx="1144200" cy="600000"/>
+            <a:off x="3485250" y="3043513"/>
+            <a:ext cx="1086900" cy="754500"/>
           </a:xfrm>
           <a:prstGeom prst="curvedConnector2">
             <a:avLst/>
@@ -6714,13 +6761,13 @@
       </p:cxnSp>
       <p:sp>
         <p:nvSpPr>
-          <p:cNvPr id="79" name="Google Shape;79;p14"/>
+          <p:cNvPr id="78" name="Google Shape;78;p14"/>
           <p:cNvSpPr txBox="1"/>
           <p:nvPr/>
         </p:nvSpPr>
         <p:spPr>
           <a:xfrm>
-            <a:off x="628650" y="1615475"/>
+            <a:off x="889350" y="2664613"/>
             <a:ext cx="2595900" cy="757800"/>
           </a:xfrm>
           <a:prstGeom prst="rect">
@@ -6749,24 +6796,11 @@
             </a:pPr>
             <a:r>
               <a:rPr lang="pt-BR" sz="1000"/>
-              <a:t>Fornecer um assunto para estudo</a:t>
+              <a:t>Requisitar </a:t>
             </a:r>
-            <a:endParaRPr sz="1000"/>
-          </a:p>
-          <a:p>
-            <a:pPr indent="-292100" lvl="0" marL="457200" rtl="0" algn="l">
-              <a:spcBef>
-                <a:spcPts val="0"/>
-              </a:spcBef>
-              <a:spcAft>
-                <a:spcPts val="0"/>
-              </a:spcAft>
-              <a:buSzPts val="1000"/>
-              <a:buChar char="●"/>
-            </a:pPr>
             <a:r>
               <a:rPr lang="pt-BR" sz="1000"/>
-              <a:t>Solicitar ajuda para realizar ações</a:t>
+              <a:t>assunto para estudo</a:t>
             </a:r>
             <a:endParaRPr sz="1000"/>
           </a:p>
@@ -6802,18 +6836,33 @@
             </a:r>
             <a:endParaRPr sz="1000"/>
           </a:p>
+          <a:p>
+            <a:pPr indent="0" lvl="0" marL="457200" rtl="0" algn="l">
+              <a:spcBef>
+                <a:spcPts val="0"/>
+              </a:spcBef>
+              <a:spcAft>
+                <a:spcPts val="0"/>
+              </a:spcAft>
+              <a:buNone/>
+            </a:pPr>
+            <a:r>
+              <a:t/>
+            </a:r>
+            <a:endParaRPr sz="1000"/>
+          </a:p>
         </p:txBody>
       </p:sp>
       <p:sp>
         <p:nvSpPr>
-          <p:cNvPr id="77" name="Google Shape;77;p14"/>
+          <p:cNvPr id="79" name="Google Shape;79;p14"/>
           <p:cNvSpPr txBox="1"/>
           <p:nvPr/>
         </p:nvSpPr>
         <p:spPr>
           <a:xfrm>
-            <a:off x="695775" y="3851625"/>
-            <a:ext cx="2314500" cy="720000"/>
+            <a:off x="6695925" y="2784325"/>
+            <a:ext cx="2314500" cy="897900"/>
           </a:xfrm>
           <a:prstGeom prst="rect">
             <a:avLst/>
@@ -6836,12 +6885,15 @@
               <a:spcAft>
                 <a:spcPts val="0"/>
               </a:spcAft>
+              <a:buClr>
+                <a:schemeClr val="dk1"/>
+              </a:buClr>
               <a:buSzPts val="1000"/>
               <a:buChar char="●"/>
             </a:pPr>
             <a:r>
               <a:rPr lang="pt-BR" sz="1000"/>
-              <a:t>Criar pastas</a:t>
+              <a:t>Solicitar adesão para voluntariado</a:t>
             </a:r>
             <a:endParaRPr sz="1000"/>
           </a:p>
@@ -6853,39 +6905,55 @@
               <a:spcAft>
                 <a:spcPts val="0"/>
               </a:spcAft>
+              <a:buClr>
+                <a:schemeClr val="dk1"/>
+              </a:buClr>
               <a:buSzPts val="1000"/>
               <a:buChar char="●"/>
             </a:pPr>
             <a:r>
               <a:rPr lang="pt-BR" sz="1000"/>
-              <a:t>Relatar problemas</a:t>
+              <a:t>Solicitar assunto para estudo</a:t>
             </a:r>
             <a:endParaRPr sz="1000"/>
           </a:p>
           <a:p>
-            <a:pPr indent="-292100" lvl="0" marL="457200" rtl="0" algn="l">
-              <a:spcBef>
-                <a:spcPts val="0"/>
-              </a:spcBef>
-              <a:spcAft>
-                <a:spcPts val="0"/>
-              </a:spcAft>
-              <a:buSzPts val="1000"/>
-              <a:buChar char="●"/>
+            <a:pPr indent="0" lvl="0" marL="457200" rtl="0" algn="l">
+              <a:spcBef>
+                <a:spcPts val="0"/>
+              </a:spcBef>
+              <a:spcAft>
+                <a:spcPts val="0"/>
+              </a:spcAft>
+              <a:buNone/>
             </a:pPr>
             <a:r>
-              <a:rPr lang="pt-BR" sz="1000"/>
-              <a:t>Participar dos grupos de </a:t>
+              <a:t/>
             </a:r>
+            <a:endParaRPr sz="1000">
+              <a:highlight>
+                <a:srgbClr val="00FFFF"/>
+              </a:highlight>
+            </a:endParaRPr>
+          </a:p>
+          <a:p>
+            <a:pPr indent="0" lvl="0" marL="0" rtl="0" algn="l">
+              <a:spcBef>
+                <a:spcPts val="0"/>
+              </a:spcBef>
+              <a:spcAft>
+                <a:spcPts val="0"/>
+              </a:spcAft>
+              <a:buNone/>
+            </a:pPr>
             <a:r>
-              <a:rPr lang="pt-BR" sz="1000"/>
-              <a:t>interesse</a:t>
+              <a:t/>
             </a:r>
-            <a:r>
-              <a:rPr lang="pt-BR" sz="1000"/>
-              <a:t>.</a:t>
-            </a:r>
-            <a:endParaRPr sz="1000"/>
+            <a:endParaRPr sz="1000">
+              <a:highlight>
+                <a:srgbClr val="00FFFF"/>
+              </a:highlight>
+            </a:endParaRPr>
           </a:p>
           <a:p>
             <a:pPr indent="0" lvl="0" marL="457200" rtl="0" algn="l">
@@ -6912,7 +6980,7 @@
         </p:nvSpPr>
         <p:spPr>
           <a:xfrm>
-            <a:off x="771975" y="1336250"/>
+            <a:off x="1110550" y="2365788"/>
             <a:ext cx="1358400" cy="411900"/>
           </a:xfrm>
           <a:prstGeom prst="rect">
@@ -6954,7 +7022,7 @@
         </p:nvSpPr>
         <p:spPr>
           <a:xfrm>
-            <a:off x="890225" y="3567025"/>
+            <a:off x="6890375" y="2499725"/>
             <a:ext cx="1191900" cy="411900"/>
           </a:xfrm>
           <a:prstGeom prst="rect">
@@ -6982,7 +7050,22 @@
             </a:pPr>
             <a:r>
               <a:rPr b="1" lang="pt-BR" sz="1000"/>
-              <a:t>Voluntários</a:t>
+              <a:t>Munícipe</a:t>
+            </a:r>
+            <a:endParaRPr b="1" sz="1000"/>
+          </a:p>
+          <a:p>
+            <a:pPr indent="0" lvl="0" marL="0" rtl="0" algn="l">
+              <a:spcBef>
+                <a:spcPts val="0"/>
+              </a:spcBef>
+              <a:spcAft>
+                <a:spcPts val="0"/>
+              </a:spcAft>
+              <a:buNone/>
+            </a:pPr>
+            <a:r>
+              <a:t/>
             </a:r>
             <a:endParaRPr b="1" sz="1000"/>
           </a:p>
@@ -6996,13 +7079,13 @@
         </p:nvSpPr>
         <p:spPr>
           <a:xfrm>
-            <a:off x="2375625" y="333325"/>
-            <a:ext cx="3190200" cy="1218000"/>
+            <a:off x="3442375" y="248250"/>
+            <a:ext cx="2173500" cy="1218000"/>
           </a:xfrm>
           <a:prstGeom prst="wave">
             <a:avLst>
               <a:gd fmla="val 12500" name="adj1"/>
-              <a:gd fmla="val -512" name="adj2"/>
+              <a:gd fmla="val -896" name="adj2"/>
             </a:avLst>
           </a:prstGeom>
           <a:solidFill>
@@ -7042,7 +7125,11 @@
             </a:br>
             <a:r>
               <a:rPr lang="pt-BR"/>
-              <a:t>Operações dos voluntários para uma Peruíbe Melhor</a:t>
+              <a:t>Peruíbe </a:t>
+            </a:r>
+            <a:r>
+              <a:rPr lang="pt-BR"/>
+              <a:t>Melhor</a:t>
             </a:r>
             <a:endParaRPr/>
           </a:p>
@@ -7066,32 +7153,24 @@
       <p:sp>
         <p:nvSpPr>
           <p:cNvPr id="83" name="Google Shape;83;p14"/>
-          <p:cNvSpPr/>
+          <p:cNvSpPr txBox="1"/>
           <p:nvPr/>
         </p:nvSpPr>
         <p:spPr>
           <a:xfrm>
-            <a:off x="8762450" y="0"/>
-            <a:ext cx="381600" cy="333300"/>
+            <a:off x="7851975" y="4681425"/>
+            <a:ext cx="1358400" cy="411900"/>
           </a:xfrm>
           <a:prstGeom prst="rect">
             <a:avLst/>
           </a:prstGeom>
-          <a:solidFill>
-            <a:srgbClr val="00FF00"/>
-          </a:solidFill>
-          <a:ln cap="flat" cmpd="sng" w="9525">
-            <a:solidFill>
-              <a:schemeClr val="dk2"/>
-            </a:solidFill>
-            <a:prstDash val="solid"/>
-            <a:round/>
-            <a:headEnd len="sm" w="sm" type="none"/>
-            <a:tailEnd len="sm" w="sm" type="none"/>
+          <a:noFill/>
+          <a:ln>
+            <a:noFill/>
           </a:ln>
         </p:spPr>
         <p:txBody>
-          <a:bodyPr anchorCtr="0" anchor="ctr" bIns="91425" lIns="91425" spcFirstLastPara="1" rIns="91425" wrap="square" tIns="91425">
+          <a:bodyPr anchorCtr="0" anchor="t" bIns="91425" lIns="91425" spcFirstLastPara="1" rIns="91425" wrap="square" tIns="91425">
             <a:noAutofit/>
           </a:bodyPr>
           <a:lstStyle/>
@@ -7106,9 +7185,10 @@
               <a:buNone/>
             </a:pPr>
             <a:r>
-              <a:t/>
+              <a:rPr lang="pt-BR" sz="1100"/>
+              <a:t>Objetivos</a:t>
             </a:r>
-            <a:endParaRPr/>
+            <a:endParaRPr sz="1100"/>
           </a:p>
         </p:txBody>
       </p:sp>
@@ -7145,8 +7225,8 @@
         </p:nvSpPr>
         <p:spPr>
           <a:xfrm>
-            <a:off x="3600475" y="136875"/>
-            <a:ext cx="2100300" cy="802800"/>
+            <a:off x="3426525" y="321900"/>
+            <a:ext cx="1845300" cy="802800"/>
           </a:xfrm>
           <a:prstGeom prst="wave">
             <a:avLst>
@@ -7173,7 +7253,7 @@
           </a:bodyPr>
           <a:lstStyle/>
           <a:p>
-            <a:pPr indent="457200" lvl="0" marL="0" rtl="0" algn="l">
+            <a:pPr indent="0" lvl="0" marL="0" rtl="0" algn="ctr">
               <a:spcBef>
                 <a:spcPts val="0"/>
               </a:spcBef>
@@ -7188,36 +7268,15 @@
                   <a:schemeClr val="dk1"/>
                 </a:solidFill>
               </a:rPr>
-              <a:t>Solicitar a participação</a:t>
+              <a:t>Solicitar adesão para voluntariado</a:t>
             </a:r>
             <a:endParaRPr sz="1000">
               <a:solidFill>
                 <a:schemeClr val="dk1"/>
               </a:solidFill>
-            </a:endParaRPr>
-          </a:p>
-          <a:p>
-            <a:pPr indent="0" lvl="0" marL="457200" rtl="0" algn="ctr">
-              <a:spcBef>
-                <a:spcPts val="0"/>
-              </a:spcBef>
-              <a:spcAft>
-                <a:spcPts val="0"/>
-              </a:spcAft>
-              <a:buNone/>
-            </a:pPr>
-            <a:r>
-              <a:rPr lang="pt-BR" sz="1000">
-                <a:solidFill>
-                  <a:schemeClr val="dk1"/>
-                </a:solidFill>
-              </a:rPr>
-              <a:t>como voluntário</a:t>
-            </a:r>
-            <a:endParaRPr sz="1000">
-              <a:solidFill>
-                <a:schemeClr val="dk1"/>
-              </a:solidFill>
+              <a:highlight>
+                <a:srgbClr val="FFFF00"/>
+              </a:highlight>
             </a:endParaRPr>
           </a:p>
         </p:txBody>
@@ -7303,9 +7362,9 @@
         <p:grpSpPr>
           <a:xfrm>
             <a:off x="1503275" y="2574515"/>
-            <a:ext cx="1230900" cy="830485"/>
+            <a:ext cx="1259100" cy="830485"/>
             <a:chOff x="2699598" y="3424900"/>
-            <a:chExt cx="1230900" cy="830485"/>
+            <a:chExt cx="1259100" cy="830485"/>
           </a:xfrm>
         </p:grpSpPr>
         <p:grpSp>
@@ -7503,7 +7562,7 @@
           <p:spPr>
             <a:xfrm>
               <a:off x="2699598" y="3912485"/>
-              <a:ext cx="1230900" cy="342900"/>
+              <a:ext cx="1259100" cy="342900"/>
             </a:xfrm>
             <a:prstGeom prst="rect">
               <a:avLst/>
@@ -7519,7 +7578,7 @@
             </a:bodyPr>
             <a:lstStyle/>
             <a:p>
-              <a:pPr indent="0" lvl="0" marL="0" marR="0" rtl="0" algn="l">
+              <a:pPr indent="0" lvl="0" marL="0" marR="0" rtl="0" algn="ctr">
                 <a:lnSpc>
                   <a:spcPct val="100000"/>
                 </a:lnSpc>
@@ -7538,13 +7597,17 @@
               </a:pPr>
               <a:r>
                 <a:rPr b="1" lang="pt-BR" sz="1200"/>
-                <a:t>   </a:t>
+                <a:t>Munícipes</a:t>
               </a:r>
-              <a:r>
-                <a:rPr b="1" lang="pt-BR" sz="1200"/>
-                <a:t>Voluntários</a:t>
-              </a:r>
-              <a:endParaRPr b="1" sz="1200"/>
+              <a:endParaRPr b="1" i="0" sz="1200" u="none" cap="none" strike="noStrike">
+                <a:solidFill>
+                  <a:srgbClr val="000000"/>
+                </a:solidFill>
+                <a:latin typeface="Arial"/>
+                <a:ea typeface="Arial"/>
+                <a:cs typeface="Arial"/>
+                <a:sym typeface="Arial"/>
+              </a:endParaRPr>
             </a:p>
           </p:txBody>
         </p:sp>
@@ -7560,12 +7623,12 @@
         </p:nvCxnSpPr>
         <p:spPr>
           <a:xfrm rot="-5400000">
-            <a:off x="3664699" y="1538800"/>
-            <a:ext cx="1685400" cy="286200"/>
+            <a:off x="3460374" y="1728025"/>
+            <a:ext cx="1592400" cy="185100"/>
           </a:xfrm>
           <a:prstGeom prst="curvedConnector3">
             <a:avLst>
-              <a:gd fmla="val 47132" name="adj1"/>
+              <a:gd fmla="val 46969" name="adj1"/>
             </a:avLst>
           </a:prstGeom>
           <a:noFill/>
@@ -7663,12 +7726,12 @@
         </p:nvCxnSpPr>
         <p:spPr>
           <a:xfrm rot="-5400000">
-            <a:off x="2541852" y="465665"/>
-            <a:ext cx="1735200" cy="2482500"/>
+            <a:off x="2483652" y="708965"/>
+            <a:ext cx="1550100" cy="2181000"/>
           </a:xfrm>
           <a:prstGeom prst="curvedConnector3">
             <a:avLst>
-              <a:gd fmla="val 47217" name="adj1"/>
+              <a:gd fmla="val 46887" name="adj1"/>
             </a:avLst>
           </a:prstGeom>
           <a:noFill/>
@@ -7691,8 +7754,8 @@
         </p:nvSpPr>
         <p:spPr>
           <a:xfrm>
-            <a:off x="374800" y="3945550"/>
-            <a:ext cx="2845500" cy="622800"/>
+            <a:off x="522525" y="3943025"/>
+            <a:ext cx="3251100" cy="622800"/>
           </a:xfrm>
           <a:prstGeom prst="bracketPair">
             <a:avLst/>
@@ -7724,56 +7787,22 @@
               <a:spcAft>
                 <a:spcPts val="0"/>
               </a:spcAft>
-              <a:buClr>
-                <a:srgbClr val="000000"/>
-              </a:buClr>
-              <a:buSzPts val="1000"/>
-              <a:buFont typeface="Arial"/>
-              <a:buChar char="●"/>
-            </a:pPr>
-            <a:r>
-              <a:rPr lang="pt-BR" sz="1000"/>
-              <a:t>Analisar a solicitação</a:t>
-            </a:r>
-            <a:endParaRPr sz="1000"/>
-          </a:p>
-          <a:p>
-            <a:pPr indent="-292100" lvl="0" marL="457200" marR="0" rtl="0" algn="l">
-              <a:lnSpc>
-                <a:spcPct val="100000"/>
-              </a:lnSpc>
-              <a:spcBef>
-                <a:spcPts val="0"/>
-              </a:spcBef>
-              <a:spcAft>
-                <a:spcPts val="0"/>
-              </a:spcAft>
               <a:buSzPts val="1000"/>
               <a:buChar char="●"/>
             </a:pPr>
             <a:r>
               <a:rPr lang="pt-BR" sz="1000"/>
-              <a:t>Alocar os Moradores para participarem como voluntários em determinados grupos</a:t>
+              <a:t>Alocar morador para participar como voluntário</a:t>
             </a:r>
-            <a:endParaRPr sz="1000"/>
-          </a:p>
-          <a:p>
-            <a:pPr indent="0" lvl="0" marL="457200" marR="0" rtl="0" algn="l">
-              <a:lnSpc>
-                <a:spcPct val="100000"/>
-              </a:lnSpc>
-              <a:spcBef>
-                <a:spcPts val="0"/>
-              </a:spcBef>
-              <a:spcAft>
-                <a:spcPts val="0"/>
-              </a:spcAft>
-              <a:buNone/>
-            </a:pPr>
-            <a:r>
-              <a:t/>
-            </a:r>
-            <a:endParaRPr sz="1000"/>
+            <a:endParaRPr b="0" i="0" sz="1000" u="none" cap="none" strike="noStrike">
+              <a:solidFill>
+                <a:srgbClr val="000000"/>
+              </a:solidFill>
+              <a:latin typeface="Arial"/>
+              <a:ea typeface="Arial"/>
+              <a:cs typeface="Arial"/>
+              <a:sym typeface="Arial"/>
+            </a:endParaRPr>
           </a:p>
         </p:txBody>
       </p:sp>
@@ -7785,7 +7814,7 @@
         </p:nvSpPr>
         <p:spPr>
           <a:xfrm>
-            <a:off x="3734749" y="2524600"/>
+            <a:off x="3534474" y="2616775"/>
             <a:ext cx="1259100" cy="531600"/>
           </a:xfrm>
           <a:prstGeom prst="roundRect">
@@ -7823,10 +7852,7 @@
           </a:bodyPr>
           <a:lstStyle/>
           <a:p>
-            <a:pPr indent="0" lvl="0" marL="0" marR="0" rtl="0" algn="ctr">
-              <a:lnSpc>
-                <a:spcPct val="100000"/>
-              </a:lnSpc>
+            <a:pPr indent="0" lvl="0" marL="0" rtl="0" algn="ctr">
               <a:spcBef>
                 <a:spcPts val="0"/>
               </a:spcBef>
@@ -7834,14 +7860,18 @@
                 <a:spcPts val="0"/>
               </a:spcAft>
               <a:buClr>
-                <a:srgbClr val="000000"/>
+                <a:schemeClr val="dk1"/>
               </a:buClr>
               <a:buSzPts val="1000"/>
               <a:buFont typeface="Arial"/>
               <a:buNone/>
             </a:pPr>
             <a:r>
-              <a:rPr lang="pt-BR" sz="1000"/>
+              <a:rPr lang="pt-BR" sz="1000">
+                <a:solidFill>
+                  <a:schemeClr val="dk1"/>
+                </a:solidFill>
+              </a:rPr>
               <a:t>Administrativo</a:t>
             </a:r>
             <a:endParaRPr b="0" i="0" sz="1000" u="none" cap="none" strike="noStrike">
@@ -7860,17 +7890,49 @@
         <p:nvCxnSpPr>
           <p:cNvPr id="103" name="Google Shape;103;p15"/>
           <p:cNvCxnSpPr>
+            <a:stCxn id="102" idx="3"/>
+            <a:endCxn id="99" idx="2"/>
+          </p:cNvCxnSpPr>
+          <p:nvPr/>
+        </p:nvCxnSpPr>
+        <p:spPr>
+          <a:xfrm flipH="1" rot="10800000">
+            <a:off x="3773625" y="3148325"/>
+            <a:ext cx="390300" cy="1106100"/>
+          </a:xfrm>
+          <a:prstGeom prst="curvedConnector2">
+            <a:avLst/>
+          </a:prstGeom>
+          <a:noFill/>
+          <a:ln cap="flat" cmpd="sng" w="9525">
+            <a:solidFill>
+              <a:schemeClr val="dk2"/>
+            </a:solidFill>
+            <a:prstDash val="solid"/>
+            <a:round/>
+            <a:headEnd len="med" w="med" type="none"/>
+            <a:tailEnd len="med" w="med" type="none"/>
+          </a:ln>
+        </p:spPr>
+      </p:cxnSp>
+      <p:cxnSp>
+        <p:nvCxnSpPr>
+          <p:cNvPr id="104" name="Google Shape;104;p15"/>
+          <p:cNvCxnSpPr>
+            <a:stCxn id="105" idx="0"/>
             <a:endCxn id="88" idx="2"/>
           </p:cNvCxnSpPr>
           <p:nvPr/>
         </p:nvCxnSpPr>
         <p:spPr>
-          <a:xfrm rot="10800000">
-            <a:off x="4650625" y="839325"/>
-            <a:ext cx="2091300" cy="1710600"/>
+          <a:xfrm flipH="1" rot="5400000">
+            <a:off x="4281874" y="1091575"/>
+            <a:ext cx="1592400" cy="1458000"/>
           </a:xfrm>
-          <a:prstGeom prst="curvedConnector2">
-            <a:avLst/>
+          <a:prstGeom prst="curvedConnector3">
+            <a:avLst>
+              <a:gd fmla="val 46969" name="adj1"/>
+            </a:avLst>
           </a:prstGeom>
           <a:noFill/>
           <a:ln cap="flat" cmpd="sng" w="9525">
@@ -7886,14 +7948,14 @@
       </p:cxnSp>
       <p:sp>
         <p:nvSpPr>
-          <p:cNvPr id="104" name="Google Shape;104;p15"/>
+          <p:cNvPr id="106" name="Google Shape;106;p15"/>
           <p:cNvSpPr/>
           <p:nvPr/>
         </p:nvSpPr>
         <p:spPr>
           <a:xfrm>
-            <a:off x="5319475" y="3633925"/>
-            <a:ext cx="3437400" cy="934500"/>
+            <a:off x="5731400" y="3943025"/>
+            <a:ext cx="2845500" cy="622800"/>
           </a:xfrm>
           <a:prstGeom prst="bracketPair">
             <a:avLst/>
@@ -7930,90 +7992,53 @@
             </a:pPr>
             <a:r>
               <a:rPr lang="pt-BR" sz="1000"/>
-              <a:t>Aceitar ou não a participação do voluntário</a:t>
+              <a:t>Receber voluntário</a:t>
             </a:r>
-            <a:endParaRPr b="0" i="0" sz="1000" u="none" cap="none" strike="noStrike">
-              <a:solidFill>
-                <a:srgbClr val="000000"/>
-              </a:solidFill>
-              <a:latin typeface="Arial"/>
-              <a:ea typeface="Arial"/>
-              <a:cs typeface="Arial"/>
-              <a:sym typeface="Arial"/>
-            </a:endParaRPr>
+            <a:endParaRPr sz="1000"/>
           </a:p>
         </p:txBody>
       </p:sp>
       <p:cxnSp>
         <p:nvCxnSpPr>
-          <p:cNvPr id="105" name="Google Shape;105;p15"/>
+          <p:cNvPr id="107" name="Google Shape;107;p15"/>
           <p:cNvCxnSpPr>
-            <a:stCxn id="104" idx="1"/>
-            <a:endCxn id="106" idx="2"/>
+            <a:stCxn id="106" idx="1"/>
+            <a:endCxn id="105" idx="2"/>
           </p:cNvCxnSpPr>
           <p:nvPr/>
         </p:nvCxnSpPr>
         <p:spPr>
           <a:xfrm flipH="1" rot="10800000">
-            <a:off x="5319475" y="3056275"/>
-            <a:ext cx="1276200" cy="1044900"/>
+            <a:off x="5731400" y="3148325"/>
+            <a:ext cx="75600" cy="1106100"/>
           </a:xfrm>
           <a:prstGeom prst="curvedConnector4">
             <a:avLst>
-              <a:gd fmla="val -18659" name="adj1"/>
-              <a:gd fmla="val 72362" name="adj2"/>
+              <a:gd fmla="val -314980" name="adj1"/>
+              <a:gd fmla="val 64074" name="adj2"/>
             </a:avLst>
           </a:prstGeom>
           <a:noFill/>
           <a:ln cap="flat" cmpd="sng" w="9525">
             <a:solidFill>
-              <a:schemeClr val="dk2"/>
+              <a:srgbClr val="595959"/>
             </a:solidFill>
             <a:prstDash val="solid"/>
             <a:round/>
-            <a:headEnd len="med" w="med" type="none"/>
-            <a:tailEnd len="med" w="med" type="none"/>
-          </a:ln>
-        </p:spPr>
-      </p:cxnSp>
-      <p:cxnSp>
-        <p:nvCxnSpPr>
-          <p:cNvPr id="107" name="Google Shape;107;p15"/>
-          <p:cNvCxnSpPr>
-            <a:stCxn id="102" idx="3"/>
-            <a:endCxn id="99" idx="2"/>
-          </p:cNvCxnSpPr>
-          <p:nvPr/>
-        </p:nvCxnSpPr>
-        <p:spPr>
-          <a:xfrm flipH="1" rot="10800000">
-            <a:off x="3220300" y="3056350"/>
-            <a:ext cx="1143900" cy="1200600"/>
-          </a:xfrm>
-          <a:prstGeom prst="curvedConnector2">
-            <a:avLst/>
-          </a:prstGeom>
-          <a:noFill/>
-          <a:ln cap="flat" cmpd="sng" w="9525">
-            <a:solidFill>
-              <a:schemeClr val="dk2"/>
-            </a:solidFill>
-            <a:prstDash val="solid"/>
-            <a:round/>
-            <a:headEnd len="med" w="med" type="none"/>
-            <a:tailEnd len="med" w="med" type="none"/>
+            <a:headEnd len="sm" w="sm" type="none"/>
+            <a:tailEnd len="sm" w="sm" type="none"/>
           </a:ln>
         </p:spPr>
       </p:cxnSp>
       <p:sp>
         <p:nvSpPr>
-          <p:cNvPr id="106" name="Google Shape;106;p15"/>
+          <p:cNvPr id="105" name="Google Shape;105;p15"/>
           <p:cNvSpPr/>
           <p:nvPr/>
         </p:nvSpPr>
         <p:spPr>
           <a:xfrm>
-            <a:off x="5966224" y="2524600"/>
+            <a:off x="5177524" y="2616775"/>
             <a:ext cx="1259100" cy="531600"/>
           </a:xfrm>
           <a:prstGeom prst="roundRect">
@@ -8051,10 +8076,7 @@
           </a:bodyPr>
           <a:lstStyle/>
           <a:p>
-            <a:pPr indent="457200" lvl="0" marL="0" marR="0" rtl="0" algn="l">
-              <a:lnSpc>
-                <a:spcPct val="100000"/>
-              </a:lnSpc>
+            <a:pPr indent="0" lvl="0" marL="0" rtl="0" algn="ctr">
               <a:spcBef>
                 <a:spcPts val="0"/>
               </a:spcBef>
@@ -8062,112 +8084,29 @@
                 <a:spcPts val="0"/>
               </a:spcAft>
               <a:buClr>
-                <a:srgbClr val="000000"/>
+                <a:schemeClr val="dk1"/>
               </a:buClr>
               <a:buSzPts val="1000"/>
               <a:buFont typeface="Arial"/>
               <a:buNone/>
             </a:pPr>
             <a:r>
-              <a:t/>
+              <a:rPr lang="pt-BR" sz="1000">
+                <a:solidFill>
+                  <a:schemeClr val="dk1"/>
+                </a:solidFill>
+              </a:rPr>
+              <a:t>Operacional</a:t>
             </a:r>
-            <a:endParaRPr sz="1000"/>
-          </a:p>
-          <a:p>
-            <a:pPr indent="0" lvl="0" marL="0" marR="0" rtl="0" algn="ctr">
-              <a:lnSpc>
-                <a:spcPct val="100000"/>
-              </a:lnSpc>
-              <a:spcBef>
-                <a:spcPts val="0"/>
-              </a:spcBef>
-              <a:spcAft>
-                <a:spcPts val="0"/>
-              </a:spcAft>
-              <a:buClr>
+            <a:endParaRPr b="0" i="0" sz="1000" u="none" cap="none" strike="noStrike">
+              <a:solidFill>
                 <a:srgbClr val="000000"/>
-              </a:buClr>
-              <a:buSzPts val="1000"/>
-              <a:buFont typeface="Arial"/>
-              <a:buNone/>
-            </a:pPr>
-            <a:r>
-              <a:rPr lang="pt-BR" sz="1000"/>
-              <a:t>Grupo</a:t>
-            </a:r>
-            <a:endParaRPr sz="1000"/>
-          </a:p>
-          <a:p>
-            <a:pPr indent="0" lvl="0" marL="0" marR="0" rtl="0" algn="l">
-              <a:lnSpc>
-                <a:spcPct val="100000"/>
-              </a:lnSpc>
-              <a:spcBef>
-                <a:spcPts val="0"/>
-              </a:spcBef>
-              <a:spcAft>
-                <a:spcPts val="0"/>
-              </a:spcAft>
-              <a:buClr>
-                <a:srgbClr val="000000"/>
-              </a:buClr>
-              <a:buSzPts val="1000"/>
-              <a:buFont typeface="Arial"/>
-              <a:buNone/>
-            </a:pPr>
-            <a:r>
-              <a:t/>
-            </a:r>
-            <a:endParaRPr sz="1000"/>
-          </a:p>
-        </p:txBody>
-      </p:sp>
-      <p:sp>
-        <p:nvSpPr>
-          <p:cNvPr id="108" name="Google Shape;108;p15"/>
-          <p:cNvSpPr/>
-          <p:nvPr/>
-        </p:nvSpPr>
-        <p:spPr>
-          <a:xfrm>
-            <a:off x="8756875" y="96200"/>
-            <a:ext cx="387000" cy="318300"/>
-          </a:xfrm>
-          <a:prstGeom prst="rect">
-            <a:avLst/>
-          </a:prstGeom>
-          <a:solidFill>
-            <a:srgbClr val="00FF00"/>
-          </a:solidFill>
-          <a:ln cap="flat" cmpd="sng" w="9525">
-            <a:solidFill>
-              <a:schemeClr val="dk2"/>
-            </a:solidFill>
-            <a:prstDash val="solid"/>
-            <a:round/>
-            <a:headEnd len="sm" w="sm" type="none"/>
-            <a:tailEnd len="sm" w="sm" type="none"/>
-          </a:ln>
-        </p:spPr>
-        <p:txBody>
-          <a:bodyPr anchorCtr="0" anchor="ctr" bIns="91425" lIns="91425" spcFirstLastPara="1" rIns="91425" wrap="square" tIns="91425">
-            <a:noAutofit/>
-          </a:bodyPr>
-          <a:lstStyle/>
-          <a:p>
-            <a:pPr indent="0" lvl="0" marL="0" rtl="0" algn="l">
-              <a:spcBef>
-                <a:spcPts val="0"/>
-              </a:spcBef>
-              <a:spcAft>
-                <a:spcPts val="0"/>
-              </a:spcAft>
-              <a:buNone/>
-            </a:pPr>
-            <a:r>
-              <a:t/>
-            </a:r>
-            <a:endParaRPr/>
+              </a:solidFill>
+              <a:latin typeface="Arial"/>
+              <a:ea typeface="Arial"/>
+              <a:cs typeface="Arial"/>
+              <a:sym typeface="Arial"/>
+            </a:endParaRPr>
           </a:p>
         </p:txBody>
       </p:sp>
@@ -8184,7 +8123,7 @@
   <p:cSld>
     <p:spTree>
       <p:nvGrpSpPr>
-        <p:cNvPr id="112" name="Shape 112"/>
+        <p:cNvPr id="111" name="Shape 111"/>
         <p:cNvGrpSpPr/>
         <p:nvPr/>
       </p:nvGrpSpPr>
@@ -8198,13 +8137,13 @@
       </p:grpSpPr>
       <p:sp>
         <p:nvSpPr>
-          <p:cNvPr id="113" name="Google Shape;113;p16"/>
+          <p:cNvPr id="112" name="Google Shape;112;p16"/>
           <p:cNvSpPr/>
           <p:nvPr/>
         </p:nvSpPr>
         <p:spPr>
           <a:xfrm>
-            <a:off x="3600475" y="136875"/>
+            <a:off x="3521850" y="429525"/>
             <a:ext cx="2100300" cy="802800"/>
           </a:xfrm>
           <a:prstGeom prst="wave">
@@ -8214,7 +8153,7 @@
             </a:avLst>
           </a:prstGeom>
           <a:solidFill>
-            <a:schemeClr val="lt2"/>
+            <a:srgbClr val="EFEFEF"/>
           </a:solidFill>
           <a:ln cap="flat" cmpd="sng" w="9525">
             <a:solidFill>
@@ -8247,15 +8186,27 @@
                   <a:schemeClr val="dk1"/>
                 </a:solidFill>
               </a:rPr>
-              <a:t>Votar nas pastas solicitadas</a:t>
+              <a:t>Requisitar</a:t>
             </a:r>
-            <a:endParaRPr/>
+            <a:r>
+              <a:rPr lang="pt-BR" sz="1000">
+                <a:solidFill>
+                  <a:schemeClr val="dk1"/>
+                </a:solidFill>
+              </a:rPr>
+              <a:t> assunto para estudo</a:t>
+            </a:r>
+            <a:endParaRPr b="1" sz="1000">
+              <a:solidFill>
+                <a:schemeClr val="dk1"/>
+              </a:solidFill>
+            </a:endParaRPr>
           </a:p>
         </p:txBody>
       </p:sp>
       <p:sp>
         <p:nvSpPr>
-          <p:cNvPr id="114" name="Google Shape;114;p16"/>
+          <p:cNvPr id="113" name="Google Shape;113;p16"/>
           <p:cNvSpPr txBox="1"/>
           <p:nvPr/>
         </p:nvSpPr>
@@ -8327,21 +8278,21 @@
       </p:sp>
       <p:grpSp>
         <p:nvGrpSpPr>
-          <p:cNvPr id="115" name="Google Shape;115;p16"/>
+          <p:cNvPr id="114" name="Google Shape;114;p16"/>
           <p:cNvGrpSpPr/>
           <p:nvPr/>
         </p:nvGrpSpPr>
         <p:grpSpPr>
           <a:xfrm>
             <a:off x="1503275" y="2574515"/>
-            <a:ext cx="1259100" cy="830485"/>
+            <a:ext cx="1230900" cy="830485"/>
             <a:chOff x="2699598" y="3424900"/>
-            <a:chExt cx="1259100" cy="830485"/>
+            <a:chExt cx="1230900" cy="830485"/>
           </a:xfrm>
         </p:grpSpPr>
         <p:grpSp>
           <p:nvGrpSpPr>
-            <p:cNvPr id="116" name="Google Shape;116;p16"/>
+            <p:cNvPr id="115" name="Google Shape;115;p16"/>
             <p:cNvGrpSpPr/>
             <p:nvPr/>
           </p:nvGrpSpPr>
@@ -8355,7 +8306,7 @@
           </p:grpSpPr>
           <p:sp>
             <p:nvSpPr>
-              <p:cNvPr id="117" name="Google Shape;117;p16"/>
+              <p:cNvPr id="116" name="Google Shape;116;p16"/>
               <p:cNvSpPr/>
               <p:nvPr/>
             </p:nvSpPr>
@@ -8420,9 +8371,9 @@
           </p:sp>
           <p:cxnSp>
             <p:nvCxnSpPr>
-              <p:cNvPr id="118" name="Google Shape;118;p16"/>
+              <p:cNvPr id="117" name="Google Shape;117;p16"/>
               <p:cNvCxnSpPr>
-                <a:stCxn id="117" idx="4"/>
+                <a:stCxn id="116" idx="4"/>
               </p:cNvCxnSpPr>
               <p:nvPr/>
             </p:nvCxnSpPr>
@@ -8448,7 +8399,7 @@
           </p:cxnSp>
           <p:cxnSp>
             <p:nvCxnSpPr>
-              <p:cNvPr id="119" name="Google Shape;119;p16"/>
+              <p:cNvPr id="118" name="Google Shape;118;p16"/>
               <p:cNvCxnSpPr/>
               <p:nvPr/>
             </p:nvCxnSpPr>
@@ -8474,7 +8425,7 @@
           </p:cxnSp>
           <p:cxnSp>
             <p:nvCxnSpPr>
-              <p:cNvPr id="120" name="Google Shape;120;p16"/>
+              <p:cNvPr id="119" name="Google Shape;119;p16"/>
               <p:cNvCxnSpPr/>
               <p:nvPr/>
             </p:nvCxnSpPr>
@@ -8500,7 +8451,7 @@
           </p:cxnSp>
           <p:cxnSp>
             <p:nvCxnSpPr>
-              <p:cNvPr id="121" name="Google Shape;121;p16"/>
+              <p:cNvPr id="120" name="Google Shape;120;p16"/>
               <p:cNvCxnSpPr/>
               <p:nvPr/>
             </p:nvCxnSpPr>
@@ -8527,14 +8478,14 @@
         </p:grpSp>
         <p:sp>
           <p:nvSpPr>
-            <p:cNvPr id="122" name="Google Shape;122;p16"/>
+            <p:cNvPr id="121" name="Google Shape;121;p16"/>
             <p:cNvSpPr txBox="1"/>
             <p:nvPr/>
           </p:nvSpPr>
           <p:spPr>
             <a:xfrm>
               <a:off x="2699598" y="3912485"/>
-              <a:ext cx="1259100" cy="342900"/>
+              <a:ext cx="1230900" cy="342900"/>
             </a:xfrm>
             <a:prstGeom prst="rect">
               <a:avLst/>
@@ -8550,7 +8501,7 @@
             </a:bodyPr>
             <a:lstStyle/>
             <a:p>
-              <a:pPr indent="0" lvl="0" marL="0" marR="0" rtl="0" algn="ctr">
+              <a:pPr indent="0" lvl="0" marL="0" marR="0" rtl="0" algn="l">
                 <a:lnSpc>
                   <a:spcPct val="100000"/>
                 </a:lnSpc>
@@ -8569,35 +8520,38 @@
               </a:pPr>
               <a:r>
                 <a:rPr b="1" lang="pt-BR" sz="1200"/>
-                <a:t>Usuários</a:t>
+                <a:t>      </a:t>
               </a:r>
-              <a:endParaRPr b="1" i="0" sz="1200" u="none" cap="none" strike="noStrike">
-                <a:solidFill>
-                  <a:srgbClr val="000000"/>
-                </a:solidFill>
-                <a:latin typeface="Arial"/>
-                <a:ea typeface="Arial"/>
-                <a:cs typeface="Arial"/>
-                <a:sym typeface="Arial"/>
-              </a:endParaRPr>
+              <a:r>
+                <a:rPr b="1" lang="pt-BR" sz="1200">
+                  <a:solidFill>
+                    <a:schemeClr val="dk1"/>
+                  </a:solidFill>
+                </a:rPr>
+                <a:t>Prefeito</a:t>
+              </a:r>
+              <a:endParaRPr b="1" sz="1200"/>
             </a:p>
           </p:txBody>
         </p:sp>
       </p:grpSp>
       <p:cxnSp>
         <p:nvCxnSpPr>
-          <p:cNvPr id="123" name="Google Shape;123;p16"/>
-          <p:cNvCxnSpPr/>
+          <p:cNvPr id="122" name="Google Shape;122;p16"/>
+          <p:cNvCxnSpPr>
+            <a:stCxn id="123" idx="0"/>
+            <a:endCxn id="112" idx="2"/>
+          </p:cNvCxnSpPr>
           <p:nvPr/>
         </p:nvCxnSpPr>
         <p:spPr>
-          <a:xfrm flipH="1" rot="5400000">
-            <a:off x="3686599" y="1854850"/>
-            <a:ext cx="956100" cy="383400"/>
+          <a:xfrm rot="-5400000">
+            <a:off x="3863549" y="1840375"/>
+            <a:ext cx="1417500" cy="600"/>
           </a:xfrm>
           <a:prstGeom prst="curvedConnector3">
             <a:avLst>
-              <a:gd fmla="val 50000" name="adj1"/>
+              <a:gd fmla="val 46592" name="adj1"/>
             </a:avLst>
           </a:prstGeom>
           <a:noFill/>
@@ -8688,19 +8642,19 @@
         <p:nvCxnSpPr>
           <p:cNvPr id="125" name="Google Shape;125;p16"/>
           <p:cNvCxnSpPr>
-            <a:stCxn id="117" idx="0"/>
-            <a:endCxn id="113" idx="2"/>
+            <a:stCxn id="116" idx="0"/>
+            <a:endCxn id="112" idx="2"/>
           </p:cNvCxnSpPr>
           <p:nvPr/>
         </p:nvCxnSpPr>
         <p:spPr>
           <a:xfrm rot="-5400000">
-            <a:off x="2541852" y="465665"/>
-            <a:ext cx="1735200" cy="2482500"/>
+            <a:off x="2648952" y="651365"/>
+            <a:ext cx="1442400" cy="2403900"/>
           </a:xfrm>
           <a:prstGeom prst="curvedConnector3">
             <a:avLst>
-              <a:gd fmla="val 47217" name="adj1"/>
+              <a:gd fmla="val 46658" name="adj1"/>
             </a:avLst>
           </a:prstGeom>
           <a:noFill/>
@@ -8723,8 +8677,8 @@
         </p:nvSpPr>
         <p:spPr>
           <a:xfrm>
-            <a:off x="374800" y="3945550"/>
-            <a:ext cx="2845500" cy="622800"/>
+            <a:off x="5764000" y="4002550"/>
+            <a:ext cx="2346000" cy="711600"/>
           </a:xfrm>
           <a:prstGeom prst="bracketPair">
             <a:avLst/>
@@ -8746,7 +8700,7 @@
           </a:bodyPr>
           <a:lstStyle/>
           <a:p>
-            <a:pPr indent="-292100" lvl="0" marL="457200" marR="0" rtl="0" algn="l">
+            <a:pPr indent="-304800" lvl="0" marL="457200" marR="0" rtl="0" algn="l">
               <a:lnSpc>
                 <a:spcPct val="100000"/>
               </a:lnSpc>
@@ -8757,62 +8711,41 @@
                 <a:spcPts val="0"/>
               </a:spcAft>
               <a:buClr>
-                <a:srgbClr val="000000"/>
+                <a:schemeClr val="dk1"/>
               </a:buClr>
-              <a:buSzPts val="1000"/>
-              <a:buFont typeface="Arial"/>
+              <a:buSzPts val="1200"/>
               <a:buChar char="●"/>
             </a:pPr>
             <a:r>
-              <a:rPr lang="pt-BR" sz="1000"/>
-              <a:t>Criar grupos</a:t>
+              <a:rPr lang="pt-BR" sz="1200">
+                <a:solidFill>
+                  <a:schemeClr val="dk1"/>
+                </a:solidFill>
+              </a:rPr>
+              <a:t>Criar Pasta Solicitada</a:t>
             </a:r>
-            <a:endParaRPr sz="1000"/>
-          </a:p>
-          <a:p>
-            <a:pPr indent="-292100" lvl="0" marL="457200" marR="0" rtl="0" algn="l">
-              <a:lnSpc>
-                <a:spcPct val="100000"/>
-              </a:lnSpc>
-              <a:spcBef>
-                <a:spcPts val="0"/>
-              </a:spcBef>
-              <a:spcAft>
-                <a:spcPts val="0"/>
-              </a:spcAft>
-              <a:buSzPts val="1000"/>
-              <a:buChar char="●"/>
-            </a:pPr>
-            <a:r>
-              <a:rPr lang="pt-BR" sz="1000"/>
-              <a:t>Participar dos grupos</a:t>
-            </a:r>
-            <a:endParaRPr b="0" i="0" sz="1000" u="none" cap="none" strike="noStrike">
+            <a:endParaRPr sz="1200">
               <a:solidFill>
-                <a:srgbClr val="000000"/>
+                <a:schemeClr val="dk1"/>
               </a:solidFill>
-              <a:latin typeface="Arial"/>
-              <a:ea typeface="Arial"/>
-              <a:cs typeface="Arial"/>
-              <a:sym typeface="Arial"/>
             </a:endParaRPr>
           </a:p>
         </p:txBody>
       </p:sp>
       <p:sp>
         <p:nvSpPr>
-          <p:cNvPr id="127" name="Google Shape;127;p16"/>
+          <p:cNvPr id="123" name="Google Shape;123;p16"/>
           <p:cNvSpPr/>
           <p:nvPr/>
         </p:nvSpPr>
         <p:spPr>
           <a:xfrm>
-            <a:off x="3734749" y="2524600"/>
+            <a:off x="3942449" y="2549425"/>
             <a:ext cx="1259100" cy="531600"/>
           </a:xfrm>
           <a:prstGeom prst="roundRect">
             <a:avLst>
-              <a:gd fmla="val 16667" name="adj"/>
+              <a:gd fmla="val 0" name="adj"/>
             </a:avLst>
           </a:prstGeom>
           <a:gradFill>
@@ -8864,7 +8797,7 @@
             </a:pPr>
             <a:r>
               <a:rPr lang="pt-BR" sz="1000"/>
-              <a:t>Aplicativo</a:t>
+              <a:t>Administrativo</a:t>
             </a:r>
             <a:endParaRPr b="0" i="0" sz="1000" u="none" cap="none" strike="noStrike">
               <a:solidFill>
@@ -8880,22 +8813,20 @@
       </p:sp>
       <p:cxnSp>
         <p:nvCxnSpPr>
-          <p:cNvPr id="128" name="Google Shape;128;p16"/>
+          <p:cNvPr id="127" name="Google Shape;127;p16"/>
           <p:cNvCxnSpPr>
-            <a:stCxn id="126" idx="3"/>
+            <a:stCxn id="126" idx="1"/>
+            <a:endCxn id="123" idx="2"/>
           </p:cNvCxnSpPr>
           <p:nvPr/>
         </p:nvCxnSpPr>
         <p:spPr>
           <a:xfrm rot="10800000">
-            <a:off x="2491300" y="2825950"/>
-            <a:ext cx="729000" cy="1431000"/>
+            <a:off x="4572100" y="3080950"/>
+            <a:ext cx="1191900" cy="1277400"/>
           </a:xfrm>
-          <a:prstGeom prst="curvedConnector4">
-            <a:avLst>
-              <a:gd fmla="val -32665" name="adj1"/>
-              <a:gd fmla="val 94549" name="adj2"/>
-            </a:avLst>
+          <a:prstGeom prst="curvedConnector2">
+            <a:avLst/>
           </a:prstGeom>
           <a:noFill/>
           <a:ln cap="flat" cmpd="sng" w="9525">
@@ -8922,7 +8853,7 @@
   <p:cSld>
     <p:spTree>
       <p:nvGrpSpPr>
-        <p:cNvPr id="132" name="Shape 132"/>
+        <p:cNvPr id="131" name="Shape 131"/>
         <p:cNvGrpSpPr/>
         <p:nvPr/>
       </p:nvGrpSpPr>
@@ -8936,14 +8867,14 @@
       </p:grpSpPr>
       <p:sp>
         <p:nvSpPr>
-          <p:cNvPr id="133" name="Google Shape;133;p17"/>
+          <p:cNvPr id="132" name="Google Shape;132;p17"/>
           <p:cNvSpPr/>
           <p:nvPr/>
         </p:nvSpPr>
         <p:spPr>
           <a:xfrm>
-            <a:off x="3600475" y="136875"/>
-            <a:ext cx="2100300" cy="802800"/>
+            <a:off x="3404900" y="166475"/>
+            <a:ext cx="2215800" cy="802800"/>
           </a:xfrm>
           <a:prstGeom prst="wave">
             <a:avLst>
@@ -8980,20 +8911,32 @@
               <a:buNone/>
             </a:pPr>
             <a:r>
-              <a:rPr lang="pt-BR"/>
-              <a:t>Gestão</a:t>
+              <a:rPr lang="pt-BR" sz="1000">
+                <a:solidFill>
+                  <a:schemeClr val="dk1"/>
+                </a:solidFill>
+              </a:rPr>
+              <a:t>Solicitar</a:t>
             </a:r>
             <a:r>
-              <a:rPr lang="pt-BR"/>
-              <a:t> de mensagens</a:t>
+              <a:rPr lang="pt-BR" sz="1000">
+                <a:solidFill>
+                  <a:schemeClr val="dk1"/>
+                </a:solidFill>
+              </a:rPr>
+              <a:t> assunto para estudo</a:t>
             </a:r>
-            <a:endParaRPr/>
+            <a:endParaRPr b="1" sz="1000">
+              <a:solidFill>
+                <a:schemeClr val="dk1"/>
+              </a:solidFill>
+            </a:endParaRPr>
           </a:p>
         </p:txBody>
       </p:sp>
       <p:sp>
         <p:nvSpPr>
-          <p:cNvPr id="134" name="Google Shape;134;p17"/>
+          <p:cNvPr id="133" name="Google Shape;133;p17"/>
           <p:cNvSpPr txBox="1"/>
           <p:nvPr/>
         </p:nvSpPr>
@@ -9049,7 +8992,11 @@
                 <a:cs typeface="Arial"/>
                 <a:sym typeface="Arial"/>
               </a:rPr>
-              <a:t>Nós Operacionais</a:t>
+              <a:t>Nós Operaciona</a:t>
+            </a:r>
+            <a:r>
+              <a:rPr lang="pt-BR"/>
+              <a:t>is</a:t>
             </a:r>
             <a:endParaRPr b="0" i="0" sz="1400" u="none" cap="none" strike="noStrike">
               <a:solidFill>
@@ -9065,7 +9012,7 @@
       </p:sp>
       <p:grpSp>
         <p:nvGrpSpPr>
-          <p:cNvPr id="135" name="Google Shape;135;p17"/>
+          <p:cNvPr id="134" name="Google Shape;134;p17"/>
           <p:cNvGrpSpPr/>
           <p:nvPr/>
         </p:nvGrpSpPr>
@@ -9079,7 +9026,7 @@
         </p:grpSpPr>
         <p:grpSp>
           <p:nvGrpSpPr>
-            <p:cNvPr id="136" name="Google Shape;136;p17"/>
+            <p:cNvPr id="135" name="Google Shape;135;p17"/>
             <p:cNvGrpSpPr/>
             <p:nvPr/>
           </p:nvGrpSpPr>
@@ -9093,7 +9040,7 @@
           </p:grpSpPr>
           <p:sp>
             <p:nvSpPr>
-              <p:cNvPr id="137" name="Google Shape;137;p17"/>
+              <p:cNvPr id="136" name="Google Shape;136;p17"/>
               <p:cNvSpPr/>
               <p:nvPr/>
             </p:nvSpPr>
@@ -9158,9 +9105,9 @@
           </p:sp>
           <p:cxnSp>
             <p:nvCxnSpPr>
-              <p:cNvPr id="138" name="Google Shape;138;p17"/>
+              <p:cNvPr id="137" name="Google Shape;137;p17"/>
               <p:cNvCxnSpPr>
-                <a:stCxn id="137" idx="4"/>
+                <a:stCxn id="136" idx="4"/>
               </p:cNvCxnSpPr>
               <p:nvPr/>
             </p:nvCxnSpPr>
@@ -9186,7 +9133,7 @@
           </p:cxnSp>
           <p:cxnSp>
             <p:nvCxnSpPr>
-              <p:cNvPr id="139" name="Google Shape;139;p17"/>
+              <p:cNvPr id="138" name="Google Shape;138;p17"/>
               <p:cNvCxnSpPr/>
               <p:nvPr/>
             </p:nvCxnSpPr>
@@ -9212,7 +9159,7 @@
           </p:cxnSp>
           <p:cxnSp>
             <p:nvCxnSpPr>
-              <p:cNvPr id="140" name="Google Shape;140;p17"/>
+              <p:cNvPr id="139" name="Google Shape;139;p17"/>
               <p:cNvCxnSpPr/>
               <p:nvPr/>
             </p:nvCxnSpPr>
@@ -9238,7 +9185,7 @@
           </p:cxnSp>
           <p:cxnSp>
             <p:nvCxnSpPr>
-              <p:cNvPr id="141" name="Google Shape;141;p17"/>
+              <p:cNvPr id="140" name="Google Shape;140;p17"/>
               <p:cNvCxnSpPr/>
               <p:nvPr/>
             </p:nvCxnSpPr>
@@ -9265,7 +9212,7 @@
         </p:grpSp>
         <p:sp>
           <p:nvSpPr>
-            <p:cNvPr id="142" name="Google Shape;142;p17"/>
+            <p:cNvPr id="141" name="Google Shape;141;p17"/>
             <p:cNvSpPr txBox="1"/>
             <p:nvPr/>
           </p:nvSpPr>
@@ -9307,11 +9254,7 @@
               </a:pPr>
               <a:r>
                 <a:rPr b="1" lang="pt-BR" sz="1200"/>
-                <a:t>U</a:t>
-              </a:r>
-              <a:r>
-                <a:rPr b="1" lang="pt-BR" sz="1200"/>
-                <a:t>suários</a:t>
+                <a:t>Munícipes</a:t>
               </a:r>
               <a:endParaRPr b="1" i="0" sz="1200" u="none" cap="none" strike="noStrike">
                 <a:solidFill>
@@ -9328,20 +9271,21 @@
       </p:grpSp>
       <p:cxnSp>
         <p:nvCxnSpPr>
-          <p:cNvPr id="143" name="Google Shape;143;p17"/>
+          <p:cNvPr id="142" name="Google Shape;142;p17"/>
           <p:cNvCxnSpPr>
-            <a:stCxn id="144" idx="0"/>
+            <a:stCxn id="143" idx="0"/>
+            <a:endCxn id="132" idx="2"/>
           </p:cNvCxnSpPr>
           <p:nvPr/>
         </p:nvCxnSpPr>
         <p:spPr>
-          <a:xfrm rot="-5400000">
-            <a:off x="4147699" y="1806700"/>
-            <a:ext cx="934500" cy="501300"/>
+          <a:xfrm flipH="1" rot="5400000">
+            <a:off x="4949637" y="432163"/>
+            <a:ext cx="1761900" cy="2635500"/>
           </a:xfrm>
           <a:prstGeom prst="curvedConnector3">
             <a:avLst>
-              <a:gd fmla="val 50000" name="adj1"/>
+              <a:gd fmla="val 47261" name="adj1"/>
             </a:avLst>
           </a:prstGeom>
           <a:noFill/>
@@ -9358,7 +9302,7 @@
       </p:cxnSp>
       <p:sp>
         <p:nvSpPr>
-          <p:cNvPr id="145" name="Google Shape;145;p17"/>
+          <p:cNvPr id="144" name="Google Shape;144;p17"/>
           <p:cNvSpPr txBox="1"/>
           <p:nvPr/>
         </p:nvSpPr>
@@ -9430,19 +9374,22 @@
       </p:sp>
       <p:cxnSp>
         <p:nvCxnSpPr>
-          <p:cNvPr id="146" name="Google Shape;146;p17"/>
+          <p:cNvPr id="145" name="Google Shape;145;p17"/>
           <p:cNvCxnSpPr>
-            <a:stCxn id="137" idx="0"/>
+            <a:stCxn id="136" idx="0"/>
+            <a:endCxn id="132" idx="2"/>
           </p:cNvCxnSpPr>
           <p:nvPr/>
         </p:nvCxnSpPr>
         <p:spPr>
           <a:xfrm rot="-5400000">
-            <a:off x="2960502" y="797615"/>
-            <a:ext cx="984600" cy="2569200"/>
+            <a:off x="2487702" y="549515"/>
+            <a:ext cx="1705500" cy="2344500"/>
           </a:xfrm>
-          <a:prstGeom prst="curvedConnector2">
-            <a:avLst/>
+          <a:prstGeom prst="curvedConnector3">
+            <a:avLst>
+              <a:gd fmla="val 47172" name="adj1"/>
+            </a:avLst>
           </a:prstGeom>
           <a:noFill/>
           <a:ln cap="flat" cmpd="sng" w="9525">
@@ -9458,14 +9405,218 @@
       </p:cxnSp>
       <p:sp>
         <p:nvSpPr>
-          <p:cNvPr id="147" name="Google Shape;147;p17"/>
+          <p:cNvPr id="146" name="Google Shape;146;p17"/>
           <p:cNvSpPr/>
           <p:nvPr/>
         </p:nvSpPr>
         <p:spPr>
           <a:xfrm>
-            <a:off x="576400" y="3934800"/>
-            <a:ext cx="2845500" cy="802800"/>
+            <a:off x="4981250" y="4105825"/>
+            <a:ext cx="2564400" cy="622800"/>
+          </a:xfrm>
+          <a:prstGeom prst="bracketPair">
+            <a:avLst/>
+          </a:prstGeom>
+          <a:noFill/>
+          <a:ln cap="flat" cmpd="sng" w="9525">
+            <a:solidFill>
+              <a:srgbClr val="595959"/>
+            </a:solidFill>
+            <a:prstDash val="solid"/>
+            <a:round/>
+            <a:headEnd len="sm" w="sm" type="none"/>
+            <a:tailEnd len="sm" w="sm" type="none"/>
+          </a:ln>
+        </p:spPr>
+        <p:txBody>
+          <a:bodyPr anchorCtr="0" anchor="ctr" bIns="91425" lIns="91425" spcFirstLastPara="1" rIns="91425" wrap="square" tIns="91425">
+            <a:noAutofit/>
+          </a:bodyPr>
+          <a:lstStyle/>
+          <a:p>
+            <a:pPr indent="-298450" lvl="0" marL="457200" marR="0" rtl="0" algn="l">
+              <a:lnSpc>
+                <a:spcPct val="100000"/>
+              </a:lnSpc>
+              <a:spcBef>
+                <a:spcPts val="0"/>
+              </a:spcBef>
+              <a:spcAft>
+                <a:spcPts val="0"/>
+              </a:spcAft>
+              <a:buClr>
+                <a:schemeClr val="dk1"/>
+              </a:buClr>
+              <a:buSzPts val="1100"/>
+              <a:buChar char="●"/>
+            </a:pPr>
+            <a:r>
+              <a:rPr lang="pt-BR" sz="1100">
+                <a:solidFill>
+                  <a:schemeClr val="dk1"/>
+                </a:solidFill>
+              </a:rPr>
+              <a:t>Analisar criação de Pasta</a:t>
+            </a:r>
+            <a:endParaRPr b="0" i="0" sz="1100" u="none" cap="none" strike="noStrike">
+              <a:solidFill>
+                <a:srgbClr val="000000"/>
+              </a:solidFill>
+              <a:highlight>
+                <a:srgbClr val="FFFF00"/>
+              </a:highlight>
+              <a:latin typeface="Arial"/>
+              <a:ea typeface="Arial"/>
+              <a:cs typeface="Arial"/>
+              <a:sym typeface="Arial"/>
+            </a:endParaRPr>
+          </a:p>
+        </p:txBody>
+      </p:sp>
+      <p:sp>
+        <p:nvSpPr>
+          <p:cNvPr id="143" name="Google Shape;143;p17"/>
+          <p:cNvSpPr/>
+          <p:nvPr/>
+        </p:nvSpPr>
+        <p:spPr>
+          <a:xfrm>
+            <a:off x="6518787" y="2630863"/>
+            <a:ext cx="1259100" cy="531600"/>
+          </a:xfrm>
+          <a:prstGeom prst="roundRect">
+            <a:avLst>
+              <a:gd fmla="val 16667" name="adj"/>
+            </a:avLst>
+          </a:prstGeom>
+          <a:gradFill>
+            <a:gsLst>
+              <a:gs pos="0">
+                <a:srgbClr val="D4E5F5"/>
+              </a:gs>
+              <a:gs pos="100000">
+                <a:srgbClr val="70A4D5"/>
+              </a:gs>
+            </a:gsLst>
+            <a:path path="circle">
+              <a:fillToRect b="50%" l="50%" r="50%" t="50%"/>
+            </a:path>
+            <a:tileRect/>
+          </a:gradFill>
+          <a:ln cap="flat" cmpd="sng" w="9525">
+            <a:solidFill>
+              <a:srgbClr val="F3F3F3"/>
+            </a:solidFill>
+            <a:prstDash val="solid"/>
+            <a:round/>
+            <a:headEnd len="sm" w="sm" type="none"/>
+            <a:tailEnd len="sm" w="sm" type="none"/>
+          </a:ln>
+        </p:spPr>
+        <p:txBody>
+          <a:bodyPr anchorCtr="0" anchor="ctr" bIns="91425" lIns="91425" spcFirstLastPara="1" rIns="91425" wrap="square" tIns="91425">
+            <a:noAutofit/>
+          </a:bodyPr>
+          <a:lstStyle/>
+          <a:p>
+            <a:pPr indent="0" lvl="0" marL="0" marR="0" rtl="0" algn="ctr">
+              <a:lnSpc>
+                <a:spcPct val="100000"/>
+              </a:lnSpc>
+              <a:spcBef>
+                <a:spcPts val="0"/>
+              </a:spcBef>
+              <a:spcAft>
+                <a:spcPts val="0"/>
+              </a:spcAft>
+              <a:buClr>
+                <a:srgbClr val="000000"/>
+              </a:buClr>
+              <a:buSzPts val="1000"/>
+              <a:buFont typeface="Arial"/>
+              <a:buNone/>
+            </a:pPr>
+            <a:r>
+              <a:rPr lang="pt-BR" sz="1000"/>
+              <a:t>Administrativo</a:t>
+            </a:r>
+            <a:endParaRPr sz="1000"/>
+          </a:p>
+        </p:txBody>
+      </p:sp>
+      <p:cxnSp>
+        <p:nvCxnSpPr>
+          <p:cNvPr id="147" name="Google Shape;147;p17"/>
+          <p:cNvCxnSpPr>
+            <a:stCxn id="146" idx="3"/>
+            <a:endCxn id="143" idx="2"/>
+          </p:cNvCxnSpPr>
+          <p:nvPr/>
+        </p:nvCxnSpPr>
+        <p:spPr>
+          <a:xfrm rot="10800000">
+            <a:off x="7148450" y="3162325"/>
+            <a:ext cx="397200" cy="1254900"/>
+          </a:xfrm>
+          <a:prstGeom prst="curvedConnector4">
+            <a:avLst>
+              <a:gd fmla="val -59951" name="adj1"/>
+              <a:gd fmla="val 62402" name="adj2"/>
+            </a:avLst>
+          </a:prstGeom>
+          <a:noFill/>
+          <a:ln cap="flat" cmpd="sng" w="9525">
+            <a:solidFill>
+              <a:schemeClr val="dk2"/>
+            </a:solidFill>
+            <a:prstDash val="solid"/>
+            <a:round/>
+            <a:headEnd len="med" w="med" type="none"/>
+            <a:tailEnd len="med" w="med" type="none"/>
+          </a:ln>
+        </p:spPr>
+      </p:cxnSp>
+      <p:cxnSp>
+        <p:nvCxnSpPr>
+          <p:cNvPr id="148" name="Google Shape;148;p17"/>
+          <p:cNvCxnSpPr>
+            <a:stCxn id="149" idx="0"/>
+            <a:endCxn id="132" idx="2"/>
+          </p:cNvCxnSpPr>
+          <p:nvPr/>
+        </p:nvCxnSpPr>
+        <p:spPr>
+          <a:xfrm rot="-5400000">
+            <a:off x="3581199" y="1653625"/>
+            <a:ext cx="1716300" cy="146700"/>
+          </a:xfrm>
+          <a:prstGeom prst="curvedConnector3">
+            <a:avLst>
+              <a:gd fmla="val 47184" name="adj1"/>
+            </a:avLst>
+          </a:prstGeom>
+          <a:noFill/>
+          <a:ln cap="flat" cmpd="sng" w="9525">
+            <a:solidFill>
+              <a:srgbClr val="595959"/>
+            </a:solidFill>
+            <a:prstDash val="solid"/>
+            <a:round/>
+            <a:headEnd len="sm" w="sm" type="none"/>
+            <a:tailEnd len="sm" w="sm" type="none"/>
+          </a:ln>
+        </p:spPr>
+      </p:cxnSp>
+      <p:sp>
+        <p:nvSpPr>
+          <p:cNvPr id="150" name="Google Shape;150;p17"/>
+          <p:cNvSpPr/>
+          <p:nvPr/>
+        </p:nvSpPr>
+        <p:spPr>
+          <a:xfrm>
+            <a:off x="1070100" y="4105825"/>
+            <a:ext cx="2394000" cy="622800"/>
           </a:xfrm>
           <a:prstGeom prst="bracketPair">
             <a:avLst/>
@@ -9502,55 +9653,381 @@
             </a:pPr>
             <a:r>
               <a:rPr lang="pt-BR" sz="1000"/>
-              <a:t>Criar pasta com a solicitação</a:t>
-            </a:r>
-            <a:endParaRPr sz="1000"/>
-          </a:p>
-          <a:p>
-            <a:pPr indent="-292100" lvl="0" marL="457200" marR="0" rtl="0" algn="l">
-              <a:lnSpc>
-                <a:spcPct val="100000"/>
-              </a:lnSpc>
-              <a:spcBef>
-                <a:spcPts val="0"/>
-              </a:spcBef>
-              <a:spcAft>
-                <a:spcPts val="0"/>
-              </a:spcAft>
-              <a:buSzPts val="1000"/>
-              <a:buChar char="●"/>
-            </a:pPr>
-            <a:r>
-              <a:rPr lang="pt-BR" sz="1000"/>
-              <a:t>Votar nas pastas de interesse</a:t>
-            </a:r>
-            <a:endParaRPr sz="1000"/>
-          </a:p>
-          <a:p>
-            <a:pPr indent="-292100" lvl="0" marL="457200" marR="0" rtl="0" algn="l">
-              <a:lnSpc>
-                <a:spcPct val="100000"/>
-              </a:lnSpc>
-              <a:spcBef>
-                <a:spcPts val="0"/>
-              </a:spcBef>
-              <a:spcAft>
-                <a:spcPts val="0"/>
-              </a:spcAft>
-              <a:buSzPts val="1000"/>
-              <a:buChar char="●"/>
-            </a:pPr>
-            <a:r>
-              <a:rPr lang="pt-BR" sz="1000"/>
-              <a:t>Participar nas pasta de interesse</a:t>
+              <a:t>Solicitar criação de Pasta</a:t>
             </a:r>
             <a:endParaRPr sz="1000"/>
           </a:p>
         </p:txBody>
       </p:sp>
+      <p:cxnSp>
+        <p:nvCxnSpPr>
+          <p:cNvPr id="151" name="Google Shape;151;p17"/>
+          <p:cNvCxnSpPr>
+            <a:stCxn id="150" idx="3"/>
+            <a:endCxn id="149" idx="2"/>
+          </p:cNvCxnSpPr>
+          <p:nvPr/>
+        </p:nvCxnSpPr>
+        <p:spPr>
+          <a:xfrm flipH="1" rot="10800000">
+            <a:off x="3464100" y="3116725"/>
+            <a:ext cx="901800" cy="1300500"/>
+          </a:xfrm>
+          <a:prstGeom prst="curvedConnector2">
+            <a:avLst/>
+          </a:prstGeom>
+          <a:noFill/>
+          <a:ln cap="flat" cmpd="sng" w="9525">
+            <a:solidFill>
+              <a:srgbClr val="595959"/>
+            </a:solidFill>
+            <a:prstDash val="solid"/>
+            <a:round/>
+            <a:headEnd len="sm" w="sm" type="none"/>
+            <a:tailEnd len="sm" w="sm" type="none"/>
+          </a:ln>
+        </p:spPr>
+      </p:cxnSp>
       <p:sp>
         <p:nvSpPr>
-          <p:cNvPr id="144" name="Google Shape;144;p17"/>
+          <p:cNvPr id="149" name="Google Shape;149;p17"/>
+          <p:cNvSpPr/>
+          <p:nvPr/>
+        </p:nvSpPr>
+        <p:spPr>
+          <a:xfrm>
+            <a:off x="3736449" y="2585125"/>
+            <a:ext cx="1259100" cy="531600"/>
+          </a:xfrm>
+          <a:prstGeom prst="roundRect">
+            <a:avLst>
+              <a:gd fmla="val 16667" name="adj"/>
+            </a:avLst>
+          </a:prstGeom>
+          <a:gradFill>
+            <a:gsLst>
+              <a:gs pos="0">
+                <a:srgbClr val="D4E5F5"/>
+              </a:gs>
+              <a:gs pos="100000">
+                <a:srgbClr val="70A4D5"/>
+              </a:gs>
+            </a:gsLst>
+            <a:path path="circle">
+              <a:fillToRect b="50%" l="50%" r="50%" t="50%"/>
+            </a:path>
+            <a:tileRect/>
+          </a:gradFill>
+          <a:ln cap="flat" cmpd="sng" w="9525">
+            <a:solidFill>
+              <a:srgbClr val="F3F3F3"/>
+            </a:solidFill>
+            <a:prstDash val="solid"/>
+            <a:round/>
+            <a:headEnd len="sm" w="sm" type="none"/>
+            <a:tailEnd len="sm" w="sm" type="none"/>
+          </a:ln>
+        </p:spPr>
+        <p:txBody>
+          <a:bodyPr anchorCtr="0" anchor="ctr" bIns="91425" lIns="91425" spcFirstLastPara="1" rIns="91425" wrap="square" tIns="91425">
+            <a:noAutofit/>
+          </a:bodyPr>
+          <a:lstStyle/>
+          <a:p>
+            <a:pPr indent="0" lvl="0" marL="0" rtl="0" algn="ctr">
+              <a:spcBef>
+                <a:spcPts val="0"/>
+              </a:spcBef>
+              <a:spcAft>
+                <a:spcPts val="0"/>
+              </a:spcAft>
+              <a:buClr>
+                <a:schemeClr val="dk1"/>
+              </a:buClr>
+              <a:buSzPts val="1000"/>
+              <a:buFont typeface="Arial"/>
+              <a:buNone/>
+            </a:pPr>
+            <a:r>
+              <a:rPr lang="pt-BR" sz="1000">
+                <a:solidFill>
+                  <a:schemeClr val="dk1"/>
+                </a:solidFill>
+              </a:rPr>
+              <a:t>Operacional</a:t>
+            </a:r>
+            <a:endParaRPr b="0" i="0" sz="1000" u="none" cap="none" strike="noStrike">
+              <a:solidFill>
+                <a:srgbClr val="000000"/>
+              </a:solidFill>
+              <a:latin typeface="Arial"/>
+              <a:ea typeface="Arial"/>
+              <a:cs typeface="Arial"/>
+              <a:sym typeface="Arial"/>
+            </a:endParaRPr>
+          </a:p>
+        </p:txBody>
+      </p:sp>
+    </p:spTree>
+  </p:cSld>
+  <p:clrMapOvr>
+    <a:masterClrMapping/>
+  </p:clrMapOvr>
+</p:sld>
+</file>
+
+<file path=ppt/slides/slide6.xml><?xml version="1.0" encoding="utf-8"?>
+<p:sld xmlns:a="http://schemas.openxmlformats.org/drawingml/2006/main" xmlns:r="http://schemas.openxmlformats.org/officeDocument/2006/relationships" xmlns:mc="http://schemas.openxmlformats.org/markup-compatibility/2006" xmlns:mv="urn:schemas-microsoft-com:mac:vml" xmlns:p="http://schemas.openxmlformats.org/presentationml/2006/main" xmlns:c="http://schemas.openxmlformats.org/drawingml/2006/chart" xmlns:dgm="http://schemas.openxmlformats.org/drawingml/2006/diagram" xmlns:o="urn:schemas-microsoft-com:office:office" xmlns:v="urn:schemas-microsoft-com:vml" xmlns:pvml="urn:schemas-microsoft-com:office:powerpoint" xmlns:com="http://schemas.openxmlformats.org/drawingml/2006/compatibility" xmlns:p14="http://schemas.microsoft.com/office/powerpoint/2010/main" xmlns:p15="http://schemas.microsoft.com/office/powerpoint/2012/main">
+  <p:cSld>
+    <p:spTree>
+      <p:nvGrpSpPr>
+        <p:cNvPr id="155" name="Shape 155"/>
+        <p:cNvGrpSpPr/>
+        <p:nvPr/>
+      </p:nvGrpSpPr>
+      <p:grpSpPr>
+        <a:xfrm>
+          <a:off x="0" y="0"/>
+          <a:ext cx="0" cy="0"/>
+          <a:chOff x="0" y="0"/>
+          <a:chExt cx="0" cy="0"/>
+        </a:xfrm>
+      </p:grpSpPr>
+      <p:sp>
+        <p:nvSpPr>
+          <p:cNvPr id="156" name="Google Shape;156;p18"/>
+          <p:cNvSpPr/>
+          <p:nvPr/>
+        </p:nvSpPr>
+        <p:spPr>
+          <a:xfrm>
+            <a:off x="3521850" y="136875"/>
+            <a:ext cx="2100300" cy="802800"/>
+          </a:xfrm>
+          <a:prstGeom prst="wave">
+            <a:avLst>
+              <a:gd fmla="val 12500" name="adj1"/>
+              <a:gd fmla="val 0" name="adj2"/>
+            </a:avLst>
+          </a:prstGeom>
+          <a:solidFill>
+            <a:schemeClr val="lt2"/>
+          </a:solidFill>
+          <a:ln cap="flat" cmpd="sng" w="9525">
+            <a:solidFill>
+              <a:schemeClr val="dk2"/>
+            </a:solidFill>
+            <a:prstDash val="solid"/>
+            <a:round/>
+            <a:headEnd len="sm" w="sm" type="none"/>
+            <a:tailEnd len="sm" w="sm" type="none"/>
+          </a:ln>
+        </p:spPr>
+        <p:txBody>
+          <a:bodyPr anchorCtr="0" anchor="ctr" bIns="91425" lIns="91425" spcFirstLastPara="1" rIns="91425" wrap="square" tIns="91425">
+            <a:noAutofit/>
+          </a:bodyPr>
+          <a:lstStyle/>
+          <a:p>
+            <a:pPr indent="0" lvl="0" marL="0" rtl="0" algn="ctr">
+              <a:spcBef>
+                <a:spcPts val="0"/>
+              </a:spcBef>
+              <a:spcAft>
+                <a:spcPts val="0"/>
+              </a:spcAft>
+              <a:buNone/>
+            </a:pPr>
+            <a:r>
+              <a:rPr lang="pt-BR" sz="1000">
+                <a:solidFill>
+                  <a:schemeClr val="dk1"/>
+                </a:solidFill>
+              </a:rPr>
+              <a:t>Receber relatórios de Estudos</a:t>
+            </a:r>
+            <a:endParaRPr/>
+          </a:p>
+        </p:txBody>
+      </p:sp>
+      <p:sp>
+        <p:nvSpPr>
+          <p:cNvPr id="157" name="Google Shape;157;p18"/>
+          <p:cNvSpPr txBox="1"/>
+          <p:nvPr/>
+        </p:nvSpPr>
+        <p:spPr>
+          <a:xfrm>
+            <a:off x="300750" y="2131525"/>
+            <a:ext cx="8542500" cy="1367400"/>
+          </a:xfrm>
+          <a:prstGeom prst="rect">
+            <a:avLst/>
+          </a:prstGeom>
+          <a:noFill/>
+          <a:ln cap="flat" cmpd="sng" w="9525">
+            <a:solidFill>
+              <a:srgbClr val="FF9900"/>
+            </a:solidFill>
+            <a:prstDash val="solid"/>
+            <a:round/>
+            <a:headEnd len="sm" w="sm" type="none"/>
+            <a:tailEnd len="sm" w="sm" type="none"/>
+          </a:ln>
+        </p:spPr>
+        <p:txBody>
+          <a:bodyPr anchorCtr="0" anchor="t" bIns="91425" lIns="91425" spcFirstLastPara="1" rIns="91425" wrap="square" tIns="91425">
+            <a:noAutofit/>
+          </a:bodyPr>
+          <a:lstStyle/>
+          <a:p>
+            <a:pPr indent="0" lvl="0" marL="0" marR="0" rtl="0" algn="l">
+              <a:lnSpc>
+                <a:spcPct val="100000"/>
+              </a:lnSpc>
+              <a:spcBef>
+                <a:spcPts val="0"/>
+              </a:spcBef>
+              <a:spcAft>
+                <a:spcPts val="0"/>
+              </a:spcAft>
+              <a:buClr>
+                <a:srgbClr val="000000"/>
+              </a:buClr>
+              <a:buSzPts val="1400"/>
+              <a:buFont typeface="Arial"/>
+              <a:buNone/>
+            </a:pPr>
+            <a:r>
+              <a:rPr b="0" i="0" lang="pt-BR" sz="1400" u="none" cap="none" strike="noStrike">
+                <a:solidFill>
+                  <a:srgbClr val="000000"/>
+                </a:solidFill>
+                <a:latin typeface="Arial"/>
+                <a:ea typeface="Arial"/>
+                <a:cs typeface="Arial"/>
+                <a:sym typeface="Arial"/>
+              </a:rPr>
+              <a:t>Nós Operacionais</a:t>
+            </a:r>
+            <a:endParaRPr b="0" i="0" sz="1400" u="none" cap="none" strike="noStrike">
+              <a:solidFill>
+                <a:srgbClr val="000000"/>
+              </a:solidFill>
+              <a:latin typeface="Arial"/>
+              <a:ea typeface="Arial"/>
+              <a:cs typeface="Arial"/>
+              <a:sym typeface="Arial"/>
+            </a:endParaRPr>
+          </a:p>
+        </p:txBody>
+      </p:sp>
+      <p:cxnSp>
+        <p:nvCxnSpPr>
+          <p:cNvPr id="158" name="Google Shape;158;p18"/>
+          <p:cNvCxnSpPr>
+            <a:stCxn id="159" idx="0"/>
+            <a:endCxn id="156" idx="2"/>
+          </p:cNvCxnSpPr>
+          <p:nvPr/>
+        </p:nvCxnSpPr>
+        <p:spPr>
+          <a:xfrm rot="-5400000">
+            <a:off x="3625399" y="1578100"/>
+            <a:ext cx="1685400" cy="207600"/>
+          </a:xfrm>
+          <a:prstGeom prst="curvedConnector3">
+            <a:avLst>
+              <a:gd fmla="val 47132" name="adj1"/>
+            </a:avLst>
+          </a:prstGeom>
+          <a:noFill/>
+          <a:ln cap="flat" cmpd="sng" w="9525">
+            <a:solidFill>
+              <a:srgbClr val="595959"/>
+            </a:solidFill>
+            <a:prstDash val="solid"/>
+            <a:round/>
+            <a:headEnd len="sm" w="sm" type="none"/>
+            <a:tailEnd len="sm" w="sm" type="none"/>
+          </a:ln>
+        </p:spPr>
+      </p:cxnSp>
+      <p:sp>
+        <p:nvSpPr>
+          <p:cNvPr id="160" name="Google Shape;160;p18"/>
+          <p:cNvSpPr txBox="1"/>
+          <p:nvPr/>
+        </p:nvSpPr>
+        <p:spPr>
+          <a:xfrm>
+            <a:off x="300750" y="3498922"/>
+            <a:ext cx="8542500" cy="1367400"/>
+          </a:xfrm>
+          <a:prstGeom prst="rect">
+            <a:avLst/>
+          </a:prstGeom>
+          <a:noFill/>
+          <a:ln cap="flat" cmpd="sng" w="9525">
+            <a:solidFill>
+              <a:srgbClr val="FF9900"/>
+            </a:solidFill>
+            <a:prstDash val="solid"/>
+            <a:round/>
+            <a:headEnd len="sm" w="sm" type="none"/>
+            <a:tailEnd len="sm" w="sm" type="none"/>
+          </a:ln>
+        </p:spPr>
+        <p:txBody>
+          <a:bodyPr anchorCtr="0" anchor="t" bIns="91425" lIns="91425" spcFirstLastPara="1" rIns="91425" wrap="square" tIns="91425">
+            <a:noAutofit/>
+          </a:bodyPr>
+          <a:lstStyle/>
+          <a:p>
+            <a:pPr indent="0" lvl="0" marL="0" marR="0" rtl="0" algn="l">
+              <a:lnSpc>
+                <a:spcPct val="100000"/>
+              </a:lnSpc>
+              <a:spcBef>
+                <a:spcPts val="0"/>
+              </a:spcBef>
+              <a:spcAft>
+                <a:spcPts val="0"/>
+              </a:spcAft>
+              <a:buClr>
+                <a:srgbClr val="000000"/>
+              </a:buClr>
+              <a:buSzPts val="1400"/>
+              <a:buFont typeface="Arial"/>
+              <a:buNone/>
+            </a:pPr>
+            <a:r>
+              <a:rPr b="0" i="0" lang="pt-BR" sz="1400" u="none" cap="none" strike="noStrike">
+                <a:solidFill>
+                  <a:srgbClr val="000000"/>
+                </a:solidFill>
+                <a:latin typeface="Arial"/>
+                <a:ea typeface="Arial"/>
+                <a:cs typeface="Arial"/>
+                <a:sym typeface="Arial"/>
+              </a:rPr>
+              <a:t>Capacidades Operacionais</a:t>
+            </a:r>
+            <a:endParaRPr b="0" i="0" sz="1400" u="none" cap="none" strike="noStrike">
+              <a:solidFill>
+                <a:srgbClr val="000000"/>
+              </a:solidFill>
+              <a:latin typeface="Arial"/>
+              <a:ea typeface="Arial"/>
+              <a:cs typeface="Arial"/>
+              <a:sym typeface="Arial"/>
+            </a:endParaRPr>
+          </a:p>
+        </p:txBody>
+      </p:sp>
+      <p:sp>
+        <p:nvSpPr>
+          <p:cNvPr id="159" name="Google Shape;159;p18"/>
           <p:cNvSpPr/>
           <p:nvPr/>
         </p:nvSpPr>
@@ -9594,10 +10071,7 @@
           </a:bodyPr>
           <a:lstStyle/>
           <a:p>
-            <a:pPr indent="0" lvl="0" marL="0" marR="0" rtl="0" algn="ctr">
-              <a:lnSpc>
-                <a:spcPct val="100000"/>
-              </a:lnSpc>
+            <a:pPr indent="0" lvl="0" marL="0" rtl="0" algn="ctr">
               <a:spcBef>
                 <a:spcPts val="0"/>
               </a:spcBef>
@@ -9605,15 +10079,19 @@
                 <a:spcPts val="0"/>
               </a:spcAft>
               <a:buClr>
-                <a:srgbClr val="000000"/>
+                <a:schemeClr val="dk1"/>
               </a:buClr>
               <a:buSzPts val="1000"/>
               <a:buFont typeface="Arial"/>
               <a:buNone/>
             </a:pPr>
             <a:r>
-              <a:rPr lang="pt-BR" sz="1000"/>
-              <a:t>Aplicação mobile</a:t>
+              <a:rPr lang="pt-BR" sz="1000">
+                <a:solidFill>
+                  <a:schemeClr val="dk1"/>
+                </a:solidFill>
+              </a:rPr>
+              <a:t>Administrativo</a:t>
             </a:r>
             <a:endParaRPr b="0" i="0" sz="1000" u="none" cap="none" strike="noStrike">
               <a:solidFill>
@@ -9629,19 +10107,19 @@
       </p:sp>
       <p:cxnSp>
         <p:nvCxnSpPr>
-          <p:cNvPr id="148" name="Google Shape;148;p17"/>
-          <p:cNvCxnSpPr/>
+          <p:cNvPr id="161" name="Google Shape;161;p18"/>
+          <p:cNvCxnSpPr>
+            <a:endCxn id="156" idx="2"/>
+          </p:cNvCxnSpPr>
           <p:nvPr/>
         </p:nvCxnSpPr>
         <p:spPr>
           <a:xfrm rot="10800000">
-            <a:off x="4737355" y="1589976"/>
-            <a:ext cx="1964100" cy="810000"/>
+            <a:off x="4572000" y="839325"/>
+            <a:ext cx="2129400" cy="1560600"/>
           </a:xfrm>
-          <a:prstGeom prst="curvedConnector3">
-            <a:avLst>
-              <a:gd fmla="val 0" name="adj1"/>
-            </a:avLst>
+          <a:prstGeom prst="curvedConnector2">
+            <a:avLst/>
           </a:prstGeom>
           <a:noFill/>
           <a:ln cap="flat" cmpd="sng" w="9525">
@@ -9657,7 +10135,7 @@
       </p:cxnSp>
       <p:grpSp>
         <p:nvGrpSpPr>
-          <p:cNvPr id="149" name="Google Shape;149;p17"/>
+          <p:cNvPr id="162" name="Google Shape;162;p18"/>
           <p:cNvGrpSpPr/>
           <p:nvPr/>
         </p:nvGrpSpPr>
@@ -9671,7 +10149,7 @@
         </p:grpSpPr>
         <p:grpSp>
           <p:nvGrpSpPr>
-            <p:cNvPr id="150" name="Google Shape;150;p17"/>
+            <p:cNvPr id="163" name="Google Shape;163;p18"/>
             <p:cNvGrpSpPr/>
             <p:nvPr/>
           </p:nvGrpSpPr>
@@ -9685,7 +10163,7 @@
           </p:grpSpPr>
           <p:sp>
             <p:nvSpPr>
-              <p:cNvPr id="151" name="Google Shape;151;p17"/>
+              <p:cNvPr id="164" name="Google Shape;164;p18"/>
               <p:cNvSpPr/>
               <p:nvPr/>
             </p:nvSpPr>
@@ -9750,9 +10228,9 @@
           </p:sp>
           <p:cxnSp>
             <p:nvCxnSpPr>
-              <p:cNvPr id="152" name="Google Shape;152;p17"/>
+              <p:cNvPr id="165" name="Google Shape;165;p18"/>
               <p:cNvCxnSpPr>
-                <a:stCxn id="151" idx="4"/>
+                <a:stCxn id="164" idx="4"/>
               </p:cNvCxnSpPr>
               <p:nvPr/>
             </p:nvCxnSpPr>
@@ -9778,7 +10256,7 @@
           </p:cxnSp>
           <p:cxnSp>
             <p:nvCxnSpPr>
-              <p:cNvPr id="153" name="Google Shape;153;p17"/>
+              <p:cNvPr id="166" name="Google Shape;166;p18"/>
               <p:cNvCxnSpPr/>
               <p:nvPr/>
             </p:nvCxnSpPr>
@@ -9804,7 +10282,7 @@
           </p:cxnSp>
           <p:cxnSp>
             <p:nvCxnSpPr>
-              <p:cNvPr id="154" name="Google Shape;154;p17"/>
+              <p:cNvPr id="167" name="Google Shape;167;p18"/>
               <p:cNvCxnSpPr/>
               <p:nvPr/>
             </p:nvCxnSpPr>
@@ -9830,7 +10308,7 @@
           </p:cxnSp>
           <p:cxnSp>
             <p:nvCxnSpPr>
-              <p:cNvPr id="155" name="Google Shape;155;p17"/>
+              <p:cNvPr id="168" name="Google Shape;168;p18"/>
               <p:cNvCxnSpPr/>
               <p:nvPr/>
             </p:nvCxnSpPr>
@@ -9857,7 +10335,7 @@
         </p:grpSp>
         <p:sp>
           <p:nvSpPr>
-            <p:cNvPr id="156" name="Google Shape;156;p17"/>
+            <p:cNvPr id="169" name="Google Shape;169;p18"/>
             <p:cNvSpPr txBox="1"/>
             <p:nvPr/>
           </p:nvSpPr>
@@ -9865,478 +10343,6 @@
             <a:xfrm>
               <a:off x="6521198" y="3706236"/>
               <a:ext cx="1534800" cy="342900"/>
-            </a:xfrm>
-            <a:prstGeom prst="rect">
-              <a:avLst/>
-            </a:prstGeom>
-            <a:noFill/>
-            <a:ln>
-              <a:noFill/>
-            </a:ln>
-          </p:spPr>
-          <p:txBody>
-            <a:bodyPr anchorCtr="0" anchor="t" bIns="91425" lIns="91425" spcFirstLastPara="1" rIns="91425" wrap="square" tIns="91425">
-              <a:noAutofit/>
-            </a:bodyPr>
-            <a:lstStyle/>
-            <a:p>
-              <a:pPr indent="0" lvl="0" marL="0" marR="0" rtl="0" algn="l">
-                <a:lnSpc>
-                  <a:spcPct val="100000"/>
-                </a:lnSpc>
-                <a:spcBef>
-                  <a:spcPts val="0"/>
-                </a:spcBef>
-                <a:spcAft>
-                  <a:spcPts val="0"/>
-                </a:spcAft>
-                <a:buClr>
-                  <a:srgbClr val="000000"/>
-                </a:buClr>
-                <a:buSzPts val="1200"/>
-                <a:buFont typeface="Arial"/>
-                <a:buNone/>
-              </a:pPr>
-              <a:r>
-                <a:rPr b="1" lang="pt-BR" sz="1200"/>
-                <a:t>Administradores</a:t>
-              </a:r>
-              <a:endParaRPr b="1" i="0" sz="1200" u="none" cap="none" strike="noStrike">
-                <a:solidFill>
-                  <a:srgbClr val="000000"/>
-                </a:solidFill>
-                <a:latin typeface="Arial"/>
-                <a:ea typeface="Arial"/>
-                <a:cs typeface="Arial"/>
-                <a:sym typeface="Arial"/>
-              </a:endParaRPr>
-            </a:p>
-          </p:txBody>
-        </p:sp>
-      </p:grpSp>
-      <p:cxnSp>
-        <p:nvCxnSpPr>
-          <p:cNvPr id="157" name="Google Shape;157;p17"/>
-          <p:cNvCxnSpPr>
-            <a:endCxn id="133" idx="2"/>
-          </p:cNvCxnSpPr>
-          <p:nvPr/>
-        </p:nvCxnSpPr>
-        <p:spPr>
-          <a:xfrm flipH="1" rot="5400000">
-            <a:off x="4320175" y="1169775"/>
-            <a:ext cx="735900" cy="75000"/>
-          </a:xfrm>
-          <a:prstGeom prst="curvedConnector3">
-            <a:avLst>
-              <a:gd fmla="val 45142" name="adj1"/>
-            </a:avLst>
-          </a:prstGeom>
-          <a:noFill/>
-          <a:ln cap="flat" cmpd="sng" w="9525">
-            <a:solidFill>
-              <a:schemeClr val="dk2"/>
-            </a:solidFill>
-            <a:prstDash val="solid"/>
-            <a:round/>
-            <a:headEnd len="med" w="med" type="none"/>
-            <a:tailEnd len="med" w="med" type="none"/>
-          </a:ln>
-        </p:spPr>
-      </p:cxnSp>
-      <p:cxnSp>
-        <p:nvCxnSpPr>
-          <p:cNvPr id="158" name="Google Shape;158;p17"/>
-          <p:cNvCxnSpPr>
-            <a:stCxn id="144" idx="2"/>
-            <a:endCxn id="147" idx="3"/>
-          </p:cNvCxnSpPr>
-          <p:nvPr/>
-        </p:nvCxnSpPr>
-        <p:spPr>
-          <a:xfrm rot="5400000">
-            <a:off x="3253099" y="3225100"/>
-            <a:ext cx="1280100" cy="942300"/>
-          </a:xfrm>
-          <a:prstGeom prst="curvedConnector2">
-            <a:avLst/>
-          </a:prstGeom>
-          <a:noFill/>
-          <a:ln cap="flat" cmpd="sng" w="9525">
-            <a:solidFill>
-              <a:schemeClr val="dk2"/>
-            </a:solidFill>
-            <a:prstDash val="solid"/>
-            <a:round/>
-            <a:headEnd len="med" w="med" type="none"/>
-            <a:tailEnd len="med" w="med" type="none"/>
-          </a:ln>
-        </p:spPr>
-      </p:cxnSp>
-    </p:spTree>
-  </p:cSld>
-  <p:clrMapOvr>
-    <a:masterClrMapping/>
-  </p:clrMapOvr>
-</p:sld>
-</file>
-
-<file path=ppt/slides/slide6.xml><?xml version="1.0" encoding="utf-8"?>
-<p:sld xmlns:a="http://schemas.openxmlformats.org/drawingml/2006/main" xmlns:r="http://schemas.openxmlformats.org/officeDocument/2006/relationships" xmlns:mc="http://schemas.openxmlformats.org/markup-compatibility/2006" xmlns:mv="urn:schemas-microsoft-com:mac:vml" xmlns:p="http://schemas.openxmlformats.org/presentationml/2006/main" xmlns:c="http://schemas.openxmlformats.org/drawingml/2006/chart" xmlns:dgm="http://schemas.openxmlformats.org/drawingml/2006/diagram" xmlns:o="urn:schemas-microsoft-com:office:office" xmlns:v="urn:schemas-microsoft-com:vml" xmlns:pvml="urn:schemas-microsoft-com:office:powerpoint" xmlns:com="http://schemas.openxmlformats.org/drawingml/2006/compatibility" xmlns:p14="http://schemas.microsoft.com/office/powerpoint/2010/main" xmlns:p15="http://schemas.microsoft.com/office/powerpoint/2012/main">
-  <p:cSld>
-    <p:spTree>
-      <p:nvGrpSpPr>
-        <p:cNvPr id="162" name="Shape 162"/>
-        <p:cNvGrpSpPr/>
-        <p:nvPr/>
-      </p:nvGrpSpPr>
-      <p:grpSpPr>
-        <a:xfrm>
-          <a:off x="0" y="0"/>
-          <a:ext cx="0" cy="0"/>
-          <a:chOff x="0" y="0"/>
-          <a:chExt cx="0" cy="0"/>
-        </a:xfrm>
-      </p:grpSpPr>
-      <p:sp>
-        <p:nvSpPr>
-          <p:cNvPr id="163" name="Google Shape;163;p18"/>
-          <p:cNvSpPr/>
-          <p:nvPr/>
-        </p:nvSpPr>
-        <p:spPr>
-          <a:xfrm>
-            <a:off x="3600475" y="136875"/>
-            <a:ext cx="2100300" cy="802800"/>
-          </a:xfrm>
-          <a:prstGeom prst="wave">
-            <a:avLst>
-              <a:gd fmla="val 12500" name="adj1"/>
-              <a:gd fmla="val 0" name="adj2"/>
-            </a:avLst>
-          </a:prstGeom>
-          <a:solidFill>
-            <a:schemeClr val="lt2"/>
-          </a:solidFill>
-          <a:ln cap="flat" cmpd="sng" w="9525">
-            <a:solidFill>
-              <a:schemeClr val="dk2"/>
-            </a:solidFill>
-            <a:prstDash val="solid"/>
-            <a:round/>
-            <a:headEnd len="sm" w="sm" type="none"/>
-            <a:tailEnd len="sm" w="sm" type="none"/>
-          </a:ln>
-        </p:spPr>
-        <p:txBody>
-          <a:bodyPr anchorCtr="0" anchor="ctr" bIns="91425" lIns="91425" spcFirstLastPara="1" rIns="91425" wrap="square" tIns="91425">
-            <a:noAutofit/>
-          </a:bodyPr>
-          <a:lstStyle/>
-          <a:p>
-            <a:pPr indent="0" lvl="0" marL="0" rtl="0" algn="ctr">
-              <a:spcBef>
-                <a:spcPts val="0"/>
-              </a:spcBef>
-              <a:spcAft>
-                <a:spcPts val="0"/>
-              </a:spcAft>
-              <a:buNone/>
-            </a:pPr>
-            <a:r>
-              <a:rPr lang="pt-BR"/>
-              <a:t>Processo de </a:t>
-            </a:r>
-            <a:r>
-              <a:rPr lang="pt-BR"/>
-              <a:t>Relatórios</a:t>
-            </a:r>
-            <a:endParaRPr/>
-          </a:p>
-        </p:txBody>
-      </p:sp>
-      <p:sp>
-        <p:nvSpPr>
-          <p:cNvPr id="164" name="Google Shape;164;p18"/>
-          <p:cNvSpPr txBox="1"/>
-          <p:nvPr/>
-        </p:nvSpPr>
-        <p:spPr>
-          <a:xfrm>
-            <a:off x="300750" y="2131525"/>
-            <a:ext cx="8542500" cy="1367400"/>
-          </a:xfrm>
-          <a:prstGeom prst="rect">
-            <a:avLst/>
-          </a:prstGeom>
-          <a:noFill/>
-          <a:ln cap="flat" cmpd="sng" w="9525">
-            <a:solidFill>
-              <a:srgbClr val="FF9900"/>
-            </a:solidFill>
-            <a:prstDash val="solid"/>
-            <a:round/>
-            <a:headEnd len="sm" w="sm" type="none"/>
-            <a:tailEnd len="sm" w="sm" type="none"/>
-          </a:ln>
-        </p:spPr>
-        <p:txBody>
-          <a:bodyPr anchorCtr="0" anchor="t" bIns="91425" lIns="91425" spcFirstLastPara="1" rIns="91425" wrap="square" tIns="91425">
-            <a:noAutofit/>
-          </a:bodyPr>
-          <a:lstStyle/>
-          <a:p>
-            <a:pPr indent="0" lvl="0" marL="0" marR="0" rtl="0" algn="l">
-              <a:lnSpc>
-                <a:spcPct val="100000"/>
-              </a:lnSpc>
-              <a:spcBef>
-                <a:spcPts val="0"/>
-              </a:spcBef>
-              <a:spcAft>
-                <a:spcPts val="0"/>
-              </a:spcAft>
-              <a:buClr>
-                <a:srgbClr val="000000"/>
-              </a:buClr>
-              <a:buSzPts val="1400"/>
-              <a:buFont typeface="Arial"/>
-              <a:buNone/>
-            </a:pPr>
-            <a:r>
-              <a:rPr b="0" i="0" lang="pt-BR" sz="1400" u="none" cap="none" strike="noStrike">
-                <a:solidFill>
-                  <a:srgbClr val="000000"/>
-                </a:solidFill>
-                <a:latin typeface="Arial"/>
-                <a:ea typeface="Arial"/>
-                <a:cs typeface="Arial"/>
-                <a:sym typeface="Arial"/>
-              </a:rPr>
-              <a:t>Nós Operacionais</a:t>
-            </a:r>
-            <a:endParaRPr b="0" i="0" sz="1400" u="none" cap="none" strike="noStrike">
-              <a:solidFill>
-                <a:srgbClr val="000000"/>
-              </a:solidFill>
-              <a:latin typeface="Arial"/>
-              <a:ea typeface="Arial"/>
-              <a:cs typeface="Arial"/>
-              <a:sym typeface="Arial"/>
-            </a:endParaRPr>
-          </a:p>
-        </p:txBody>
-      </p:sp>
-      <p:grpSp>
-        <p:nvGrpSpPr>
-          <p:cNvPr id="165" name="Google Shape;165;p18"/>
-          <p:cNvGrpSpPr/>
-          <p:nvPr/>
-        </p:nvGrpSpPr>
-        <p:grpSpPr>
-          <a:xfrm>
-            <a:off x="1503275" y="2574515"/>
-            <a:ext cx="1259100" cy="830485"/>
-            <a:chOff x="2699598" y="3424900"/>
-            <a:chExt cx="1259100" cy="830485"/>
-          </a:xfrm>
-        </p:grpSpPr>
-        <p:grpSp>
-          <p:nvGrpSpPr>
-            <p:cNvPr id="166" name="Google Shape;166;p18"/>
-            <p:cNvGrpSpPr/>
-            <p:nvPr/>
-          </p:nvGrpSpPr>
-          <p:grpSpPr>
-            <a:xfrm>
-              <a:off x="3206356" y="3424900"/>
-              <a:ext cx="308885" cy="587736"/>
-              <a:chOff x="1499725" y="1450825"/>
-              <a:chExt cx="497400" cy="843600"/>
-            </a:xfrm>
-          </p:grpSpPr>
-          <p:sp>
-            <p:nvSpPr>
-              <p:cNvPr id="167" name="Google Shape;167;p18"/>
-              <p:cNvSpPr/>
-              <p:nvPr/>
-            </p:nvSpPr>
-            <p:spPr>
-              <a:xfrm>
-                <a:off x="1597825" y="1450825"/>
-                <a:ext cx="313200" cy="281400"/>
-              </a:xfrm>
-              <a:prstGeom prst="flowChartConnector">
-                <a:avLst/>
-              </a:prstGeom>
-              <a:solidFill>
-                <a:srgbClr val="EEEEEE"/>
-              </a:solidFill>
-              <a:ln cap="flat" cmpd="sng" w="9525">
-                <a:solidFill>
-                  <a:srgbClr val="595959"/>
-                </a:solidFill>
-                <a:prstDash val="solid"/>
-                <a:round/>
-                <a:headEnd len="sm" w="sm" type="none"/>
-                <a:tailEnd len="sm" w="sm" type="none"/>
-              </a:ln>
-            </p:spPr>
-            <p:txBody>
-              <a:bodyPr anchorCtr="0" anchor="ctr" bIns="91425" lIns="91425" spcFirstLastPara="1" rIns="91425" wrap="square" tIns="91425">
-                <a:noAutofit/>
-              </a:bodyPr>
-              <a:lstStyle/>
-              <a:p>
-                <a:pPr indent="0" lvl="0" marL="0" marR="0" rtl="0" algn="l">
-                  <a:lnSpc>
-                    <a:spcPct val="100000"/>
-                  </a:lnSpc>
-                  <a:spcBef>
-                    <a:spcPts val="0"/>
-                  </a:spcBef>
-                  <a:spcAft>
-                    <a:spcPts val="0"/>
-                  </a:spcAft>
-                  <a:buClr>
-                    <a:srgbClr val="000000"/>
-                  </a:buClr>
-                  <a:buSzPts val="1400"/>
-                  <a:buFont typeface="Arial"/>
-                  <a:buNone/>
-                </a:pPr>
-                <a:r>
-                  <a:t/>
-                </a:r>
-                <a:endParaRPr b="0" i="0" sz="1400" u="none" cap="none" strike="noStrike">
-                  <a:solidFill>
-                    <a:srgbClr val="000000"/>
-                  </a:solidFill>
-                  <a:latin typeface="Arial"/>
-                  <a:ea typeface="Arial"/>
-                  <a:cs typeface="Arial"/>
-                  <a:sym typeface="Arial"/>
-                </a:endParaRPr>
-              </a:p>
-            </p:txBody>
-          </p:sp>
-          <p:cxnSp>
-            <p:nvCxnSpPr>
-              <p:cNvPr id="168" name="Google Shape;168;p18"/>
-              <p:cNvCxnSpPr>
-                <a:stCxn id="167" idx="4"/>
-              </p:cNvCxnSpPr>
-              <p:nvPr/>
-            </p:nvCxnSpPr>
-            <p:spPr>
-              <a:xfrm flipH="1">
-                <a:off x="1748725" y="1732225"/>
-                <a:ext cx="5700" cy="293100"/>
-              </a:xfrm>
-              <a:prstGeom prst="straightConnector1">
-                <a:avLst/>
-              </a:prstGeom>
-              <a:noFill/>
-              <a:ln cap="flat" cmpd="sng" w="9525">
-                <a:solidFill>
-                  <a:srgbClr val="595959"/>
-                </a:solidFill>
-                <a:prstDash val="solid"/>
-                <a:round/>
-                <a:headEnd len="sm" w="sm" type="none"/>
-                <a:tailEnd len="sm" w="sm" type="none"/>
-              </a:ln>
-            </p:spPr>
-          </p:cxnSp>
-          <p:cxnSp>
-            <p:nvCxnSpPr>
-              <p:cNvPr id="169" name="Google Shape;169;p18"/>
-              <p:cNvCxnSpPr/>
-              <p:nvPr/>
-            </p:nvCxnSpPr>
-            <p:spPr>
-              <a:xfrm>
-                <a:off x="1527475" y="1858775"/>
-                <a:ext cx="453900" cy="1800"/>
-              </a:xfrm>
-              <a:prstGeom prst="straightConnector1">
-                <a:avLst/>
-              </a:prstGeom>
-              <a:noFill/>
-              <a:ln cap="flat" cmpd="sng" w="9525">
-                <a:solidFill>
-                  <a:srgbClr val="595959"/>
-                </a:solidFill>
-                <a:prstDash val="solid"/>
-                <a:round/>
-                <a:headEnd len="sm" w="sm" type="none"/>
-                <a:tailEnd len="sm" w="sm" type="none"/>
-              </a:ln>
-            </p:spPr>
-          </p:cxnSp>
-          <p:cxnSp>
-            <p:nvCxnSpPr>
-              <p:cNvPr id="170" name="Google Shape;170;p18"/>
-              <p:cNvCxnSpPr/>
-              <p:nvPr/>
-            </p:nvCxnSpPr>
-            <p:spPr>
-              <a:xfrm flipH="1">
-                <a:off x="1499725" y="2022925"/>
-                <a:ext cx="248700" cy="271500"/>
-              </a:xfrm>
-              <a:prstGeom prst="straightConnector1">
-                <a:avLst/>
-              </a:prstGeom>
-              <a:noFill/>
-              <a:ln cap="flat" cmpd="sng" w="9525">
-                <a:solidFill>
-                  <a:srgbClr val="595959"/>
-                </a:solidFill>
-                <a:prstDash val="solid"/>
-                <a:round/>
-                <a:headEnd len="sm" w="sm" type="none"/>
-                <a:tailEnd len="sm" w="sm" type="none"/>
-              </a:ln>
-            </p:spPr>
-          </p:cxnSp>
-          <p:cxnSp>
-            <p:nvCxnSpPr>
-              <p:cNvPr id="171" name="Google Shape;171;p18"/>
-              <p:cNvCxnSpPr/>
-              <p:nvPr/>
-            </p:nvCxnSpPr>
-            <p:spPr>
-              <a:xfrm rot="10800000">
-                <a:off x="1748425" y="2022925"/>
-                <a:ext cx="248700" cy="271500"/>
-              </a:xfrm>
-              <a:prstGeom prst="straightConnector1">
-                <a:avLst/>
-              </a:prstGeom>
-              <a:noFill/>
-              <a:ln cap="flat" cmpd="sng" w="9525">
-                <a:solidFill>
-                  <a:srgbClr val="595959"/>
-                </a:solidFill>
-                <a:prstDash val="solid"/>
-                <a:round/>
-                <a:headEnd len="sm" w="sm" type="none"/>
-                <a:tailEnd len="sm" w="sm" type="none"/>
-              </a:ln>
-            </p:spPr>
-          </p:cxnSp>
-        </p:grpSp>
-        <p:sp>
-          <p:nvSpPr>
-            <p:cNvPr id="172" name="Google Shape;172;p18"/>
-            <p:cNvSpPr txBox="1"/>
-            <p:nvPr/>
-          </p:nvSpPr>
-          <p:spPr>
-            <a:xfrm>
-              <a:off x="2699598" y="3912485"/>
-              <a:ext cx="1259100" cy="342900"/>
             </a:xfrm>
             <a:prstGeom prst="rect">
               <a:avLst/>
@@ -10371,7 +10377,11 @@
               </a:pPr>
               <a:r>
                 <a:rPr b="1" lang="pt-BR" sz="1200"/>
-                <a:t>Prefeitura</a:t>
+                <a:t> </a:t>
+              </a:r>
+              <a:r>
+                <a:rPr b="1" lang="pt-BR" sz="1200"/>
+                <a:t>Prefeito</a:t>
               </a:r>
               <a:endParaRPr b="1" i="0" sz="1200" u="none" cap="none" strike="noStrike">
                 <a:solidFill>
@@ -10388,118 +10398,17 @@
       </p:grpSp>
       <p:cxnSp>
         <p:nvCxnSpPr>
-          <p:cNvPr id="173" name="Google Shape;173;p18"/>
+          <p:cNvPr id="170" name="Google Shape;170;p18"/>
           <p:cNvCxnSpPr>
-            <a:stCxn id="174" idx="0"/>
+            <a:stCxn id="159" idx="2"/>
+            <a:endCxn id="171" idx="1"/>
           </p:cNvCxnSpPr>
           <p:nvPr/>
         </p:nvCxnSpPr>
         <p:spPr>
-          <a:xfrm rot="-5400000">
-            <a:off x="4147699" y="1806700"/>
-            <a:ext cx="934500" cy="501300"/>
-          </a:xfrm>
-          <a:prstGeom prst="curvedConnector3">
-            <a:avLst>
-              <a:gd fmla="val 50000" name="adj1"/>
-            </a:avLst>
-          </a:prstGeom>
-          <a:noFill/>
-          <a:ln cap="flat" cmpd="sng" w="9525">
-            <a:solidFill>
-              <a:srgbClr val="595959"/>
-            </a:solidFill>
-            <a:prstDash val="solid"/>
-            <a:round/>
-            <a:headEnd len="sm" w="sm" type="none"/>
-            <a:tailEnd len="sm" w="sm" type="none"/>
-          </a:ln>
-        </p:spPr>
-      </p:cxnSp>
-      <p:sp>
-        <p:nvSpPr>
-          <p:cNvPr id="175" name="Google Shape;175;p18"/>
-          <p:cNvSpPr txBox="1"/>
-          <p:nvPr/>
-        </p:nvSpPr>
-        <p:spPr>
-          <a:xfrm>
-            <a:off x="300750" y="3498922"/>
-            <a:ext cx="8542500" cy="1367400"/>
-          </a:xfrm>
-          <a:prstGeom prst="rect">
-            <a:avLst/>
-          </a:prstGeom>
-          <a:noFill/>
-          <a:ln cap="flat" cmpd="sng" w="9525">
-            <a:solidFill>
-              <a:srgbClr val="FF9900"/>
-            </a:solidFill>
-            <a:prstDash val="solid"/>
-            <a:round/>
-            <a:headEnd len="sm" w="sm" type="none"/>
-            <a:tailEnd len="sm" w="sm" type="none"/>
-          </a:ln>
-        </p:spPr>
-        <p:txBody>
-          <a:bodyPr anchorCtr="0" anchor="t" bIns="91425" lIns="91425" spcFirstLastPara="1" rIns="91425" wrap="square" tIns="91425">
-            <a:noAutofit/>
-          </a:bodyPr>
-          <a:lstStyle/>
-          <a:p>
-            <a:pPr indent="0" lvl="0" marL="0" marR="0" rtl="0" algn="l">
-              <a:lnSpc>
-                <a:spcPct val="100000"/>
-              </a:lnSpc>
-              <a:spcBef>
-                <a:spcPts val="0"/>
-              </a:spcBef>
-              <a:spcAft>
-                <a:spcPts val="0"/>
-              </a:spcAft>
-              <a:buClr>
-                <a:srgbClr val="000000"/>
-              </a:buClr>
-              <a:buSzPts val="1400"/>
-              <a:buFont typeface="Arial"/>
-              <a:buNone/>
-            </a:pPr>
-            <a:r>
-              <a:rPr b="0" i="0" lang="pt-BR" sz="1400" u="none" cap="none" strike="noStrike">
-                <a:solidFill>
-                  <a:srgbClr val="000000"/>
-                </a:solidFill>
-                <a:latin typeface="Arial"/>
-                <a:ea typeface="Arial"/>
-                <a:cs typeface="Arial"/>
-                <a:sym typeface="Arial"/>
-              </a:rPr>
-              <a:t>Capacidades Operacionais</a:t>
-            </a:r>
-            <a:endParaRPr b="0" i="0" sz="1400" u="none" cap="none" strike="noStrike">
-              <a:solidFill>
-                <a:srgbClr val="000000"/>
-              </a:solidFill>
-              <a:latin typeface="Arial"/>
-              <a:ea typeface="Arial"/>
-              <a:cs typeface="Arial"/>
-              <a:sym typeface="Arial"/>
-            </a:endParaRPr>
-          </a:p>
-        </p:txBody>
-      </p:sp>
-      <p:cxnSp>
-        <p:nvCxnSpPr>
-          <p:cNvPr id="176" name="Google Shape;176;p18"/>
-          <p:cNvCxnSpPr>
-            <a:stCxn id="167" idx="0"/>
-          </p:cNvCxnSpPr>
-          <p:nvPr/>
-        </p:nvCxnSpPr>
-        <p:spPr>
-          <a:xfrm rot="-5400000">
-            <a:off x="2960502" y="797615"/>
-            <a:ext cx="984600" cy="2569200"/>
+          <a:xfrm flipH="1" rot="-5400000">
+            <a:off x="4297249" y="3123250"/>
+            <a:ext cx="1280100" cy="1146000"/>
           </a:xfrm>
           <a:prstGeom prst="curvedConnector2">
             <a:avLst/>
@@ -10507,25 +10416,25 @@
           <a:noFill/>
           <a:ln cap="flat" cmpd="sng" w="9525">
             <a:solidFill>
-              <a:srgbClr val="595959"/>
+              <a:schemeClr val="dk2"/>
             </a:solidFill>
             <a:prstDash val="solid"/>
             <a:round/>
-            <a:headEnd len="sm" w="sm" type="none"/>
-            <a:tailEnd len="sm" w="sm" type="none"/>
+            <a:headEnd len="med" w="med" type="none"/>
+            <a:tailEnd len="med" w="med" type="none"/>
           </a:ln>
         </p:spPr>
       </p:cxnSp>
       <p:sp>
         <p:nvSpPr>
-          <p:cNvPr id="177" name="Google Shape;177;p18"/>
+          <p:cNvPr id="171" name="Google Shape;171;p18"/>
           <p:cNvSpPr/>
           <p:nvPr/>
         </p:nvSpPr>
         <p:spPr>
           <a:xfrm>
-            <a:off x="374800" y="3945550"/>
-            <a:ext cx="2845500" cy="844800"/>
+            <a:off x="5510250" y="3934800"/>
+            <a:ext cx="2845500" cy="802800"/>
           </a:xfrm>
           <a:prstGeom prst="bracketPair">
             <a:avLst/>
@@ -10547,7 +10456,7 @@
           </a:bodyPr>
           <a:lstStyle/>
           <a:p>
-            <a:pPr indent="-292100" lvl="0" marL="457200" marR="0" rtl="0" algn="l">
+            <a:pPr indent="-298450" lvl="0" marL="457200" marR="0" rtl="0" algn="l">
               <a:lnSpc>
                 <a:spcPct val="100000"/>
               </a:lnSpc>
@@ -10557,611 +10466,25 @@
               <a:spcAft>
                 <a:spcPts val="0"/>
               </a:spcAft>
-              <a:buSzPts val="1000"/>
+              <a:buSzPts val="1100"/>
               <a:buChar char="●"/>
             </a:pPr>
             <a:r>
-              <a:rPr lang="pt-BR" sz="1000"/>
-              <a:t>Receber </a:t>
+              <a:rPr lang="pt-BR" sz="1100">
+                <a:solidFill>
+                  <a:srgbClr val="222222"/>
+                </a:solidFill>
+              </a:rPr>
+              <a:t>Gerar r</a:t>
             </a:r>
             <a:r>
-              <a:rPr lang="pt-BR" sz="1000"/>
-              <a:t>relatórios</a:t>
+              <a:rPr lang="pt-BR" sz="1100"/>
+              <a:t>elatório</a:t>
             </a:r>
-            <a:endParaRPr sz="1000"/>
-          </a:p>
-          <a:p>
-            <a:pPr indent="-292100" lvl="0" marL="457200" marR="0" rtl="0" algn="l">
-              <a:lnSpc>
-                <a:spcPct val="100000"/>
-              </a:lnSpc>
-              <a:spcBef>
-                <a:spcPts val="0"/>
-              </a:spcBef>
-              <a:spcAft>
-                <a:spcPts val="0"/>
-              </a:spcAft>
-              <a:buSzPts val="1000"/>
-              <a:buChar char="●"/>
-            </a:pPr>
-            <a:r>
-              <a:rPr lang="pt-BR" sz="1000"/>
-              <a:t>Analisar</a:t>
-            </a:r>
-            <a:r>
-              <a:rPr lang="pt-BR" sz="1000"/>
-              <a:t> </a:t>
-            </a:r>
-            <a:r>
-              <a:rPr lang="pt-BR" sz="1000"/>
-              <a:t>relatórios</a:t>
-            </a:r>
-            <a:endParaRPr sz="1000"/>
-          </a:p>
-          <a:p>
-            <a:pPr indent="-292100" lvl="0" marL="457200" marR="0" rtl="0" algn="l">
-              <a:lnSpc>
-                <a:spcPct val="100000"/>
-              </a:lnSpc>
-              <a:spcBef>
-                <a:spcPts val="0"/>
-              </a:spcBef>
-              <a:spcAft>
-                <a:spcPts val="0"/>
-              </a:spcAft>
-              <a:buSzPts val="1000"/>
-              <a:buChar char="●"/>
-            </a:pPr>
-            <a:r>
-              <a:rPr lang="pt-BR" sz="1000"/>
-              <a:t>Estabelecer prazos e posicionamento sobre o problema</a:t>
-            </a:r>
-            <a:endParaRPr b="0" i="0" sz="1000" u="none" cap="none" strike="noStrike">
-              <a:solidFill>
-                <a:srgbClr val="000000"/>
-              </a:solidFill>
-              <a:latin typeface="Arial"/>
-              <a:ea typeface="Arial"/>
-              <a:cs typeface="Arial"/>
-              <a:sym typeface="Arial"/>
-            </a:endParaRPr>
+            <a:endParaRPr sz="1100"/>
           </a:p>
         </p:txBody>
       </p:sp>
-      <p:sp>
-        <p:nvSpPr>
-          <p:cNvPr id="174" name="Google Shape;174;p18"/>
-          <p:cNvSpPr/>
-          <p:nvPr/>
-        </p:nvSpPr>
-        <p:spPr>
-          <a:xfrm>
-            <a:off x="3734749" y="2524600"/>
-            <a:ext cx="1259100" cy="531600"/>
-          </a:xfrm>
-          <a:prstGeom prst="roundRect">
-            <a:avLst>
-              <a:gd fmla="val 16667" name="adj"/>
-            </a:avLst>
-          </a:prstGeom>
-          <a:gradFill>
-            <a:gsLst>
-              <a:gs pos="0">
-                <a:srgbClr val="D4E5F5"/>
-              </a:gs>
-              <a:gs pos="100000">
-                <a:srgbClr val="70A4D5"/>
-              </a:gs>
-            </a:gsLst>
-            <a:path path="circle">
-              <a:fillToRect b="50%" l="50%" r="50%" t="50%"/>
-            </a:path>
-            <a:tileRect/>
-          </a:gradFill>
-          <a:ln cap="flat" cmpd="sng" w="9525">
-            <a:solidFill>
-              <a:srgbClr val="F3F3F3"/>
-            </a:solidFill>
-            <a:prstDash val="solid"/>
-            <a:round/>
-            <a:headEnd len="sm" w="sm" type="none"/>
-            <a:tailEnd len="sm" w="sm" type="none"/>
-          </a:ln>
-        </p:spPr>
-        <p:txBody>
-          <a:bodyPr anchorCtr="0" anchor="ctr" bIns="91425" lIns="91425" spcFirstLastPara="1" rIns="91425" wrap="square" tIns="91425">
-            <a:noAutofit/>
-          </a:bodyPr>
-          <a:lstStyle/>
-          <a:p>
-            <a:pPr indent="0" lvl="0" marL="0" marR="0" rtl="0" algn="ctr">
-              <a:lnSpc>
-                <a:spcPct val="100000"/>
-              </a:lnSpc>
-              <a:spcBef>
-                <a:spcPts val="0"/>
-              </a:spcBef>
-              <a:spcAft>
-                <a:spcPts val="0"/>
-              </a:spcAft>
-              <a:buClr>
-                <a:srgbClr val="000000"/>
-              </a:buClr>
-              <a:buSzPts val="1000"/>
-              <a:buFont typeface="Arial"/>
-              <a:buNone/>
-            </a:pPr>
-            <a:r>
-              <a:rPr lang="pt-BR" sz="1000"/>
-              <a:t>Painel Administrativo</a:t>
-            </a:r>
-            <a:endParaRPr b="0" i="0" sz="1000" u="none" cap="none" strike="noStrike">
-              <a:solidFill>
-                <a:srgbClr val="000000"/>
-              </a:solidFill>
-              <a:latin typeface="Arial"/>
-              <a:ea typeface="Arial"/>
-              <a:cs typeface="Arial"/>
-              <a:sym typeface="Arial"/>
-            </a:endParaRPr>
-          </a:p>
-        </p:txBody>
-      </p:sp>
-      <p:cxnSp>
-        <p:nvCxnSpPr>
-          <p:cNvPr id="178" name="Google Shape;178;p18"/>
-          <p:cNvCxnSpPr/>
-          <p:nvPr/>
-        </p:nvCxnSpPr>
-        <p:spPr>
-          <a:xfrm rot="10800000">
-            <a:off x="4737355" y="1589976"/>
-            <a:ext cx="1964100" cy="810000"/>
-          </a:xfrm>
-          <a:prstGeom prst="curvedConnector3">
-            <a:avLst>
-              <a:gd fmla="val 0" name="adj1"/>
-            </a:avLst>
-          </a:prstGeom>
-          <a:noFill/>
-          <a:ln cap="flat" cmpd="sng" w="9525">
-            <a:solidFill>
-              <a:srgbClr val="595959"/>
-            </a:solidFill>
-            <a:prstDash val="solid"/>
-            <a:round/>
-            <a:headEnd len="sm" w="sm" type="none"/>
-            <a:tailEnd len="sm" w="sm" type="none"/>
-          </a:ln>
-        </p:spPr>
-      </p:cxnSp>
-      <p:grpSp>
-        <p:nvGrpSpPr>
-          <p:cNvPr id="179" name="Google Shape;179;p18"/>
-          <p:cNvGrpSpPr/>
-          <p:nvPr/>
-        </p:nvGrpSpPr>
-        <p:grpSpPr>
-          <a:xfrm>
-            <a:off x="6019750" y="2399976"/>
-            <a:ext cx="1353900" cy="844849"/>
-            <a:chOff x="6521198" y="3204287"/>
-            <a:chExt cx="1353900" cy="844849"/>
-          </a:xfrm>
-        </p:grpSpPr>
-        <p:grpSp>
-          <p:nvGrpSpPr>
-            <p:cNvPr id="180" name="Google Shape;180;p18"/>
-            <p:cNvGrpSpPr/>
-            <p:nvPr/>
-          </p:nvGrpSpPr>
-          <p:grpSpPr>
-            <a:xfrm>
-              <a:off x="7044735" y="3204287"/>
-              <a:ext cx="308885" cy="587736"/>
-              <a:chOff x="1499725" y="1450825"/>
-              <a:chExt cx="497400" cy="843600"/>
-            </a:xfrm>
-          </p:grpSpPr>
-          <p:sp>
-            <p:nvSpPr>
-              <p:cNvPr id="181" name="Google Shape;181;p18"/>
-              <p:cNvSpPr/>
-              <p:nvPr/>
-            </p:nvSpPr>
-            <p:spPr>
-              <a:xfrm>
-                <a:off x="1597825" y="1450825"/>
-                <a:ext cx="313200" cy="281400"/>
-              </a:xfrm>
-              <a:prstGeom prst="flowChartConnector">
-                <a:avLst/>
-              </a:prstGeom>
-              <a:solidFill>
-                <a:srgbClr val="EEEEEE"/>
-              </a:solidFill>
-              <a:ln cap="flat" cmpd="sng" w="9525">
-                <a:solidFill>
-                  <a:srgbClr val="595959"/>
-                </a:solidFill>
-                <a:prstDash val="solid"/>
-                <a:round/>
-                <a:headEnd len="sm" w="sm" type="none"/>
-                <a:tailEnd len="sm" w="sm" type="none"/>
-              </a:ln>
-            </p:spPr>
-            <p:txBody>
-              <a:bodyPr anchorCtr="0" anchor="ctr" bIns="91425" lIns="91425" spcFirstLastPara="1" rIns="91425" wrap="square" tIns="91425">
-                <a:noAutofit/>
-              </a:bodyPr>
-              <a:lstStyle/>
-              <a:p>
-                <a:pPr indent="0" lvl="0" marL="0" marR="0" rtl="0" algn="l">
-                  <a:lnSpc>
-                    <a:spcPct val="100000"/>
-                  </a:lnSpc>
-                  <a:spcBef>
-                    <a:spcPts val="0"/>
-                  </a:spcBef>
-                  <a:spcAft>
-                    <a:spcPts val="0"/>
-                  </a:spcAft>
-                  <a:buClr>
-                    <a:srgbClr val="000000"/>
-                  </a:buClr>
-                  <a:buSzPts val="1400"/>
-                  <a:buFont typeface="Arial"/>
-                  <a:buNone/>
-                </a:pPr>
-                <a:r>
-                  <a:t/>
-                </a:r>
-                <a:endParaRPr b="0" i="0" sz="1400" u="none" cap="none" strike="noStrike">
-                  <a:solidFill>
-                    <a:srgbClr val="000000"/>
-                  </a:solidFill>
-                  <a:latin typeface="Arial"/>
-                  <a:ea typeface="Arial"/>
-                  <a:cs typeface="Arial"/>
-                  <a:sym typeface="Arial"/>
-                </a:endParaRPr>
-              </a:p>
-            </p:txBody>
-          </p:sp>
-          <p:cxnSp>
-            <p:nvCxnSpPr>
-              <p:cNvPr id="182" name="Google Shape;182;p18"/>
-              <p:cNvCxnSpPr>
-                <a:stCxn id="181" idx="4"/>
-              </p:cNvCxnSpPr>
-              <p:nvPr/>
-            </p:nvCxnSpPr>
-            <p:spPr>
-              <a:xfrm flipH="1">
-                <a:off x="1748725" y="1732225"/>
-                <a:ext cx="5700" cy="293100"/>
-              </a:xfrm>
-              <a:prstGeom prst="straightConnector1">
-                <a:avLst/>
-              </a:prstGeom>
-              <a:noFill/>
-              <a:ln cap="flat" cmpd="sng" w="9525">
-                <a:solidFill>
-                  <a:srgbClr val="595959"/>
-                </a:solidFill>
-                <a:prstDash val="solid"/>
-                <a:round/>
-                <a:headEnd len="sm" w="sm" type="none"/>
-                <a:tailEnd len="sm" w="sm" type="none"/>
-              </a:ln>
-            </p:spPr>
-          </p:cxnSp>
-          <p:cxnSp>
-            <p:nvCxnSpPr>
-              <p:cNvPr id="183" name="Google Shape;183;p18"/>
-              <p:cNvCxnSpPr/>
-              <p:nvPr/>
-            </p:nvCxnSpPr>
-            <p:spPr>
-              <a:xfrm>
-                <a:off x="1527475" y="1858775"/>
-                <a:ext cx="453900" cy="1800"/>
-              </a:xfrm>
-              <a:prstGeom prst="straightConnector1">
-                <a:avLst/>
-              </a:prstGeom>
-              <a:noFill/>
-              <a:ln cap="flat" cmpd="sng" w="9525">
-                <a:solidFill>
-                  <a:srgbClr val="595959"/>
-                </a:solidFill>
-                <a:prstDash val="solid"/>
-                <a:round/>
-                <a:headEnd len="sm" w="sm" type="none"/>
-                <a:tailEnd len="sm" w="sm" type="none"/>
-              </a:ln>
-            </p:spPr>
-          </p:cxnSp>
-          <p:cxnSp>
-            <p:nvCxnSpPr>
-              <p:cNvPr id="184" name="Google Shape;184;p18"/>
-              <p:cNvCxnSpPr/>
-              <p:nvPr/>
-            </p:nvCxnSpPr>
-            <p:spPr>
-              <a:xfrm flipH="1">
-                <a:off x="1499725" y="2022925"/>
-                <a:ext cx="248700" cy="271500"/>
-              </a:xfrm>
-              <a:prstGeom prst="straightConnector1">
-                <a:avLst/>
-              </a:prstGeom>
-              <a:noFill/>
-              <a:ln cap="flat" cmpd="sng" w="9525">
-                <a:solidFill>
-                  <a:srgbClr val="595959"/>
-                </a:solidFill>
-                <a:prstDash val="solid"/>
-                <a:round/>
-                <a:headEnd len="sm" w="sm" type="none"/>
-                <a:tailEnd len="sm" w="sm" type="none"/>
-              </a:ln>
-            </p:spPr>
-          </p:cxnSp>
-          <p:cxnSp>
-            <p:nvCxnSpPr>
-              <p:cNvPr id="185" name="Google Shape;185;p18"/>
-              <p:cNvCxnSpPr/>
-              <p:nvPr/>
-            </p:nvCxnSpPr>
-            <p:spPr>
-              <a:xfrm rot="10800000">
-                <a:off x="1748425" y="2022925"/>
-                <a:ext cx="248700" cy="271500"/>
-              </a:xfrm>
-              <a:prstGeom prst="straightConnector1">
-                <a:avLst/>
-              </a:prstGeom>
-              <a:noFill/>
-              <a:ln cap="flat" cmpd="sng" w="9525">
-                <a:solidFill>
-                  <a:srgbClr val="595959"/>
-                </a:solidFill>
-                <a:prstDash val="solid"/>
-                <a:round/>
-                <a:headEnd len="sm" w="sm" type="none"/>
-                <a:tailEnd len="sm" w="sm" type="none"/>
-              </a:ln>
-            </p:spPr>
-          </p:cxnSp>
-        </p:grpSp>
-        <p:sp>
-          <p:nvSpPr>
-            <p:cNvPr id="186" name="Google Shape;186;p18"/>
-            <p:cNvSpPr txBox="1"/>
-            <p:nvPr/>
-          </p:nvSpPr>
-          <p:spPr>
-            <a:xfrm>
-              <a:off x="6521198" y="3706236"/>
-              <a:ext cx="1353900" cy="342900"/>
-            </a:xfrm>
-            <a:prstGeom prst="rect">
-              <a:avLst/>
-            </a:prstGeom>
-            <a:noFill/>
-            <a:ln>
-              <a:noFill/>
-            </a:ln>
-          </p:spPr>
-          <p:txBody>
-            <a:bodyPr anchorCtr="0" anchor="t" bIns="91425" lIns="91425" spcFirstLastPara="1" rIns="91425" wrap="square" tIns="91425">
-              <a:noAutofit/>
-            </a:bodyPr>
-            <a:lstStyle/>
-            <a:p>
-              <a:pPr indent="0" lvl="0" marL="0" marR="0" rtl="0" algn="ctr">
-                <a:lnSpc>
-                  <a:spcPct val="100000"/>
-                </a:lnSpc>
-                <a:spcBef>
-                  <a:spcPts val="0"/>
-                </a:spcBef>
-                <a:spcAft>
-                  <a:spcPts val="0"/>
-                </a:spcAft>
-                <a:buClr>
-                  <a:srgbClr val="000000"/>
-                </a:buClr>
-                <a:buSzPts val="1200"/>
-                <a:buFont typeface="Arial"/>
-                <a:buNone/>
-              </a:pPr>
-              <a:r>
-                <a:rPr b="1" lang="pt-BR" sz="1200"/>
-                <a:t>Administrativo</a:t>
-              </a:r>
-              <a:endParaRPr b="1" i="0" sz="1200" u="none" cap="none" strike="noStrike">
-                <a:solidFill>
-                  <a:srgbClr val="000000"/>
-                </a:solidFill>
-                <a:latin typeface="Arial"/>
-                <a:ea typeface="Arial"/>
-                <a:cs typeface="Arial"/>
-                <a:sym typeface="Arial"/>
-              </a:endParaRPr>
-            </a:p>
-          </p:txBody>
-        </p:sp>
-      </p:grpSp>
-      <p:cxnSp>
-        <p:nvCxnSpPr>
-          <p:cNvPr id="187" name="Google Shape;187;p18"/>
-          <p:cNvCxnSpPr>
-            <a:endCxn id="163" idx="2"/>
-          </p:cNvCxnSpPr>
-          <p:nvPr/>
-        </p:nvCxnSpPr>
-        <p:spPr>
-          <a:xfrm flipH="1" rot="5400000">
-            <a:off x="4320175" y="1169775"/>
-            <a:ext cx="735900" cy="75000"/>
-          </a:xfrm>
-          <a:prstGeom prst="curvedConnector3">
-            <a:avLst>
-              <a:gd fmla="val 45142" name="adj1"/>
-            </a:avLst>
-          </a:prstGeom>
-          <a:noFill/>
-          <a:ln cap="flat" cmpd="sng" w="9525">
-            <a:solidFill>
-              <a:schemeClr val="dk2"/>
-            </a:solidFill>
-            <a:prstDash val="solid"/>
-            <a:round/>
-            <a:headEnd len="med" w="med" type="none"/>
-            <a:tailEnd len="med" w="med" type="none"/>
-          </a:ln>
-        </p:spPr>
-      </p:cxnSp>
-      <p:sp>
-        <p:nvSpPr>
-          <p:cNvPr id="188" name="Google Shape;188;p18"/>
-          <p:cNvSpPr/>
-          <p:nvPr/>
-        </p:nvSpPr>
-        <p:spPr>
-          <a:xfrm>
-            <a:off x="5319475" y="3633925"/>
-            <a:ext cx="3437400" cy="934500"/>
-          </a:xfrm>
-          <a:prstGeom prst="bracketPair">
-            <a:avLst/>
-          </a:prstGeom>
-          <a:noFill/>
-          <a:ln cap="flat" cmpd="sng" w="9525">
-            <a:solidFill>
-              <a:srgbClr val="595959"/>
-            </a:solidFill>
-            <a:prstDash val="solid"/>
-            <a:round/>
-            <a:headEnd len="sm" w="sm" type="none"/>
-            <a:tailEnd len="sm" w="sm" type="none"/>
-          </a:ln>
-        </p:spPr>
-        <p:txBody>
-          <a:bodyPr anchorCtr="0" anchor="ctr" bIns="91425" lIns="91425" spcFirstLastPara="1" rIns="91425" wrap="square" tIns="91425">
-            <a:noAutofit/>
-          </a:bodyPr>
-          <a:lstStyle/>
-          <a:p>
-            <a:pPr indent="-292100" lvl="0" marL="457200" marR="0" rtl="0" algn="l">
-              <a:lnSpc>
-                <a:spcPct val="100000"/>
-              </a:lnSpc>
-              <a:spcBef>
-                <a:spcPts val="0"/>
-              </a:spcBef>
-              <a:spcAft>
-                <a:spcPts val="0"/>
-              </a:spcAft>
-              <a:buSzPts val="1000"/>
-              <a:buChar char="●"/>
-            </a:pPr>
-            <a:r>
-              <a:rPr lang="pt-BR" sz="1000"/>
-              <a:t>Publicar resposta do </a:t>
-            </a:r>
-            <a:r>
-              <a:rPr lang="pt-BR" sz="1000"/>
-              <a:t>relatório</a:t>
-            </a:r>
-            <a:r>
-              <a:rPr lang="pt-BR" sz="1000"/>
-              <a:t> para os </a:t>
-            </a:r>
-            <a:r>
-              <a:rPr lang="pt-BR" sz="1000"/>
-              <a:t>usuários</a:t>
-            </a:r>
-            <a:r>
-              <a:rPr lang="pt-BR" sz="1000"/>
-              <a:t> </a:t>
-            </a:r>
-            <a:endParaRPr b="0" i="0" sz="1000" u="none" cap="none" strike="noStrike">
-              <a:solidFill>
-                <a:srgbClr val="000000"/>
-              </a:solidFill>
-              <a:latin typeface="Arial"/>
-              <a:ea typeface="Arial"/>
-              <a:cs typeface="Arial"/>
-              <a:sym typeface="Arial"/>
-            </a:endParaRPr>
-          </a:p>
-        </p:txBody>
-      </p:sp>
-      <p:cxnSp>
-        <p:nvCxnSpPr>
-          <p:cNvPr id="189" name="Google Shape;189;p18"/>
-          <p:cNvCxnSpPr>
-            <a:stCxn id="188" idx="1"/>
-          </p:cNvCxnSpPr>
-          <p:nvPr/>
-        </p:nvCxnSpPr>
-        <p:spPr>
-          <a:xfrm flipH="1" rot="10800000">
-            <a:off x="5319475" y="2699875"/>
-            <a:ext cx="983700" cy="1401300"/>
-          </a:xfrm>
-          <a:prstGeom prst="curvedConnector4">
-            <a:avLst>
-              <a:gd fmla="val -24207" name="adj1"/>
-              <a:gd fmla="val 99996" name="adj2"/>
-            </a:avLst>
-          </a:prstGeom>
-          <a:noFill/>
-          <a:ln cap="flat" cmpd="sng" w="9525">
-            <a:solidFill>
-              <a:schemeClr val="dk2"/>
-            </a:solidFill>
-            <a:prstDash val="solid"/>
-            <a:round/>
-            <a:headEnd len="med" w="med" type="none"/>
-            <a:tailEnd len="med" w="med" type="none"/>
-          </a:ln>
-        </p:spPr>
-      </p:cxnSp>
-      <p:cxnSp>
-        <p:nvCxnSpPr>
-          <p:cNvPr id="190" name="Google Shape;190;p18"/>
-          <p:cNvCxnSpPr>
-            <a:stCxn id="177" idx="3"/>
-          </p:cNvCxnSpPr>
-          <p:nvPr/>
-        </p:nvCxnSpPr>
-        <p:spPr>
-          <a:xfrm rot="10800000">
-            <a:off x="2491300" y="2936950"/>
-            <a:ext cx="729000" cy="1431000"/>
-          </a:xfrm>
-          <a:prstGeom prst="curvedConnector4">
-            <a:avLst>
-              <a:gd fmla="val -32665" name="adj1"/>
-              <a:gd fmla="val 64759" name="adj2"/>
-            </a:avLst>
-          </a:prstGeom>
-          <a:noFill/>
-          <a:ln cap="flat" cmpd="sng" w="9525">
-            <a:solidFill>
-              <a:schemeClr val="dk2"/>
-            </a:solidFill>
-            <a:prstDash val="solid"/>
-            <a:round/>
-            <a:headEnd len="med" w="med" type="none"/>
-            <a:tailEnd len="med" w="med" type="none"/>
-          </a:ln>
-        </p:spPr>
-      </p:cxnSp>
     </p:spTree>
   </p:cSld>
   <p:clrMapOvr>

</xml_diff>

<commit_message>
Engenharia de Requisitos - AC04
</commit_message>
<xml_diff>
--- a/15 - Arquitetura de Negócio para cada Cenário.pptx
+++ b/15 - Arquitetura de Negócio para cada Cenário.pptx
@@ -2,18 +2,19 @@
 <file path=ppt/presentation.xml><?xml version="1.0" encoding="utf-8"?>
 <p:presentation xmlns:a="http://schemas.openxmlformats.org/drawingml/2006/main" xmlns:r="http://schemas.openxmlformats.org/officeDocument/2006/relationships" xmlns:mc="http://schemas.openxmlformats.org/markup-compatibility/2006" xmlns:mv="urn:schemas-microsoft-com:mac:vml" xmlns:p="http://schemas.openxmlformats.org/presentationml/2006/main" xmlns:c="http://schemas.openxmlformats.org/drawingml/2006/chart" xmlns:dgm="http://schemas.openxmlformats.org/drawingml/2006/diagram" xmlns:o="urn:schemas-microsoft-com:office:office" xmlns:v="urn:schemas-microsoft-com:vml" xmlns:pvml="urn:schemas-microsoft-com:office:powerpoint" xmlns:com="http://schemas.openxmlformats.org/drawingml/2006/compatibility" xmlns:p14="http://schemas.microsoft.com/office/powerpoint/2010/main" xmlns:p15="http://schemas.microsoft.com/office/powerpoint/2012/main" autoCompressPictures="0" strictFirstAndLastChars="0" saveSubsetFonts="1">
   <p:sldMasterIdLst>
-    <p:sldMasterId id="2147483659" r:id="rId4"/>
+    <p:sldMasterId id="2147483659" r:id="rId5"/>
   </p:sldMasterIdLst>
   <p:notesMasterIdLst>
-    <p:notesMasterId r:id="rId5"/>
+    <p:notesMasterId r:id="rId6"/>
   </p:notesMasterIdLst>
   <p:sldIdLst>
-    <p:sldId id="256" r:id="rId6"/>
-    <p:sldId id="257" r:id="rId7"/>
-    <p:sldId id="258" r:id="rId8"/>
-    <p:sldId id="259" r:id="rId9"/>
-    <p:sldId id="260" r:id="rId10"/>
-    <p:sldId id="261" r:id="rId11"/>
+    <p:sldId id="256" r:id="rId7"/>
+    <p:sldId id="257" r:id="rId8"/>
+    <p:sldId id="258" r:id="rId9"/>
+    <p:sldId id="259" r:id="rId10"/>
+    <p:sldId id="260" r:id="rId11"/>
+    <p:sldId id="261" r:id="rId12"/>
+    <p:sldId id="262" r:id="rId13"/>
   </p:sldIdLst>
   <p:sldSz cy="5143500" cx="9144000"/>
   <p:notesSz cx="6858000" cy="9144000"/>
@@ -263,6 +264,21 @@
     </p:ext>
   </p:extLst>
 </p:presentation>
+</file>
+
+<file path=ppt/commentAuthors.xml><?xml version="1.0" encoding="utf-8"?>
+<p:cmAuthorLst xmlns:a="http://schemas.openxmlformats.org/drawingml/2006/main" xmlns:r="http://schemas.openxmlformats.org/officeDocument/2006/relationships" xmlns:mc="http://schemas.openxmlformats.org/markup-compatibility/2006" xmlns:mv="urn:schemas-microsoft-com:mac:vml" xmlns:p="http://schemas.openxmlformats.org/presentationml/2006/main" xmlns:c="http://schemas.openxmlformats.org/drawingml/2006/chart" xmlns:dgm="http://schemas.openxmlformats.org/drawingml/2006/diagram" xmlns:o="urn:schemas-microsoft-com:office:office" xmlns:v="urn:schemas-microsoft-com:vml" xmlns:pvml="urn:schemas-microsoft-com:office:powerpoint" xmlns:com="http://schemas.openxmlformats.org/drawingml/2006/compatibility" xmlns:p14="http://schemas.microsoft.com/office/powerpoint/2010/main" xmlns:p15="http://schemas.microsoft.com/office/powerpoint/2012/main">
+  <p:cmAuthor clrIdx="0" id="0" initials="" lastIdx="1" name="Lara Angelini Argento"/>
+</p:cmAuthorLst>
+</file>
+
+<file path=ppt/comments/comment1.xml><?xml version="1.0" encoding="utf-8"?>
+<p:cmLst xmlns:a="http://schemas.openxmlformats.org/drawingml/2006/main" xmlns:r="http://schemas.openxmlformats.org/officeDocument/2006/relationships" xmlns:mc="http://schemas.openxmlformats.org/markup-compatibility/2006" xmlns:mv="urn:schemas-microsoft-com:mac:vml" xmlns:p="http://schemas.openxmlformats.org/presentationml/2006/main" xmlns:c="http://schemas.openxmlformats.org/drawingml/2006/chart" xmlns:dgm="http://schemas.openxmlformats.org/drawingml/2006/diagram" xmlns:o="urn:schemas-microsoft-com:office:office" xmlns:v="urn:schemas-microsoft-com:vml" xmlns:pvml="urn:schemas-microsoft-com:office:powerpoint" xmlns:com="http://schemas.openxmlformats.org/drawingml/2006/compatibility" xmlns:p14="http://schemas.microsoft.com/office/powerpoint/2010/main" xmlns:p15="http://schemas.microsoft.com/office/powerpoint/2012/main">
+  <p:cm authorId="0" idx="1" dt="2020-05-06T00:33:21.297">
+    <p:pos x="3391" y="2381"/>
+    <p:text>Inscrever interessado na Pasta</p:text>
+  </p:cm>
+</p:cmLst>
 </file>
 
 <file path=ppt/notesMasters/notesMaster1.xml><?xml version="1.0" encoding="utf-8"?>
@@ -910,7 +926,7 @@
   <p:cSld>
     <p:spTree>
       <p:nvGrpSpPr>
-        <p:cNvPr id="84" name="Shape 84"/>
+        <p:cNvPr id="83" name="Shape 83"/>
         <p:cNvGrpSpPr/>
         <p:nvPr/>
       </p:nvGrpSpPr>
@@ -924,7 +940,7 @@
       </p:grpSpPr>
       <p:sp>
         <p:nvSpPr>
-          <p:cNvPr id="85" name="Google Shape;85;g7f77872d79_9_0:notes"/>
+          <p:cNvPr id="84" name="Google Shape;84;g7f77872d79_9_0:notes"/>
           <p:cNvSpPr/>
           <p:nvPr>
             <p:ph idx="2" type="sldImg"/>
@@ -959,7 +975,7 @@
       </p:sp>
       <p:sp>
         <p:nvSpPr>
-          <p:cNvPr id="86" name="Google Shape;86;g7f77872d79_9_0:notes"/>
+          <p:cNvPr id="85" name="Google Shape;85;g7f77872d79_9_0:notes"/>
           <p:cNvSpPr txBox="1"/>
           <p:nvPr>
             <p:ph idx="1" type="body"/>
@@ -990,6 +1006,22 @@
               <a:buNone/>
             </a:pPr>
             <a:r>
+              <a:rPr lang="pt-BR"/>
+              <a:t>Objetivo</a:t>
+            </a:r>
+            <a:endParaRPr/>
+          </a:p>
+          <a:p>
+            <a:pPr indent="0" lvl="0" marL="0" rtl="0" algn="l">
+              <a:spcBef>
+                <a:spcPts val="0"/>
+              </a:spcBef>
+              <a:spcAft>
+                <a:spcPts val="0"/>
+              </a:spcAft>
+              <a:buNone/>
+            </a:pPr>
+            <a:r>
               <a:t/>
             </a:r>
             <a:endParaRPr/>
@@ -1009,7 +1041,7 @@
   <p:cSld>
     <p:spTree>
       <p:nvGrpSpPr>
-        <p:cNvPr id="108" name="Shape 108"/>
+        <p:cNvPr id="107" name="Shape 107"/>
         <p:cNvGrpSpPr/>
         <p:nvPr/>
       </p:nvGrpSpPr>
@@ -1023,7 +1055,7 @@
       </p:grpSpPr>
       <p:sp>
         <p:nvSpPr>
-          <p:cNvPr id="109" name="Google Shape;109;g7007d08d72_0_36:notes"/>
+          <p:cNvPr id="108" name="Google Shape;108;g7f77872d79_10_0:notes"/>
           <p:cNvSpPr/>
           <p:nvPr>
             <p:ph idx="2" type="sldImg"/>
@@ -1058,7 +1090,7 @@
       </p:sp>
       <p:sp>
         <p:nvSpPr>
-          <p:cNvPr id="110" name="Google Shape;110;g7007d08d72_0_36:notes"/>
+          <p:cNvPr id="109" name="Google Shape;109;g7f77872d79_10_0:notes"/>
           <p:cNvSpPr txBox="1"/>
           <p:nvPr>
             <p:ph idx="1" type="body"/>
@@ -1090,7 +1122,7 @@
             </a:pPr>
             <a:r>
               <a:rPr lang="pt-BR"/>
-              <a:t>certo</a:t>
+              <a:t>ta ok</a:t>
             </a:r>
             <a:endParaRPr/>
           </a:p>
@@ -1124,7 +1156,7 @@
   <p:cSld>
     <p:spTree>
       <p:nvGrpSpPr>
-        <p:cNvPr id="128" name="Shape 128"/>
+        <p:cNvPr id="131" name="Shape 131"/>
         <p:cNvGrpSpPr/>
         <p:nvPr/>
       </p:nvGrpSpPr>
@@ -1138,7 +1170,7 @@
       </p:grpSpPr>
       <p:sp>
         <p:nvSpPr>
-          <p:cNvPr id="129" name="Google Shape;129;g7f77872d79_10_0:notes"/>
+          <p:cNvPr id="132" name="Google Shape;132;g8002808193_0_0:notes"/>
           <p:cNvSpPr/>
           <p:nvPr>
             <p:ph idx="2" type="sldImg"/>
@@ -1173,7 +1205,7 @@
       </p:sp>
       <p:sp>
         <p:nvSpPr>
-          <p:cNvPr id="130" name="Google Shape;130;g7f77872d79_10_0:notes"/>
+          <p:cNvPr id="133" name="Google Shape;133;g8002808193_0_0:notes"/>
           <p:cNvSpPr txBox="1"/>
           <p:nvPr>
             <p:ph idx="1" type="body"/>
@@ -1204,22 +1236,6 @@
               <a:buNone/>
             </a:pPr>
             <a:r>
-              <a:rPr lang="pt-BR"/>
-              <a:t>ta ok</a:t>
-            </a:r>
-            <a:endParaRPr/>
-          </a:p>
-          <a:p>
-            <a:pPr indent="0" lvl="0" marL="0" rtl="0" algn="l">
-              <a:spcBef>
-                <a:spcPts val="0"/>
-              </a:spcBef>
-              <a:spcAft>
-                <a:spcPts val="0"/>
-              </a:spcAft>
-              <a:buNone/>
-            </a:pPr>
-            <a:r>
               <a:t/>
             </a:r>
             <a:endParaRPr/>
@@ -1239,7 +1255,7 @@
   <p:cSld>
     <p:spTree>
       <p:nvGrpSpPr>
-        <p:cNvPr id="152" name="Shape 152"/>
+        <p:cNvPr id="164" name="Shape 164"/>
         <p:cNvGrpSpPr/>
         <p:nvPr/>
       </p:nvGrpSpPr>
@@ -1253,7 +1269,7 @@
       </p:grpSpPr>
       <p:sp>
         <p:nvSpPr>
-          <p:cNvPr id="153" name="Google Shape;153;g7007d08d72_2_0:notes"/>
+          <p:cNvPr id="165" name="Google Shape;165;g7007d08d72_0_36:notes"/>
           <p:cNvSpPr/>
           <p:nvPr>
             <p:ph idx="2" type="sldImg"/>
@@ -1288,7 +1304,122 @@
       </p:sp>
       <p:sp>
         <p:nvSpPr>
-          <p:cNvPr id="154" name="Google Shape;154;g7007d08d72_2_0:notes"/>
+          <p:cNvPr id="166" name="Google Shape;166;g7007d08d72_0_36:notes"/>
+          <p:cNvSpPr txBox="1"/>
+          <p:nvPr>
+            <p:ph idx="1" type="body"/>
+          </p:nvPr>
+        </p:nvSpPr>
+        <p:spPr>
+          <a:xfrm>
+            <a:off x="685800" y="4343400"/>
+            <a:ext cx="5486400" cy="4114800"/>
+          </a:xfrm>
+          <a:prstGeom prst="rect">
+            <a:avLst/>
+          </a:prstGeom>
+        </p:spPr>
+        <p:txBody>
+          <a:bodyPr anchorCtr="0" anchor="t" bIns="91425" lIns="91425" spcFirstLastPara="1" rIns="91425" wrap="square" tIns="91425">
+            <a:noAutofit/>
+          </a:bodyPr>
+          <a:lstStyle/>
+          <a:p>
+            <a:pPr indent="0" lvl="0" marL="0" rtl="0" algn="l">
+              <a:spcBef>
+                <a:spcPts val="0"/>
+              </a:spcBef>
+              <a:spcAft>
+                <a:spcPts val="0"/>
+              </a:spcAft>
+              <a:buNone/>
+            </a:pPr>
+            <a:r>
+              <a:rPr lang="pt-BR"/>
+              <a:t>certo</a:t>
+            </a:r>
+            <a:endParaRPr/>
+          </a:p>
+          <a:p>
+            <a:pPr indent="0" lvl="0" marL="0" rtl="0" algn="l">
+              <a:spcBef>
+                <a:spcPts val="0"/>
+              </a:spcBef>
+              <a:spcAft>
+                <a:spcPts val="0"/>
+              </a:spcAft>
+              <a:buNone/>
+            </a:pPr>
+            <a:r>
+              <a:t/>
+            </a:r>
+            <a:endParaRPr/>
+          </a:p>
+        </p:txBody>
+      </p:sp>
+    </p:spTree>
+  </p:cSld>
+  <p:clrMapOvr>
+    <a:masterClrMapping/>
+  </p:clrMapOvr>
+</p:notes>
+</file>
+
+<file path=ppt/notesSlides/notesSlide7.xml><?xml version="1.0" encoding="utf-8"?>
+<p:notes xmlns:a="http://schemas.openxmlformats.org/drawingml/2006/main" xmlns:r="http://schemas.openxmlformats.org/officeDocument/2006/relationships" xmlns:mc="http://schemas.openxmlformats.org/markup-compatibility/2006" xmlns:mv="urn:schemas-microsoft-com:mac:vml" xmlns:p="http://schemas.openxmlformats.org/presentationml/2006/main" xmlns:c="http://schemas.openxmlformats.org/drawingml/2006/chart" xmlns:dgm="http://schemas.openxmlformats.org/drawingml/2006/diagram" xmlns:o="urn:schemas-microsoft-com:office:office" xmlns:v="urn:schemas-microsoft-com:vml" xmlns:pvml="urn:schemas-microsoft-com:office:powerpoint" xmlns:com="http://schemas.openxmlformats.org/drawingml/2006/compatibility" xmlns:p14="http://schemas.microsoft.com/office/powerpoint/2010/main" xmlns:p15="http://schemas.microsoft.com/office/powerpoint/2012/main" showMasterPhAnim="0" showMasterSp="0">
+  <p:cSld>
+    <p:spTree>
+      <p:nvGrpSpPr>
+        <p:cNvPr id="184" name="Shape 184"/>
+        <p:cNvGrpSpPr/>
+        <p:nvPr/>
+      </p:nvGrpSpPr>
+      <p:grpSpPr>
+        <a:xfrm>
+          <a:off x="0" y="0"/>
+          <a:ext cx="0" cy="0"/>
+          <a:chOff x="0" y="0"/>
+          <a:chExt cx="0" cy="0"/>
+        </a:xfrm>
+      </p:grpSpPr>
+      <p:sp>
+        <p:nvSpPr>
+          <p:cNvPr id="185" name="Google Shape;185;g7007d08d72_2_0:notes"/>
+          <p:cNvSpPr/>
+          <p:nvPr>
+            <p:ph idx="2" type="sldImg"/>
+          </p:nvPr>
+        </p:nvSpPr>
+        <p:spPr>
+          <a:xfrm>
+            <a:off x="381300" y="685800"/>
+            <a:ext cx="6096000" cy="3429000"/>
+          </a:xfrm>
+          <a:custGeom>
+            <a:rect b="b" l="l" r="r" t="t"/>
+            <a:pathLst>
+              <a:path extrusionOk="0" h="120000" w="120000">
+                <a:moveTo>
+                  <a:pt x="0" y="0"/>
+                </a:moveTo>
+                <a:lnTo>
+                  <a:pt x="120000" y="0"/>
+                </a:lnTo>
+                <a:lnTo>
+                  <a:pt x="120000" y="120000"/>
+                </a:lnTo>
+                <a:lnTo>
+                  <a:pt x="0" y="120000"/>
+                </a:lnTo>
+                <a:close/>
+              </a:path>
+            </a:pathLst>
+          </a:custGeom>
+        </p:spPr>
+      </p:sp>
+      <p:sp>
+        <p:nvSpPr>
+          <p:cNvPr id="186" name="Google Shape;186;g7007d08d72_2_0:notes"/>
           <p:cNvSpPr txBox="1"/>
           <p:nvPr>
             <p:ph idx="1" type="body"/>
@@ -6266,7 +6397,7 @@
         </p:nvGrpSpPr>
         <p:grpSpPr>
           <a:xfrm>
-            <a:off x="408917" y="2328082"/>
+            <a:off x="6067667" y="2165682"/>
             <a:ext cx="635031" cy="1430885"/>
             <a:chOff x="947328" y="1157275"/>
             <a:chExt cx="733800" cy="1682800"/>
@@ -6462,7 +6593,7 @@
         </p:nvGrpSpPr>
         <p:grpSpPr>
           <a:xfrm>
-            <a:off x="6137088" y="2328079"/>
+            <a:off x="379438" y="2165679"/>
             <a:ext cx="635031" cy="1430885"/>
             <a:chOff x="947328" y="1157275"/>
             <a:chExt cx="733800" cy="1682800"/>
@@ -6741,8 +6872,8 @@
         </p:nvCxnSpPr>
         <p:spPr>
           <a:xfrm>
-            <a:off x="3485250" y="3043513"/>
-            <a:ext cx="1086900" cy="754500"/>
+            <a:off x="3330475" y="3070875"/>
+            <a:ext cx="1241400" cy="726900"/>
           </a:xfrm>
           <a:prstGeom prst="curvedConnector2">
             <a:avLst/>
@@ -6761,13 +6892,13 @@
       </p:cxnSp>
       <p:sp>
         <p:nvSpPr>
-          <p:cNvPr id="78" name="Google Shape;78;p14"/>
+          <p:cNvPr id="79" name="Google Shape;79;p14"/>
           <p:cNvSpPr txBox="1"/>
           <p:nvPr/>
         </p:nvSpPr>
         <p:spPr>
           <a:xfrm>
-            <a:off x="889350" y="2664613"/>
+            <a:off x="6548100" y="2502213"/>
             <a:ext cx="2595900" cy="757800"/>
           </a:xfrm>
           <a:prstGeom prst="rect">
@@ -6817,7 +6948,15 @@
             </a:pPr>
             <a:r>
               <a:rPr lang="pt-BR" sz="1000"/>
-              <a:t>Receber relatórios de Estudos</a:t>
+              <a:t>Receber relatório de </a:t>
+            </a:r>
+            <a:r>
+              <a:rPr lang="pt-BR" sz="1000"/>
+              <a:t>e</a:t>
+            </a:r>
+            <a:r>
+              <a:rPr lang="pt-BR" sz="1000"/>
+              <a:t>studo</a:t>
             </a:r>
             <a:endParaRPr sz="1000"/>
           </a:p>
@@ -6855,14 +6994,14 @@
       </p:sp>
       <p:sp>
         <p:nvSpPr>
-          <p:cNvPr id="79" name="Google Shape;79;p14"/>
+          <p:cNvPr id="78" name="Google Shape;78;p14"/>
           <p:cNvSpPr txBox="1"/>
           <p:nvPr/>
         </p:nvSpPr>
         <p:spPr>
           <a:xfrm>
-            <a:off x="6695925" y="2784325"/>
-            <a:ext cx="2314500" cy="897900"/>
+            <a:off x="938275" y="2621925"/>
+            <a:ext cx="2392200" cy="897900"/>
           </a:xfrm>
           <a:prstGeom prst="rect">
             <a:avLst/>
@@ -6893,7 +7032,7 @@
             </a:pPr>
             <a:r>
               <a:rPr lang="pt-BR" sz="1000"/>
-              <a:t>Solicitar adesão para voluntariado</a:t>
+              <a:t>Solicitar adesão para Voluntariado</a:t>
             </a:r>
             <a:endParaRPr sz="1000"/>
           </a:p>
@@ -6913,7 +7052,47 @@
             </a:pPr>
             <a:r>
               <a:rPr lang="pt-BR" sz="1000"/>
-              <a:t>Solicitar assunto para estudo</a:t>
+              <a:t>Solicitar assunto para </a:t>
+            </a:r>
+            <a:r>
+              <a:rPr lang="pt-BR" sz="1000"/>
+              <a:t>e</a:t>
+            </a:r>
+            <a:r>
+              <a:rPr lang="pt-BR" sz="1000"/>
+              <a:t>studo</a:t>
+            </a:r>
+            <a:endParaRPr sz="1000"/>
+          </a:p>
+          <a:p>
+            <a:pPr indent="-292100" lvl="0" marL="457200" rtl="0" algn="l">
+              <a:spcBef>
+                <a:spcPts val="0"/>
+              </a:spcBef>
+              <a:spcAft>
+                <a:spcPts val="0"/>
+              </a:spcAft>
+              <a:buSzPts val="1000"/>
+              <a:buChar char="●"/>
+            </a:pPr>
+            <a:r>
+              <a:rPr lang="pt-BR" sz="1000"/>
+              <a:t>Interagir com Pasta</a:t>
+            </a:r>
+            <a:endParaRPr sz="1000"/>
+          </a:p>
+          <a:p>
+            <a:pPr indent="0" lvl="0" marL="457200" rtl="0" algn="l">
+              <a:spcBef>
+                <a:spcPts val="0"/>
+              </a:spcBef>
+              <a:spcAft>
+                <a:spcPts val="0"/>
+              </a:spcAft>
+              <a:buNone/>
+            </a:pPr>
+            <a:r>
+              <a:t/>
             </a:r>
             <a:endParaRPr sz="1000"/>
           </a:p>
@@ -6980,7 +7159,7 @@
         </p:nvSpPr>
         <p:spPr>
           <a:xfrm>
-            <a:off x="1110550" y="2365788"/>
+            <a:off x="6769300" y="2203388"/>
             <a:ext cx="1358400" cy="411900"/>
           </a:xfrm>
           <a:prstGeom prst="rect">
@@ -7008,7 +7187,7 @@
             </a:pPr>
             <a:r>
               <a:rPr b="1" lang="pt-BR" sz="1000"/>
-              <a:t>Prefeito </a:t>
+              <a:t>Prefeitura</a:t>
             </a:r>
             <a:endParaRPr b="1" sz="1000"/>
           </a:p>
@@ -7022,7 +7201,7 @@
         </p:nvSpPr>
         <p:spPr>
           <a:xfrm>
-            <a:off x="6890375" y="2499725"/>
+            <a:off x="1132725" y="2337325"/>
             <a:ext cx="1191900" cy="411900"/>
           </a:xfrm>
           <a:prstGeom prst="rect">
@@ -7150,48 +7329,6 @@
           </a:p>
         </p:txBody>
       </p:sp>
-      <p:sp>
-        <p:nvSpPr>
-          <p:cNvPr id="83" name="Google Shape;83;p14"/>
-          <p:cNvSpPr txBox="1"/>
-          <p:nvPr/>
-        </p:nvSpPr>
-        <p:spPr>
-          <a:xfrm>
-            <a:off x="7851975" y="4681425"/>
-            <a:ext cx="1358400" cy="411900"/>
-          </a:xfrm>
-          <a:prstGeom prst="rect">
-            <a:avLst/>
-          </a:prstGeom>
-          <a:noFill/>
-          <a:ln>
-            <a:noFill/>
-          </a:ln>
-        </p:spPr>
-        <p:txBody>
-          <a:bodyPr anchorCtr="0" anchor="t" bIns="91425" lIns="91425" spcFirstLastPara="1" rIns="91425" wrap="square" tIns="91425">
-            <a:noAutofit/>
-          </a:bodyPr>
-          <a:lstStyle/>
-          <a:p>
-            <a:pPr indent="0" lvl="0" marL="0" rtl="0" algn="l">
-              <a:spcBef>
-                <a:spcPts val="0"/>
-              </a:spcBef>
-              <a:spcAft>
-                <a:spcPts val="0"/>
-              </a:spcAft>
-              <a:buNone/>
-            </a:pPr>
-            <a:r>
-              <a:rPr lang="pt-BR" sz="1100"/>
-              <a:t>Objetivos</a:t>
-            </a:r>
-            <a:endParaRPr sz="1100"/>
-          </a:p>
-        </p:txBody>
-      </p:sp>
     </p:spTree>
   </p:cSld>
   <p:clrMapOvr>
@@ -7205,7 +7342,7 @@
   <p:cSld>
     <p:spTree>
       <p:nvGrpSpPr>
-        <p:cNvPr id="87" name="Shape 87"/>
+        <p:cNvPr id="86" name="Shape 86"/>
         <p:cNvGrpSpPr/>
         <p:nvPr/>
       </p:nvGrpSpPr>
@@ -7219,7 +7356,7 @@
       </p:grpSpPr>
       <p:sp>
         <p:nvSpPr>
-          <p:cNvPr id="88" name="Google Shape;88;p15"/>
+          <p:cNvPr id="87" name="Google Shape;87;p15"/>
           <p:cNvSpPr/>
           <p:nvPr/>
         </p:nvSpPr>
@@ -7268,7 +7405,7 @@
                   <a:schemeClr val="dk1"/>
                 </a:solidFill>
               </a:rPr>
-              <a:t>Solicitar adesão para voluntariado</a:t>
+              <a:t>Solicitar adesão para Voluntariado</a:t>
             </a:r>
             <a:endParaRPr sz="1000">
               <a:solidFill>
@@ -7283,14 +7420,14 @@
       </p:sp>
       <p:sp>
         <p:nvSpPr>
-          <p:cNvPr id="89" name="Google Shape;89;p15"/>
+          <p:cNvPr id="88" name="Google Shape;88;p15"/>
           <p:cNvSpPr txBox="1"/>
           <p:nvPr/>
         </p:nvSpPr>
         <p:spPr>
           <a:xfrm>
-            <a:off x="300750" y="2131525"/>
-            <a:ext cx="8542500" cy="1367400"/>
+            <a:off x="300750" y="1850176"/>
+            <a:ext cx="8351700" cy="1550100"/>
           </a:xfrm>
           <a:prstGeom prst="rect">
             <a:avLst/>
@@ -7355,7 +7492,7 @@
       </p:sp>
       <p:grpSp>
         <p:nvGrpSpPr>
-          <p:cNvPr id="90" name="Google Shape;90;p15"/>
+          <p:cNvPr id="89" name="Google Shape;89;p15"/>
           <p:cNvGrpSpPr/>
           <p:nvPr/>
         </p:nvGrpSpPr>
@@ -7369,7 +7506,7 @@
         </p:grpSpPr>
         <p:grpSp>
           <p:nvGrpSpPr>
-            <p:cNvPr id="91" name="Google Shape;91;p15"/>
+            <p:cNvPr id="90" name="Google Shape;90;p15"/>
             <p:cNvGrpSpPr/>
             <p:nvPr/>
           </p:nvGrpSpPr>
@@ -7383,7 +7520,7 @@
           </p:grpSpPr>
           <p:sp>
             <p:nvSpPr>
-              <p:cNvPr id="92" name="Google Shape;92;p15"/>
+              <p:cNvPr id="91" name="Google Shape;91;p15"/>
               <p:cNvSpPr/>
               <p:nvPr/>
             </p:nvSpPr>
@@ -7448,9 +7585,9 @@
           </p:sp>
           <p:cxnSp>
             <p:nvCxnSpPr>
-              <p:cNvPr id="93" name="Google Shape;93;p15"/>
+              <p:cNvPr id="92" name="Google Shape;92;p15"/>
               <p:cNvCxnSpPr>
-                <a:stCxn id="92" idx="4"/>
+                <a:stCxn id="91" idx="4"/>
               </p:cNvCxnSpPr>
               <p:nvPr/>
             </p:nvCxnSpPr>
@@ -7476,7 +7613,7 @@
           </p:cxnSp>
           <p:cxnSp>
             <p:nvCxnSpPr>
-              <p:cNvPr id="94" name="Google Shape;94;p15"/>
+              <p:cNvPr id="93" name="Google Shape;93;p15"/>
               <p:cNvCxnSpPr/>
               <p:nvPr/>
             </p:nvCxnSpPr>
@@ -7502,7 +7639,7 @@
           </p:cxnSp>
           <p:cxnSp>
             <p:nvCxnSpPr>
-              <p:cNvPr id="95" name="Google Shape;95;p15"/>
+              <p:cNvPr id="94" name="Google Shape;94;p15"/>
               <p:cNvCxnSpPr/>
               <p:nvPr/>
             </p:nvCxnSpPr>
@@ -7528,7 +7665,7 @@
           </p:cxnSp>
           <p:cxnSp>
             <p:nvCxnSpPr>
-              <p:cNvPr id="96" name="Google Shape;96;p15"/>
+              <p:cNvPr id="95" name="Google Shape;95;p15"/>
               <p:cNvCxnSpPr/>
               <p:nvPr/>
             </p:nvCxnSpPr>
@@ -7555,7 +7692,7 @@
         </p:grpSp>
         <p:sp>
           <p:nvSpPr>
-            <p:cNvPr id="97" name="Google Shape;97;p15"/>
+            <p:cNvPr id="96" name="Google Shape;96;p15"/>
             <p:cNvSpPr txBox="1"/>
             <p:nvPr/>
           </p:nvSpPr>
@@ -7597,7 +7734,7 @@
               </a:pPr>
               <a:r>
                 <a:rPr b="1" lang="pt-BR" sz="1200"/>
-                <a:t>Munícipes</a:t>
+                <a:t>Munícipe</a:t>
               </a:r>
               <a:endParaRPr b="1" i="0" sz="1200" u="none" cap="none" strike="noStrike">
                 <a:solidFill>
@@ -7614,10 +7751,10 @@
       </p:grpSp>
       <p:cxnSp>
         <p:nvCxnSpPr>
-          <p:cNvPr id="98" name="Google Shape;98;p15"/>
+          <p:cNvPr id="97" name="Google Shape;97;p15"/>
           <p:cNvCxnSpPr>
-            <a:stCxn id="99" idx="0"/>
-            <a:endCxn id="88" idx="2"/>
+            <a:stCxn id="98" idx="0"/>
+            <a:endCxn id="87" idx="2"/>
           </p:cNvCxnSpPr>
           <p:nvPr/>
         </p:nvCxnSpPr>
@@ -7645,14 +7782,14 @@
       </p:cxnSp>
       <p:sp>
         <p:nvSpPr>
-          <p:cNvPr id="100" name="Google Shape;100;p15"/>
+          <p:cNvPr id="99" name="Google Shape;99;p15"/>
           <p:cNvSpPr txBox="1"/>
           <p:nvPr/>
         </p:nvSpPr>
         <p:spPr>
           <a:xfrm>
-            <a:off x="300750" y="3498922"/>
-            <a:ext cx="8542500" cy="1367400"/>
+            <a:off x="300750" y="3405000"/>
+            <a:ext cx="8351700" cy="1550100"/>
           </a:xfrm>
           <a:prstGeom prst="rect">
             <a:avLst/>
@@ -7717,10 +7854,10 @@
       </p:sp>
       <p:cxnSp>
         <p:nvCxnSpPr>
-          <p:cNvPr id="101" name="Google Shape;101;p15"/>
+          <p:cNvPr id="100" name="Google Shape;100;p15"/>
           <p:cNvCxnSpPr>
-            <a:stCxn id="92" idx="0"/>
-            <a:endCxn id="88" idx="2"/>
+            <a:stCxn id="91" idx="0"/>
+            <a:endCxn id="87" idx="2"/>
           </p:cNvCxnSpPr>
           <p:nvPr/>
         </p:nvCxnSpPr>
@@ -7748,7 +7885,7 @@
       </p:cxnSp>
       <p:sp>
         <p:nvSpPr>
-          <p:cNvPr id="102" name="Google Shape;102;p15"/>
+          <p:cNvPr id="101" name="Google Shape;101;p15"/>
           <p:cNvSpPr/>
           <p:nvPr/>
         </p:nvSpPr>
@@ -7792,7 +7929,11 @@
             </a:pPr>
             <a:r>
               <a:rPr lang="pt-BR" sz="1000"/>
-              <a:t>Alocar morador para participar como voluntário</a:t>
+              <a:t>Alocar Munícipe para participar como </a:t>
+            </a:r>
+            <a:r>
+              <a:rPr lang="pt-BR" sz="1000"/>
+              <a:t>Voluntário</a:t>
             </a:r>
             <a:endParaRPr b="0" i="0" sz="1000" u="none" cap="none" strike="noStrike">
               <a:solidFill>
@@ -7808,7 +7949,7 @@
       </p:sp>
       <p:sp>
         <p:nvSpPr>
-          <p:cNvPr id="99" name="Google Shape;99;p15"/>
+          <p:cNvPr id="98" name="Google Shape;98;p15"/>
           <p:cNvSpPr/>
           <p:nvPr/>
         </p:nvSpPr>
@@ -7888,10 +8029,10 @@
       </p:sp>
       <p:cxnSp>
         <p:nvCxnSpPr>
-          <p:cNvPr id="103" name="Google Shape;103;p15"/>
+          <p:cNvPr id="102" name="Google Shape;102;p15"/>
           <p:cNvCxnSpPr>
-            <a:stCxn id="102" idx="3"/>
-            <a:endCxn id="99" idx="2"/>
+            <a:stCxn id="101" idx="3"/>
+            <a:endCxn id="98" idx="2"/>
           </p:cNvCxnSpPr>
           <p:nvPr/>
         </p:nvCxnSpPr>
@@ -7917,10 +8058,10 @@
       </p:cxnSp>
       <p:cxnSp>
         <p:nvCxnSpPr>
-          <p:cNvPr id="104" name="Google Shape;104;p15"/>
+          <p:cNvPr id="103" name="Google Shape;103;p15"/>
           <p:cNvCxnSpPr>
-            <a:stCxn id="105" idx="0"/>
-            <a:endCxn id="88" idx="2"/>
+            <a:stCxn id="104" idx="0"/>
+            <a:endCxn id="87" idx="2"/>
           </p:cNvCxnSpPr>
           <p:nvPr/>
         </p:nvCxnSpPr>
@@ -7948,13 +8089,13 @@
       </p:cxnSp>
       <p:sp>
         <p:nvSpPr>
-          <p:cNvPr id="106" name="Google Shape;106;p15"/>
+          <p:cNvPr id="105" name="Google Shape;105;p15"/>
           <p:cNvSpPr/>
           <p:nvPr/>
         </p:nvSpPr>
         <p:spPr>
           <a:xfrm>
-            <a:off x="5731400" y="3943025"/>
+            <a:off x="5675875" y="3943025"/>
             <a:ext cx="2845500" cy="622800"/>
           </a:xfrm>
           <a:prstGeom prst="bracketPair">
@@ -7992,7 +8133,7 @@
             </a:pPr>
             <a:r>
               <a:rPr lang="pt-BR" sz="1000"/>
-              <a:t>Receber voluntário</a:t>
+              <a:t>Receber novo Voluntário</a:t>
             </a:r>
             <a:endParaRPr sz="1000"/>
           </a:p>
@@ -8000,21 +8141,21 @@
       </p:sp>
       <p:cxnSp>
         <p:nvCxnSpPr>
-          <p:cNvPr id="107" name="Google Shape;107;p15"/>
+          <p:cNvPr id="106" name="Google Shape;106;p15"/>
           <p:cNvCxnSpPr>
-            <a:stCxn id="106" idx="1"/>
-            <a:endCxn id="105" idx="2"/>
+            <a:stCxn id="105" idx="1"/>
+            <a:endCxn id="104" idx="2"/>
           </p:cNvCxnSpPr>
           <p:nvPr/>
         </p:nvCxnSpPr>
         <p:spPr>
           <a:xfrm flipH="1" rot="10800000">
-            <a:off x="5731400" y="3148325"/>
-            <a:ext cx="75600" cy="1106100"/>
+            <a:off x="5675875" y="3148325"/>
+            <a:ext cx="131100" cy="1106100"/>
           </a:xfrm>
           <a:prstGeom prst="curvedConnector4">
             <a:avLst>
-              <a:gd fmla="val -314980" name="adj1"/>
+              <a:gd fmla="val -181636" name="adj1"/>
               <a:gd fmla="val 64074" name="adj2"/>
             </a:avLst>
           </a:prstGeom>
@@ -8032,7 +8173,7 @@
       </p:cxnSp>
       <p:sp>
         <p:nvSpPr>
-          <p:cNvPr id="105" name="Google Shape;105;p15"/>
+          <p:cNvPr id="104" name="Google Shape;104;p15"/>
           <p:cNvSpPr/>
           <p:nvPr/>
         </p:nvSpPr>
@@ -8123,7 +8264,7 @@
   <p:cSld>
     <p:spTree>
       <p:nvGrpSpPr>
-        <p:cNvPr id="111" name="Shape 111"/>
+        <p:cNvPr id="110" name="Shape 110"/>
         <p:cNvGrpSpPr/>
         <p:nvPr/>
       </p:nvGrpSpPr>
@@ -8137,14 +8278,14 @@
       </p:grpSpPr>
       <p:sp>
         <p:nvSpPr>
-          <p:cNvPr id="112" name="Google Shape;112;p16"/>
+          <p:cNvPr id="111" name="Google Shape;111;p16"/>
           <p:cNvSpPr/>
           <p:nvPr/>
         </p:nvSpPr>
         <p:spPr>
           <a:xfrm>
-            <a:off x="3521850" y="429525"/>
-            <a:ext cx="2100300" cy="802800"/>
+            <a:off x="3404900" y="166475"/>
+            <a:ext cx="2215800" cy="802800"/>
           </a:xfrm>
           <a:prstGeom prst="wave">
             <a:avLst>
@@ -8153,7 +8294,7 @@
             </a:avLst>
           </a:prstGeom>
           <a:solidFill>
-            <a:srgbClr val="EFEFEF"/>
+            <a:schemeClr val="lt2"/>
           </a:solidFill>
           <a:ln cap="flat" cmpd="sng" w="9525">
             <a:solidFill>
@@ -8186,7 +8327,7 @@
                   <a:schemeClr val="dk1"/>
                 </a:solidFill>
               </a:rPr>
-              <a:t>Requisitar</a:t>
+              <a:t>Solicitar</a:t>
             </a:r>
             <a:r>
               <a:rPr lang="pt-BR" sz="1000">
@@ -8206,7 +8347,7 @@
       </p:sp>
       <p:sp>
         <p:nvSpPr>
-          <p:cNvPr id="113" name="Google Shape;113;p16"/>
+          <p:cNvPr id="112" name="Google Shape;112;p16"/>
           <p:cNvSpPr txBox="1"/>
           <p:nvPr/>
         </p:nvSpPr>
@@ -8262,7 +8403,11 @@
                 <a:cs typeface="Arial"/>
                 <a:sym typeface="Arial"/>
               </a:rPr>
-              <a:t>Nós Operacionais</a:t>
+              <a:t>Nós Operaciona</a:t>
+            </a:r>
+            <a:r>
+              <a:rPr lang="pt-BR"/>
+              <a:t>is</a:t>
             </a:r>
             <a:endParaRPr b="0" i="0" sz="1400" u="none" cap="none" strike="noStrike">
               <a:solidFill>
@@ -8278,21 +8423,21 @@
       </p:sp>
       <p:grpSp>
         <p:nvGrpSpPr>
-          <p:cNvPr id="114" name="Google Shape;114;p16"/>
+          <p:cNvPr id="113" name="Google Shape;113;p16"/>
           <p:cNvGrpSpPr/>
           <p:nvPr/>
         </p:nvGrpSpPr>
         <p:grpSpPr>
           <a:xfrm>
             <a:off x="1503275" y="2574515"/>
-            <a:ext cx="1230900" cy="830485"/>
+            <a:ext cx="1259100" cy="830485"/>
             <a:chOff x="2699598" y="3424900"/>
-            <a:chExt cx="1230900" cy="830485"/>
+            <a:chExt cx="1259100" cy="830485"/>
           </a:xfrm>
         </p:grpSpPr>
         <p:grpSp>
           <p:nvGrpSpPr>
-            <p:cNvPr id="115" name="Google Shape;115;p16"/>
+            <p:cNvPr id="114" name="Google Shape;114;p16"/>
             <p:cNvGrpSpPr/>
             <p:nvPr/>
           </p:nvGrpSpPr>
@@ -8306,7 +8451,7 @@
           </p:grpSpPr>
           <p:sp>
             <p:nvSpPr>
-              <p:cNvPr id="116" name="Google Shape;116;p16"/>
+              <p:cNvPr id="115" name="Google Shape;115;p16"/>
               <p:cNvSpPr/>
               <p:nvPr/>
             </p:nvSpPr>
@@ -8371,9 +8516,9 @@
           </p:sp>
           <p:cxnSp>
             <p:nvCxnSpPr>
-              <p:cNvPr id="117" name="Google Shape;117;p16"/>
+              <p:cNvPr id="116" name="Google Shape;116;p16"/>
               <p:cNvCxnSpPr>
-                <a:stCxn id="116" idx="4"/>
+                <a:stCxn id="115" idx="4"/>
               </p:cNvCxnSpPr>
               <p:nvPr/>
             </p:nvCxnSpPr>
@@ -8399,7 +8544,7 @@
           </p:cxnSp>
           <p:cxnSp>
             <p:nvCxnSpPr>
-              <p:cNvPr id="118" name="Google Shape;118;p16"/>
+              <p:cNvPr id="117" name="Google Shape;117;p16"/>
               <p:cNvCxnSpPr/>
               <p:nvPr/>
             </p:nvCxnSpPr>
@@ -8425,7 +8570,7 @@
           </p:cxnSp>
           <p:cxnSp>
             <p:nvCxnSpPr>
-              <p:cNvPr id="119" name="Google Shape;119;p16"/>
+              <p:cNvPr id="118" name="Google Shape;118;p16"/>
               <p:cNvCxnSpPr/>
               <p:nvPr/>
             </p:nvCxnSpPr>
@@ -8451,7 +8596,7 @@
           </p:cxnSp>
           <p:cxnSp>
             <p:nvCxnSpPr>
-              <p:cNvPr id="120" name="Google Shape;120;p16"/>
+              <p:cNvPr id="119" name="Google Shape;119;p16"/>
               <p:cNvCxnSpPr/>
               <p:nvPr/>
             </p:nvCxnSpPr>
@@ -8478,14 +8623,14 @@
         </p:grpSp>
         <p:sp>
           <p:nvSpPr>
-            <p:cNvPr id="121" name="Google Shape;121;p16"/>
+            <p:cNvPr id="120" name="Google Shape;120;p16"/>
             <p:cNvSpPr txBox="1"/>
             <p:nvPr/>
           </p:nvSpPr>
           <p:spPr>
             <a:xfrm>
               <a:off x="2699598" y="3912485"/>
-              <a:ext cx="1230900" cy="342900"/>
+              <a:ext cx="1259100" cy="342900"/>
             </a:xfrm>
             <a:prstGeom prst="rect">
               <a:avLst/>
@@ -8501,7 +8646,7 @@
             </a:bodyPr>
             <a:lstStyle/>
             <a:p>
-              <a:pPr indent="0" lvl="0" marL="0" marR="0" rtl="0" algn="l">
+              <a:pPr indent="0" lvl="0" marL="0" marR="0" rtl="0" algn="ctr">
                 <a:lnSpc>
                   <a:spcPct val="100000"/>
                 </a:lnSpc>
@@ -8520,15 +8665,30 @@
               </a:pPr>
               <a:r>
                 <a:rPr b="1" lang="pt-BR" sz="1200"/>
-                <a:t>      </a:t>
+                <a:t>Munícipe</a:t>
               </a:r>
+              <a:endParaRPr b="1" sz="1200"/>
+            </a:p>
+            <a:p>
+              <a:pPr indent="0" lvl="0" marL="0" marR="0" rtl="0" algn="ctr">
+                <a:lnSpc>
+                  <a:spcPct val="100000"/>
+                </a:lnSpc>
+                <a:spcBef>
+                  <a:spcPts val="0"/>
+                </a:spcBef>
+                <a:spcAft>
+                  <a:spcPts val="0"/>
+                </a:spcAft>
+                <a:buClr>
+                  <a:srgbClr val="000000"/>
+                </a:buClr>
+                <a:buSzPts val="1200"/>
+                <a:buFont typeface="Arial"/>
+                <a:buNone/>
+              </a:pPr>
               <a:r>
-                <a:rPr b="1" lang="pt-BR" sz="1200">
-                  <a:solidFill>
-                    <a:schemeClr val="dk1"/>
-                  </a:solidFill>
-                </a:rPr>
-                <a:t>Prefeito</a:t>
+                <a:t/>
               </a:r>
               <a:endParaRPr b="1" sz="1200"/>
             </a:p>
@@ -8537,21 +8697,21 @@
       </p:grpSp>
       <p:cxnSp>
         <p:nvCxnSpPr>
-          <p:cNvPr id="122" name="Google Shape;122;p16"/>
+          <p:cNvPr id="121" name="Google Shape;121;p16"/>
           <p:cNvCxnSpPr>
-            <a:stCxn id="123" idx="0"/>
-            <a:endCxn id="112" idx="2"/>
+            <a:stCxn id="122" idx="0"/>
+            <a:endCxn id="111" idx="2"/>
           </p:cNvCxnSpPr>
           <p:nvPr/>
         </p:nvCxnSpPr>
         <p:spPr>
-          <a:xfrm rot="-5400000">
-            <a:off x="3863549" y="1840375"/>
-            <a:ext cx="1417500" cy="600"/>
+          <a:xfrm flipH="1" rot="5400000">
+            <a:off x="4949637" y="432163"/>
+            <a:ext cx="1761900" cy="2635500"/>
           </a:xfrm>
           <a:prstGeom prst="curvedConnector3">
             <a:avLst>
-              <a:gd fmla="val 46592" name="adj1"/>
+              <a:gd fmla="val 47261" name="adj1"/>
             </a:avLst>
           </a:prstGeom>
           <a:noFill/>
@@ -8568,7 +8728,7 @@
       </p:cxnSp>
       <p:sp>
         <p:nvSpPr>
-          <p:cNvPr id="124" name="Google Shape;124;p16"/>
+          <p:cNvPr id="123" name="Google Shape;123;p16"/>
           <p:cNvSpPr txBox="1"/>
           <p:nvPr/>
         </p:nvSpPr>
@@ -8640,21 +8800,21 @@
       </p:sp>
       <p:cxnSp>
         <p:nvCxnSpPr>
-          <p:cNvPr id="125" name="Google Shape;125;p16"/>
+          <p:cNvPr id="124" name="Google Shape;124;p16"/>
           <p:cNvCxnSpPr>
-            <a:stCxn id="116" idx="0"/>
-            <a:endCxn id="112" idx="2"/>
+            <a:stCxn id="115" idx="0"/>
+            <a:endCxn id="111" idx="2"/>
           </p:cNvCxnSpPr>
           <p:nvPr/>
         </p:nvCxnSpPr>
         <p:spPr>
           <a:xfrm rot="-5400000">
-            <a:off x="2648952" y="651365"/>
-            <a:ext cx="1442400" cy="2403900"/>
+            <a:off x="2487702" y="549515"/>
+            <a:ext cx="1705500" cy="2344500"/>
           </a:xfrm>
           <a:prstGeom prst="curvedConnector3">
             <a:avLst>
-              <a:gd fmla="val 46658" name="adj1"/>
+              <a:gd fmla="val 47172" name="adj1"/>
             </a:avLst>
           </a:prstGeom>
           <a:noFill/>
@@ -8671,14 +8831,14 @@
       </p:cxnSp>
       <p:sp>
         <p:nvSpPr>
-          <p:cNvPr id="126" name="Google Shape;126;p16"/>
+          <p:cNvPr id="125" name="Google Shape;125;p16"/>
           <p:cNvSpPr/>
           <p:nvPr/>
         </p:nvSpPr>
         <p:spPr>
           <a:xfrm>
-            <a:off x="5764000" y="4002550"/>
-            <a:ext cx="2346000" cy="711600"/>
+            <a:off x="4981250" y="4105825"/>
+            <a:ext cx="2564400" cy="622800"/>
           </a:xfrm>
           <a:prstGeom prst="bracketPair">
             <a:avLst/>
@@ -8700,7 +8860,7 @@
           </a:bodyPr>
           <a:lstStyle/>
           <a:p>
-            <a:pPr indent="-304800" lvl="0" marL="457200" marR="0" rtl="0" algn="l">
+            <a:pPr indent="-298450" lvl="0" marL="457200" marR="0" rtl="0" algn="l">
               <a:lnSpc>
                 <a:spcPct val="100000"/>
               </a:lnSpc>
@@ -8713,39 +8873,46 @@
               <a:buClr>
                 <a:schemeClr val="dk1"/>
               </a:buClr>
-              <a:buSzPts val="1200"/>
+              <a:buSzPts val="1100"/>
               <a:buChar char="●"/>
             </a:pPr>
             <a:r>
-              <a:rPr lang="pt-BR" sz="1200">
+              <a:rPr lang="pt-BR" sz="1100">
                 <a:solidFill>
                   <a:schemeClr val="dk1"/>
                 </a:solidFill>
               </a:rPr>
-              <a:t>Criar Pasta Solicitada</a:t>
+              <a:t>Analisar criação de Pasta</a:t>
             </a:r>
-            <a:endParaRPr sz="1200">
+            <a:endParaRPr b="0" i="0" sz="1100" u="none" cap="none" strike="noStrike">
               <a:solidFill>
-                <a:schemeClr val="dk1"/>
+                <a:srgbClr val="000000"/>
               </a:solidFill>
+              <a:highlight>
+                <a:srgbClr val="FFFF00"/>
+              </a:highlight>
+              <a:latin typeface="Arial"/>
+              <a:ea typeface="Arial"/>
+              <a:cs typeface="Arial"/>
+              <a:sym typeface="Arial"/>
             </a:endParaRPr>
           </a:p>
         </p:txBody>
       </p:sp>
       <p:sp>
         <p:nvSpPr>
-          <p:cNvPr id="123" name="Google Shape;123;p16"/>
+          <p:cNvPr id="122" name="Google Shape;122;p16"/>
           <p:cNvSpPr/>
           <p:nvPr/>
         </p:nvSpPr>
         <p:spPr>
           <a:xfrm>
-            <a:off x="3942449" y="2549425"/>
+            <a:off x="6518787" y="2630863"/>
             <a:ext cx="1259100" cy="531600"/>
           </a:xfrm>
           <a:prstGeom prst="roundRect">
             <a:avLst>
-              <a:gd fmla="val 0" name="adj"/>
+              <a:gd fmla="val 16667" name="adj"/>
             </a:avLst>
           </a:prstGeom>
           <a:gradFill>
@@ -8799,34 +8966,29 @@
               <a:rPr lang="pt-BR" sz="1000"/>
               <a:t>Administrativo</a:t>
             </a:r>
-            <a:endParaRPr b="0" i="0" sz="1000" u="none" cap="none" strike="noStrike">
-              <a:solidFill>
-                <a:srgbClr val="000000"/>
-              </a:solidFill>
-              <a:latin typeface="Arial"/>
-              <a:ea typeface="Arial"/>
-              <a:cs typeface="Arial"/>
-              <a:sym typeface="Arial"/>
-            </a:endParaRPr>
+            <a:endParaRPr sz="1000"/>
           </a:p>
         </p:txBody>
       </p:sp>
       <p:cxnSp>
         <p:nvCxnSpPr>
-          <p:cNvPr id="127" name="Google Shape;127;p16"/>
+          <p:cNvPr id="126" name="Google Shape;126;p16"/>
           <p:cNvCxnSpPr>
-            <a:stCxn id="126" idx="1"/>
-            <a:endCxn id="123" idx="2"/>
+            <a:stCxn id="125" idx="3"/>
+            <a:endCxn id="122" idx="2"/>
           </p:cNvCxnSpPr>
           <p:nvPr/>
         </p:nvCxnSpPr>
         <p:spPr>
           <a:xfrm rot="10800000">
-            <a:off x="4572100" y="3080950"/>
-            <a:ext cx="1191900" cy="1277400"/>
+            <a:off x="7148450" y="3162325"/>
+            <a:ext cx="397200" cy="1254900"/>
           </a:xfrm>
-          <a:prstGeom prst="curvedConnector2">
-            <a:avLst/>
+          <a:prstGeom prst="curvedConnector4">
+            <a:avLst>
+              <a:gd fmla="val -59951" name="adj1"/>
+              <a:gd fmla="val 62402" name="adj2"/>
+            </a:avLst>
           </a:prstGeom>
           <a:noFill/>
           <a:ln cap="flat" cmpd="sng" w="9525">
@@ -8840,6 +9002,198 @@
           </a:ln>
         </p:spPr>
       </p:cxnSp>
+      <p:cxnSp>
+        <p:nvCxnSpPr>
+          <p:cNvPr id="127" name="Google Shape;127;p16"/>
+          <p:cNvCxnSpPr>
+            <a:stCxn id="128" idx="0"/>
+            <a:endCxn id="111" idx="2"/>
+          </p:cNvCxnSpPr>
+          <p:nvPr/>
+        </p:nvCxnSpPr>
+        <p:spPr>
+          <a:xfrm rot="-5400000">
+            <a:off x="3581199" y="1653625"/>
+            <a:ext cx="1716300" cy="146700"/>
+          </a:xfrm>
+          <a:prstGeom prst="curvedConnector3">
+            <a:avLst>
+              <a:gd fmla="val 47184" name="adj1"/>
+            </a:avLst>
+          </a:prstGeom>
+          <a:noFill/>
+          <a:ln cap="flat" cmpd="sng" w="9525">
+            <a:solidFill>
+              <a:srgbClr val="595959"/>
+            </a:solidFill>
+            <a:prstDash val="solid"/>
+            <a:round/>
+            <a:headEnd len="sm" w="sm" type="none"/>
+            <a:tailEnd len="sm" w="sm" type="none"/>
+          </a:ln>
+        </p:spPr>
+      </p:cxnSp>
+      <p:sp>
+        <p:nvSpPr>
+          <p:cNvPr id="129" name="Google Shape;129;p16"/>
+          <p:cNvSpPr/>
+          <p:nvPr/>
+        </p:nvSpPr>
+        <p:spPr>
+          <a:xfrm>
+            <a:off x="1070100" y="4105825"/>
+            <a:ext cx="2394000" cy="622800"/>
+          </a:xfrm>
+          <a:prstGeom prst="bracketPair">
+            <a:avLst/>
+          </a:prstGeom>
+          <a:noFill/>
+          <a:ln cap="flat" cmpd="sng" w="9525">
+            <a:solidFill>
+              <a:srgbClr val="595959"/>
+            </a:solidFill>
+            <a:prstDash val="solid"/>
+            <a:round/>
+            <a:headEnd len="sm" w="sm" type="none"/>
+            <a:tailEnd len="sm" w="sm" type="none"/>
+          </a:ln>
+        </p:spPr>
+        <p:txBody>
+          <a:bodyPr anchorCtr="0" anchor="ctr" bIns="91425" lIns="91425" spcFirstLastPara="1" rIns="91425" wrap="square" tIns="91425">
+            <a:noAutofit/>
+          </a:bodyPr>
+          <a:lstStyle/>
+          <a:p>
+            <a:pPr indent="-292100" lvl="0" marL="457200" marR="0" rtl="0" algn="l">
+              <a:lnSpc>
+                <a:spcPct val="100000"/>
+              </a:lnSpc>
+              <a:spcBef>
+                <a:spcPts val="0"/>
+              </a:spcBef>
+              <a:spcAft>
+                <a:spcPts val="0"/>
+              </a:spcAft>
+              <a:buSzPts val="1000"/>
+              <a:buChar char="●"/>
+            </a:pPr>
+            <a:r>
+              <a:rPr lang="pt-BR" sz="1000"/>
+              <a:t>Solicitar criação de Pasta</a:t>
+            </a:r>
+            <a:endParaRPr sz="1000"/>
+          </a:p>
+        </p:txBody>
+      </p:sp>
+      <p:cxnSp>
+        <p:nvCxnSpPr>
+          <p:cNvPr id="130" name="Google Shape;130;p16"/>
+          <p:cNvCxnSpPr>
+            <a:stCxn id="129" idx="3"/>
+            <a:endCxn id="128" idx="2"/>
+          </p:cNvCxnSpPr>
+          <p:nvPr/>
+        </p:nvCxnSpPr>
+        <p:spPr>
+          <a:xfrm flipH="1" rot="10800000">
+            <a:off x="3464100" y="3116725"/>
+            <a:ext cx="901800" cy="1300500"/>
+          </a:xfrm>
+          <a:prstGeom prst="curvedConnector2">
+            <a:avLst/>
+          </a:prstGeom>
+          <a:noFill/>
+          <a:ln cap="flat" cmpd="sng" w="9525">
+            <a:solidFill>
+              <a:srgbClr val="595959"/>
+            </a:solidFill>
+            <a:prstDash val="solid"/>
+            <a:round/>
+            <a:headEnd len="sm" w="sm" type="none"/>
+            <a:tailEnd len="sm" w="sm" type="none"/>
+          </a:ln>
+        </p:spPr>
+      </p:cxnSp>
+      <p:sp>
+        <p:nvSpPr>
+          <p:cNvPr id="128" name="Google Shape;128;p16"/>
+          <p:cNvSpPr/>
+          <p:nvPr/>
+        </p:nvSpPr>
+        <p:spPr>
+          <a:xfrm>
+            <a:off x="3736449" y="2585125"/>
+            <a:ext cx="1259100" cy="531600"/>
+          </a:xfrm>
+          <a:prstGeom prst="roundRect">
+            <a:avLst>
+              <a:gd fmla="val 16667" name="adj"/>
+            </a:avLst>
+          </a:prstGeom>
+          <a:gradFill>
+            <a:gsLst>
+              <a:gs pos="0">
+                <a:srgbClr val="D4E5F5"/>
+              </a:gs>
+              <a:gs pos="100000">
+                <a:srgbClr val="70A4D5"/>
+              </a:gs>
+            </a:gsLst>
+            <a:path path="circle">
+              <a:fillToRect b="50%" l="50%" r="50%" t="50%"/>
+            </a:path>
+            <a:tileRect/>
+          </a:gradFill>
+          <a:ln cap="flat" cmpd="sng" w="9525">
+            <a:solidFill>
+              <a:srgbClr val="F3F3F3"/>
+            </a:solidFill>
+            <a:prstDash val="solid"/>
+            <a:round/>
+            <a:headEnd len="sm" w="sm" type="none"/>
+            <a:tailEnd len="sm" w="sm" type="none"/>
+          </a:ln>
+        </p:spPr>
+        <p:txBody>
+          <a:bodyPr anchorCtr="0" anchor="ctr" bIns="91425" lIns="91425" spcFirstLastPara="1" rIns="91425" wrap="square" tIns="91425">
+            <a:noAutofit/>
+          </a:bodyPr>
+          <a:lstStyle/>
+          <a:p>
+            <a:pPr indent="0" lvl="0" marL="0" rtl="0" algn="ctr">
+              <a:spcBef>
+                <a:spcPts val="0"/>
+              </a:spcBef>
+              <a:spcAft>
+                <a:spcPts val="0"/>
+              </a:spcAft>
+              <a:buClr>
+                <a:schemeClr val="dk1"/>
+              </a:buClr>
+              <a:buSzPts val="1000"/>
+              <a:buFont typeface="Arial"/>
+              <a:buNone/>
+            </a:pPr>
+            <a:r>
+              <a:rPr lang="pt-BR" sz="1000">
+                <a:solidFill>
+                  <a:schemeClr val="dk1"/>
+                </a:solidFill>
+              </a:rPr>
+              <a:t>Operacional</a:t>
+            </a:r>
+            <a:endParaRPr b="0" i="0" sz="1000" u="none" cap="none" strike="noStrike">
+              <a:solidFill>
+                <a:srgbClr val="000000"/>
+              </a:solidFill>
+              <a:latin typeface="Arial"/>
+              <a:ea typeface="Arial"/>
+              <a:cs typeface="Arial"/>
+              <a:sym typeface="Arial"/>
+            </a:endParaRPr>
+          </a:p>
+        </p:txBody>
+      </p:sp>
     </p:spTree>
   </p:cSld>
   <p:clrMapOvr>
@@ -8853,7 +9207,7 @@
   <p:cSld>
     <p:spTree>
       <p:nvGrpSpPr>
-        <p:cNvPr id="131" name="Shape 131"/>
+        <p:cNvPr id="134" name="Shape 134"/>
         <p:cNvGrpSpPr/>
         <p:nvPr/>
       </p:nvGrpSpPr>
@@ -8867,14 +9221,14 @@
       </p:grpSpPr>
       <p:sp>
         <p:nvSpPr>
-          <p:cNvPr id="132" name="Google Shape;132;p17"/>
+          <p:cNvPr id="135" name="Google Shape;135;p17"/>
           <p:cNvSpPr/>
           <p:nvPr/>
         </p:nvSpPr>
         <p:spPr>
           <a:xfrm>
-            <a:off x="3404900" y="166475"/>
-            <a:ext cx="2215800" cy="802800"/>
+            <a:off x="3521850" y="136875"/>
+            <a:ext cx="2100300" cy="802800"/>
           </a:xfrm>
           <a:prstGeom prst="wave">
             <a:avLst>
@@ -8901,7 +9255,7 @@
           </a:bodyPr>
           <a:lstStyle/>
           <a:p>
-            <a:pPr indent="0" lvl="0" marL="0" rtl="0" algn="ctr">
+            <a:pPr indent="457200" lvl="0" marL="0" rtl="0" algn="l">
               <a:spcBef>
                 <a:spcPts val="0"/>
               </a:spcBef>
@@ -8916,33 +9270,124 @@
                   <a:schemeClr val="dk1"/>
                 </a:solidFill>
               </a:rPr>
-              <a:t>Solicitar</a:t>
+              <a:t>Interagir com Pasta</a:t>
             </a:r>
-            <a:r>
-              <a:rPr lang="pt-BR" sz="1000">
-                <a:solidFill>
-                  <a:schemeClr val="dk1"/>
-                </a:solidFill>
-              </a:rPr>
-              <a:t> assunto para estudo</a:t>
-            </a:r>
-            <a:endParaRPr b="1" sz="1000">
-              <a:solidFill>
-                <a:schemeClr val="dk1"/>
-              </a:solidFill>
-            </a:endParaRPr>
+            <a:endParaRPr/>
           </a:p>
         </p:txBody>
       </p:sp>
       <p:sp>
         <p:nvSpPr>
-          <p:cNvPr id="133" name="Google Shape;133;p17"/>
+          <p:cNvPr id="136" name="Google Shape;136;p17"/>
           <p:cNvSpPr txBox="1"/>
           <p:nvPr/>
         </p:nvSpPr>
         <p:spPr>
           <a:xfrm>
-            <a:off x="300750" y="2131525"/>
+            <a:off x="379300" y="1888050"/>
+            <a:ext cx="8542500" cy="1611000"/>
+          </a:xfrm>
+          <a:prstGeom prst="rect">
+            <a:avLst/>
+          </a:prstGeom>
+          <a:noFill/>
+          <a:ln cap="flat" cmpd="sng" w="9525">
+            <a:solidFill>
+              <a:srgbClr val="FF9900"/>
+            </a:solidFill>
+            <a:prstDash val="solid"/>
+            <a:round/>
+            <a:headEnd len="sm" w="sm" type="none"/>
+            <a:tailEnd len="sm" w="sm" type="none"/>
+          </a:ln>
+        </p:spPr>
+        <p:txBody>
+          <a:bodyPr anchorCtr="0" anchor="t" bIns="91425" lIns="91425" spcFirstLastPara="1" rIns="91425" wrap="square" tIns="91425">
+            <a:noAutofit/>
+          </a:bodyPr>
+          <a:lstStyle/>
+          <a:p>
+            <a:pPr indent="0" lvl="0" marL="0" marR="0" rtl="0" algn="l">
+              <a:lnSpc>
+                <a:spcPct val="100000"/>
+              </a:lnSpc>
+              <a:spcBef>
+                <a:spcPts val="0"/>
+              </a:spcBef>
+              <a:spcAft>
+                <a:spcPts val="0"/>
+              </a:spcAft>
+              <a:buClr>
+                <a:srgbClr val="000000"/>
+              </a:buClr>
+              <a:buSzPts val="1400"/>
+              <a:buFont typeface="Arial"/>
+              <a:buNone/>
+            </a:pPr>
+            <a:r>
+              <a:rPr b="0" i="0" lang="pt-BR" sz="1400" u="none" cap="none" strike="noStrike">
+                <a:solidFill>
+                  <a:srgbClr val="000000"/>
+                </a:solidFill>
+                <a:latin typeface="Arial"/>
+                <a:ea typeface="Arial"/>
+                <a:cs typeface="Arial"/>
+                <a:sym typeface="Arial"/>
+              </a:rPr>
+              <a:t>Nós Operacionais</a:t>
+            </a:r>
+            <a:endParaRPr b="0" i="0" sz="1400" u="none" cap="none" strike="noStrike">
+              <a:solidFill>
+                <a:srgbClr val="000000"/>
+              </a:solidFill>
+              <a:latin typeface="Arial"/>
+              <a:ea typeface="Arial"/>
+              <a:cs typeface="Arial"/>
+              <a:sym typeface="Arial"/>
+            </a:endParaRPr>
+          </a:p>
+        </p:txBody>
+      </p:sp>
+      <p:cxnSp>
+        <p:nvCxnSpPr>
+          <p:cNvPr id="137" name="Google Shape;137;p17"/>
+          <p:cNvCxnSpPr>
+            <a:stCxn id="138" idx="0"/>
+            <a:endCxn id="135" idx="2"/>
+          </p:cNvCxnSpPr>
+          <p:nvPr/>
+        </p:nvCxnSpPr>
+        <p:spPr>
+          <a:xfrm flipH="1" rot="5400000">
+            <a:off x="4393874" y="1017600"/>
+            <a:ext cx="1631700" cy="1275300"/>
+          </a:xfrm>
+          <a:prstGeom prst="curvedConnector3">
+            <a:avLst>
+              <a:gd fmla="val 47043" name="adj1"/>
+            </a:avLst>
+          </a:prstGeom>
+          <a:noFill/>
+          <a:ln cap="flat" cmpd="sng" w="9525">
+            <a:solidFill>
+              <a:srgbClr val="595959"/>
+            </a:solidFill>
+            <a:prstDash val="solid"/>
+            <a:round/>
+            <a:headEnd len="sm" w="sm" type="none"/>
+            <a:tailEnd len="sm" w="sm" type="none"/>
+          </a:ln>
+        </p:spPr>
+      </p:cxnSp>
+      <p:sp>
+        <p:nvSpPr>
+          <p:cNvPr id="139" name="Google Shape;139;p17"/>
+          <p:cNvSpPr txBox="1"/>
+          <p:nvPr/>
+        </p:nvSpPr>
+        <p:spPr>
+          <a:xfrm>
+            <a:off x="379300" y="3498922"/>
             <a:ext cx="8542500" cy="1367400"/>
           </a:xfrm>
           <a:prstGeom prst="rect">
@@ -8992,11 +9437,7 @@
                 <a:cs typeface="Arial"/>
                 <a:sym typeface="Arial"/>
               </a:rPr>
-              <a:t>Nós Operaciona</a:t>
-            </a:r>
-            <a:r>
-              <a:rPr lang="pt-BR"/>
-              <a:t>is</a:t>
+              <a:t>Capacidades Operacionais</a:t>
             </a:r>
             <a:endParaRPr b="0" i="0" sz="1400" u="none" cap="none" strike="noStrike">
               <a:solidFill>
@@ -9010,29 +9451,140 @@
           </a:p>
         </p:txBody>
       </p:sp>
+      <p:sp>
+        <p:nvSpPr>
+          <p:cNvPr id="138" name="Google Shape;138;p17"/>
+          <p:cNvSpPr/>
+          <p:nvPr/>
+        </p:nvSpPr>
+        <p:spPr>
+          <a:xfrm>
+            <a:off x="5217824" y="2471100"/>
+            <a:ext cx="1259100" cy="531600"/>
+          </a:xfrm>
+          <a:prstGeom prst="roundRect">
+            <a:avLst>
+              <a:gd fmla="val 16667" name="adj"/>
+            </a:avLst>
+          </a:prstGeom>
+          <a:gradFill>
+            <a:gsLst>
+              <a:gs pos="0">
+                <a:srgbClr val="D4E5F5"/>
+              </a:gs>
+              <a:gs pos="100000">
+                <a:srgbClr val="70A4D5"/>
+              </a:gs>
+            </a:gsLst>
+            <a:path path="circle">
+              <a:fillToRect b="50%" l="50%" r="50%" t="50%"/>
+            </a:path>
+            <a:tileRect/>
+          </a:gradFill>
+          <a:ln cap="flat" cmpd="sng" w="9525">
+            <a:solidFill>
+              <a:srgbClr val="F3F3F3"/>
+            </a:solidFill>
+            <a:prstDash val="solid"/>
+            <a:round/>
+            <a:headEnd len="sm" w="sm" type="none"/>
+            <a:tailEnd len="sm" w="sm" type="none"/>
+          </a:ln>
+        </p:spPr>
+        <p:txBody>
+          <a:bodyPr anchorCtr="0" anchor="ctr" bIns="91425" lIns="91425" spcFirstLastPara="1" rIns="91425" wrap="square" tIns="91425">
+            <a:noAutofit/>
+          </a:bodyPr>
+          <a:lstStyle/>
+          <a:p>
+            <a:pPr indent="0" lvl="0" marL="0" rtl="0" algn="ctr">
+              <a:spcBef>
+                <a:spcPts val="0"/>
+              </a:spcBef>
+              <a:spcAft>
+                <a:spcPts val="0"/>
+              </a:spcAft>
+              <a:buClr>
+                <a:schemeClr val="dk1"/>
+              </a:buClr>
+              <a:buSzPts val="1000"/>
+              <a:buFont typeface="Arial"/>
+              <a:buNone/>
+            </a:pPr>
+            <a:r>
+              <a:rPr lang="pt-BR" sz="1000">
+                <a:solidFill>
+                  <a:schemeClr val="dk1"/>
+                </a:solidFill>
+              </a:rPr>
+              <a:t>Operacional</a:t>
+            </a:r>
+            <a:endParaRPr b="0" i="0" sz="1000" u="none" cap="none" strike="noStrike">
+              <a:solidFill>
+                <a:srgbClr val="000000"/>
+              </a:solidFill>
+              <a:latin typeface="Arial"/>
+              <a:ea typeface="Arial"/>
+              <a:cs typeface="Arial"/>
+              <a:sym typeface="Arial"/>
+            </a:endParaRPr>
+          </a:p>
+        </p:txBody>
+      </p:sp>
+      <p:cxnSp>
+        <p:nvCxnSpPr>
+          <p:cNvPr id="140" name="Google Shape;140;p17"/>
+          <p:cNvCxnSpPr>
+            <a:stCxn id="141" idx="0"/>
+            <a:endCxn id="135" idx="2"/>
+          </p:cNvCxnSpPr>
+          <p:nvPr/>
+        </p:nvCxnSpPr>
+        <p:spPr>
+          <a:xfrm flipH="1" rot="5400000">
+            <a:off x="5323531" y="87751"/>
+            <a:ext cx="1553400" cy="3056700"/>
+          </a:xfrm>
+          <a:prstGeom prst="curvedConnector3">
+            <a:avLst>
+              <a:gd fmla="val 46894" name="adj1"/>
+            </a:avLst>
+          </a:prstGeom>
+          <a:noFill/>
+          <a:ln cap="flat" cmpd="sng" w="9525">
+            <a:solidFill>
+              <a:srgbClr val="595959"/>
+            </a:solidFill>
+            <a:prstDash val="solid"/>
+            <a:round/>
+            <a:headEnd len="sm" w="sm" type="none"/>
+            <a:tailEnd len="sm" w="sm" type="none"/>
+          </a:ln>
+        </p:spPr>
+      </p:cxnSp>
       <p:grpSp>
         <p:nvGrpSpPr>
-          <p:cNvPr id="134" name="Google Shape;134;p17"/>
+          <p:cNvPr id="142" name="Google Shape;142;p17"/>
           <p:cNvGrpSpPr/>
           <p:nvPr/>
         </p:nvGrpSpPr>
         <p:grpSpPr>
           <a:xfrm>
-            <a:off x="1503275" y="2574515"/>
-            <a:ext cx="1259100" cy="830485"/>
-            <a:chOff x="2699598" y="3424900"/>
-            <a:chExt cx="1259100" cy="830485"/>
+            <a:off x="6946875" y="2392801"/>
+            <a:ext cx="1364700" cy="844849"/>
+            <a:chOff x="6521198" y="3204287"/>
+            <a:chExt cx="1364700" cy="844849"/>
           </a:xfrm>
         </p:grpSpPr>
         <p:grpSp>
           <p:nvGrpSpPr>
-            <p:cNvPr id="135" name="Google Shape;135;p17"/>
+            <p:cNvPr id="143" name="Google Shape;143;p17"/>
             <p:cNvGrpSpPr/>
             <p:nvPr/>
           </p:nvGrpSpPr>
           <p:grpSpPr>
             <a:xfrm>
-              <a:off x="3206356" y="3424900"/>
+              <a:off x="7044735" y="3204287"/>
               <a:ext cx="308885" cy="587736"/>
               <a:chOff x="1499725" y="1450825"/>
               <a:chExt cx="497400" cy="843600"/>
@@ -9040,7 +9592,7 @@
           </p:grpSpPr>
           <p:sp>
             <p:nvSpPr>
-              <p:cNvPr id="136" name="Google Shape;136;p17"/>
+              <p:cNvPr id="141" name="Google Shape;141;p17"/>
               <p:cNvSpPr/>
               <p:nvPr/>
             </p:nvSpPr>
@@ -9105,9 +9657,9 @@
           </p:sp>
           <p:cxnSp>
             <p:nvCxnSpPr>
-              <p:cNvPr id="137" name="Google Shape;137;p17"/>
+              <p:cNvPr id="144" name="Google Shape;144;p17"/>
               <p:cNvCxnSpPr>
-                <a:stCxn id="136" idx="4"/>
+                <a:stCxn id="141" idx="4"/>
               </p:cNvCxnSpPr>
               <p:nvPr/>
             </p:nvCxnSpPr>
@@ -9133,7 +9685,7 @@
           </p:cxnSp>
           <p:cxnSp>
             <p:nvCxnSpPr>
-              <p:cNvPr id="138" name="Google Shape;138;p17"/>
+              <p:cNvPr id="145" name="Google Shape;145;p17"/>
               <p:cNvCxnSpPr/>
               <p:nvPr/>
             </p:nvCxnSpPr>
@@ -9159,7 +9711,7 @@
           </p:cxnSp>
           <p:cxnSp>
             <p:nvCxnSpPr>
-              <p:cNvPr id="139" name="Google Shape;139;p17"/>
+              <p:cNvPr id="146" name="Google Shape;146;p17"/>
               <p:cNvCxnSpPr/>
               <p:nvPr/>
             </p:nvCxnSpPr>
@@ -9185,7 +9737,7 @@
           </p:cxnSp>
           <p:cxnSp>
             <p:nvCxnSpPr>
-              <p:cNvPr id="140" name="Google Shape;140;p17"/>
+              <p:cNvPr id="147" name="Google Shape;147;p17"/>
               <p:cNvCxnSpPr/>
               <p:nvPr/>
             </p:nvCxnSpPr>
@@ -9212,14 +9764,14 @@
         </p:grpSp>
         <p:sp>
           <p:nvSpPr>
-            <p:cNvPr id="141" name="Google Shape;141;p17"/>
+            <p:cNvPr id="148" name="Google Shape;148;p17"/>
             <p:cNvSpPr txBox="1"/>
             <p:nvPr/>
           </p:nvSpPr>
           <p:spPr>
             <a:xfrm>
-              <a:off x="2699598" y="3912485"/>
-              <a:ext cx="1259100" cy="342900"/>
+              <a:off x="6521198" y="3706236"/>
+              <a:ext cx="1364700" cy="342900"/>
             </a:xfrm>
             <a:prstGeom prst="rect">
               <a:avLst/>
@@ -9254,7 +9806,15 @@
               </a:pPr>
               <a:r>
                 <a:rPr b="1" lang="pt-BR" sz="1200"/>
-                <a:t>Munícipes</a:t>
+                <a:t> </a:t>
+              </a:r>
+              <a:r>
+                <a:rPr b="1" lang="pt-BR" sz="1200">
+                  <a:solidFill>
+                    <a:schemeClr val="dk1"/>
+                  </a:solidFill>
+                </a:rPr>
+                <a:t>Munícipe</a:t>
               </a:r>
               <a:endParaRPr b="1" i="0" sz="1200" u="none" cap="none" strike="noStrike">
                 <a:solidFill>
@@ -9271,148 +9831,46 @@
       </p:grpSp>
       <p:cxnSp>
         <p:nvCxnSpPr>
-          <p:cNvPr id="142" name="Google Shape;142;p17"/>
+          <p:cNvPr id="149" name="Google Shape;149;p17"/>
           <p:cNvCxnSpPr>
-            <a:stCxn id="143" idx="0"/>
-            <a:endCxn id="132" idx="2"/>
+            <a:stCxn id="138" idx="2"/>
+            <a:endCxn id="150" idx="1"/>
           </p:cNvCxnSpPr>
           <p:nvPr/>
         </p:nvCxnSpPr>
         <p:spPr>
-          <a:xfrm flipH="1" rot="5400000">
-            <a:off x="4949637" y="432163"/>
-            <a:ext cx="1761900" cy="2635500"/>
+          <a:xfrm rot="5400000">
+            <a:off x="5025824" y="3361050"/>
+            <a:ext cx="1179900" cy="463200"/>
           </a:xfrm>
-          <a:prstGeom prst="curvedConnector3">
+          <a:prstGeom prst="curvedConnector4">
             <a:avLst>
-              <a:gd fmla="val 47261" name="adj1"/>
+              <a:gd fmla="val 32991" name="adj1"/>
+              <a:gd fmla="val 151441" name="adj2"/>
             </a:avLst>
           </a:prstGeom>
           <a:noFill/>
           <a:ln cap="flat" cmpd="sng" w="9525">
             <a:solidFill>
-              <a:srgbClr val="595959"/>
+              <a:schemeClr val="dk2"/>
             </a:solidFill>
             <a:prstDash val="solid"/>
             <a:round/>
-            <a:headEnd len="sm" w="sm" type="none"/>
-            <a:tailEnd len="sm" w="sm" type="none"/>
+            <a:headEnd len="med" w="med" type="none"/>
+            <a:tailEnd len="med" w="med" type="none"/>
           </a:ln>
         </p:spPr>
       </p:cxnSp>
       <p:sp>
         <p:nvSpPr>
-          <p:cNvPr id="144" name="Google Shape;144;p17"/>
-          <p:cNvSpPr txBox="1"/>
-          <p:nvPr/>
-        </p:nvSpPr>
-        <p:spPr>
-          <a:xfrm>
-            <a:off x="300750" y="3498922"/>
-            <a:ext cx="8542500" cy="1367400"/>
-          </a:xfrm>
-          <a:prstGeom prst="rect">
-            <a:avLst/>
-          </a:prstGeom>
-          <a:noFill/>
-          <a:ln cap="flat" cmpd="sng" w="9525">
-            <a:solidFill>
-              <a:srgbClr val="FF9900"/>
-            </a:solidFill>
-            <a:prstDash val="solid"/>
-            <a:round/>
-            <a:headEnd len="sm" w="sm" type="none"/>
-            <a:tailEnd len="sm" w="sm" type="none"/>
-          </a:ln>
-        </p:spPr>
-        <p:txBody>
-          <a:bodyPr anchorCtr="0" anchor="t" bIns="91425" lIns="91425" spcFirstLastPara="1" rIns="91425" wrap="square" tIns="91425">
-            <a:noAutofit/>
-          </a:bodyPr>
-          <a:lstStyle/>
-          <a:p>
-            <a:pPr indent="0" lvl="0" marL="0" marR="0" rtl="0" algn="l">
-              <a:lnSpc>
-                <a:spcPct val="100000"/>
-              </a:lnSpc>
-              <a:spcBef>
-                <a:spcPts val="0"/>
-              </a:spcBef>
-              <a:spcAft>
-                <a:spcPts val="0"/>
-              </a:spcAft>
-              <a:buClr>
-                <a:srgbClr val="000000"/>
-              </a:buClr>
-              <a:buSzPts val="1400"/>
-              <a:buFont typeface="Arial"/>
-              <a:buNone/>
-            </a:pPr>
-            <a:r>
-              <a:rPr b="0" i="0" lang="pt-BR" sz="1400" u="none" cap="none" strike="noStrike">
-                <a:solidFill>
-                  <a:srgbClr val="000000"/>
-                </a:solidFill>
-                <a:latin typeface="Arial"/>
-                <a:ea typeface="Arial"/>
-                <a:cs typeface="Arial"/>
-                <a:sym typeface="Arial"/>
-              </a:rPr>
-              <a:t>Capacidades Operacionais</a:t>
-            </a:r>
-            <a:endParaRPr b="0" i="0" sz="1400" u="none" cap="none" strike="noStrike">
-              <a:solidFill>
-                <a:srgbClr val="000000"/>
-              </a:solidFill>
-              <a:latin typeface="Arial"/>
-              <a:ea typeface="Arial"/>
-              <a:cs typeface="Arial"/>
-              <a:sym typeface="Arial"/>
-            </a:endParaRPr>
-          </a:p>
-        </p:txBody>
-      </p:sp>
-      <p:cxnSp>
-        <p:nvCxnSpPr>
-          <p:cNvPr id="145" name="Google Shape;145;p17"/>
-          <p:cNvCxnSpPr>
-            <a:stCxn id="136" idx="0"/>
-            <a:endCxn id="132" idx="2"/>
-          </p:cNvCxnSpPr>
-          <p:nvPr/>
-        </p:nvCxnSpPr>
-        <p:spPr>
-          <a:xfrm rot="-5400000">
-            <a:off x="2487702" y="549515"/>
-            <a:ext cx="1705500" cy="2344500"/>
-          </a:xfrm>
-          <a:prstGeom prst="curvedConnector3">
-            <a:avLst>
-              <a:gd fmla="val 47172" name="adj1"/>
-            </a:avLst>
-          </a:prstGeom>
-          <a:noFill/>
-          <a:ln cap="flat" cmpd="sng" w="9525">
-            <a:solidFill>
-              <a:srgbClr val="595959"/>
-            </a:solidFill>
-            <a:prstDash val="solid"/>
-            <a:round/>
-            <a:headEnd len="sm" w="sm" type="none"/>
-            <a:tailEnd len="sm" w="sm" type="none"/>
-          </a:ln>
-        </p:spPr>
-      </p:cxnSp>
-      <p:sp>
-        <p:nvSpPr>
-          <p:cNvPr id="146" name="Google Shape;146;p17"/>
+          <p:cNvPr id="150" name="Google Shape;150;p17"/>
           <p:cNvSpPr/>
           <p:nvPr/>
         </p:nvSpPr>
         <p:spPr>
           <a:xfrm>
-            <a:off x="4981250" y="4105825"/>
-            <a:ext cx="2564400" cy="622800"/>
+            <a:off x="5384025" y="3781225"/>
+            <a:ext cx="2927400" cy="802800"/>
           </a:xfrm>
           <a:prstGeom prst="bracketPair">
             <a:avLst/>
@@ -9444,259 +9902,30 @@
               <a:spcAft>
                 <a:spcPts val="0"/>
               </a:spcAft>
-              <a:buClr>
-                <a:schemeClr val="dk1"/>
-              </a:buClr>
               <a:buSzPts val="1100"/>
               <a:buChar char="●"/>
             </a:pPr>
             <a:r>
-              <a:rPr lang="pt-BR" sz="1100">
-                <a:solidFill>
-                  <a:schemeClr val="dk1"/>
-                </a:solidFill>
-              </a:rPr>
-              <a:t>Analisar criação de Pasta</a:t>
+              <a:rPr lang="pt-BR" sz="1100"/>
+              <a:t>Compartilhar estudo na </a:t>
             </a:r>
-            <a:endParaRPr b="0" i="0" sz="1100" u="none" cap="none" strike="noStrike">
-              <a:solidFill>
-                <a:srgbClr val="000000"/>
-              </a:solidFill>
-              <a:highlight>
-                <a:srgbClr val="FFFF00"/>
-              </a:highlight>
-              <a:latin typeface="Arial"/>
-              <a:ea typeface="Arial"/>
-              <a:cs typeface="Arial"/>
-              <a:sym typeface="Arial"/>
-            </a:endParaRPr>
+            <a:r>
+              <a:rPr lang="pt-BR" sz="1100"/>
+              <a:t>Pasta</a:t>
+            </a:r>
+            <a:endParaRPr sz="1100"/>
           </a:p>
         </p:txBody>
       </p:sp>
       <p:sp>
         <p:nvSpPr>
-          <p:cNvPr id="143" name="Google Shape;143;p17"/>
+          <p:cNvPr id="151" name="Google Shape;151;p17"/>
           <p:cNvSpPr/>
           <p:nvPr/>
         </p:nvSpPr>
         <p:spPr>
           <a:xfrm>
-            <a:off x="6518787" y="2630863"/>
-            <a:ext cx="1259100" cy="531600"/>
-          </a:xfrm>
-          <a:prstGeom prst="roundRect">
-            <a:avLst>
-              <a:gd fmla="val 16667" name="adj"/>
-            </a:avLst>
-          </a:prstGeom>
-          <a:gradFill>
-            <a:gsLst>
-              <a:gs pos="0">
-                <a:srgbClr val="D4E5F5"/>
-              </a:gs>
-              <a:gs pos="100000">
-                <a:srgbClr val="70A4D5"/>
-              </a:gs>
-            </a:gsLst>
-            <a:path path="circle">
-              <a:fillToRect b="50%" l="50%" r="50%" t="50%"/>
-            </a:path>
-            <a:tileRect/>
-          </a:gradFill>
-          <a:ln cap="flat" cmpd="sng" w="9525">
-            <a:solidFill>
-              <a:srgbClr val="F3F3F3"/>
-            </a:solidFill>
-            <a:prstDash val="solid"/>
-            <a:round/>
-            <a:headEnd len="sm" w="sm" type="none"/>
-            <a:tailEnd len="sm" w="sm" type="none"/>
-          </a:ln>
-        </p:spPr>
-        <p:txBody>
-          <a:bodyPr anchorCtr="0" anchor="ctr" bIns="91425" lIns="91425" spcFirstLastPara="1" rIns="91425" wrap="square" tIns="91425">
-            <a:noAutofit/>
-          </a:bodyPr>
-          <a:lstStyle/>
-          <a:p>
-            <a:pPr indent="0" lvl="0" marL="0" marR="0" rtl="0" algn="ctr">
-              <a:lnSpc>
-                <a:spcPct val="100000"/>
-              </a:lnSpc>
-              <a:spcBef>
-                <a:spcPts val="0"/>
-              </a:spcBef>
-              <a:spcAft>
-                <a:spcPts val="0"/>
-              </a:spcAft>
-              <a:buClr>
-                <a:srgbClr val="000000"/>
-              </a:buClr>
-              <a:buSzPts val="1000"/>
-              <a:buFont typeface="Arial"/>
-              <a:buNone/>
-            </a:pPr>
-            <a:r>
-              <a:rPr lang="pt-BR" sz="1000"/>
-              <a:t>Administrativo</a:t>
-            </a:r>
-            <a:endParaRPr sz="1000"/>
-          </a:p>
-        </p:txBody>
-      </p:sp>
-      <p:cxnSp>
-        <p:nvCxnSpPr>
-          <p:cNvPr id="147" name="Google Shape;147;p17"/>
-          <p:cNvCxnSpPr>
-            <a:stCxn id="146" idx="3"/>
-            <a:endCxn id="143" idx="2"/>
-          </p:cNvCxnSpPr>
-          <p:nvPr/>
-        </p:nvCxnSpPr>
-        <p:spPr>
-          <a:xfrm rot="10800000">
-            <a:off x="7148450" y="3162325"/>
-            <a:ext cx="397200" cy="1254900"/>
-          </a:xfrm>
-          <a:prstGeom prst="curvedConnector4">
-            <a:avLst>
-              <a:gd fmla="val -59951" name="adj1"/>
-              <a:gd fmla="val 62402" name="adj2"/>
-            </a:avLst>
-          </a:prstGeom>
-          <a:noFill/>
-          <a:ln cap="flat" cmpd="sng" w="9525">
-            <a:solidFill>
-              <a:schemeClr val="dk2"/>
-            </a:solidFill>
-            <a:prstDash val="solid"/>
-            <a:round/>
-            <a:headEnd len="med" w="med" type="none"/>
-            <a:tailEnd len="med" w="med" type="none"/>
-          </a:ln>
-        </p:spPr>
-      </p:cxnSp>
-      <p:cxnSp>
-        <p:nvCxnSpPr>
-          <p:cNvPr id="148" name="Google Shape;148;p17"/>
-          <p:cNvCxnSpPr>
-            <a:stCxn id="149" idx="0"/>
-            <a:endCxn id="132" idx="2"/>
-          </p:cNvCxnSpPr>
-          <p:nvPr/>
-        </p:nvCxnSpPr>
-        <p:spPr>
-          <a:xfrm rot="-5400000">
-            <a:off x="3581199" y="1653625"/>
-            <a:ext cx="1716300" cy="146700"/>
-          </a:xfrm>
-          <a:prstGeom prst="curvedConnector3">
-            <a:avLst>
-              <a:gd fmla="val 47184" name="adj1"/>
-            </a:avLst>
-          </a:prstGeom>
-          <a:noFill/>
-          <a:ln cap="flat" cmpd="sng" w="9525">
-            <a:solidFill>
-              <a:srgbClr val="595959"/>
-            </a:solidFill>
-            <a:prstDash val="solid"/>
-            <a:round/>
-            <a:headEnd len="sm" w="sm" type="none"/>
-            <a:tailEnd len="sm" w="sm" type="none"/>
-          </a:ln>
-        </p:spPr>
-      </p:cxnSp>
-      <p:sp>
-        <p:nvSpPr>
-          <p:cNvPr id="150" name="Google Shape;150;p17"/>
-          <p:cNvSpPr/>
-          <p:nvPr/>
-        </p:nvSpPr>
-        <p:spPr>
-          <a:xfrm>
-            <a:off x="1070100" y="4105825"/>
-            <a:ext cx="2394000" cy="622800"/>
-          </a:xfrm>
-          <a:prstGeom prst="bracketPair">
-            <a:avLst/>
-          </a:prstGeom>
-          <a:noFill/>
-          <a:ln cap="flat" cmpd="sng" w="9525">
-            <a:solidFill>
-              <a:srgbClr val="595959"/>
-            </a:solidFill>
-            <a:prstDash val="solid"/>
-            <a:round/>
-            <a:headEnd len="sm" w="sm" type="none"/>
-            <a:tailEnd len="sm" w="sm" type="none"/>
-          </a:ln>
-        </p:spPr>
-        <p:txBody>
-          <a:bodyPr anchorCtr="0" anchor="ctr" bIns="91425" lIns="91425" spcFirstLastPara="1" rIns="91425" wrap="square" tIns="91425">
-            <a:noAutofit/>
-          </a:bodyPr>
-          <a:lstStyle/>
-          <a:p>
-            <a:pPr indent="-292100" lvl="0" marL="457200" marR="0" rtl="0" algn="l">
-              <a:lnSpc>
-                <a:spcPct val="100000"/>
-              </a:lnSpc>
-              <a:spcBef>
-                <a:spcPts val="0"/>
-              </a:spcBef>
-              <a:spcAft>
-                <a:spcPts val="0"/>
-              </a:spcAft>
-              <a:buSzPts val="1000"/>
-              <a:buChar char="●"/>
-            </a:pPr>
-            <a:r>
-              <a:rPr lang="pt-BR" sz="1000"/>
-              <a:t>Solicitar criação de Pasta</a:t>
-            </a:r>
-            <a:endParaRPr sz="1000"/>
-          </a:p>
-        </p:txBody>
-      </p:sp>
-      <p:cxnSp>
-        <p:nvCxnSpPr>
-          <p:cNvPr id="151" name="Google Shape;151;p17"/>
-          <p:cNvCxnSpPr>
-            <a:stCxn id="150" idx="3"/>
-            <a:endCxn id="149" idx="2"/>
-          </p:cNvCxnSpPr>
-          <p:nvPr/>
-        </p:nvCxnSpPr>
-        <p:spPr>
-          <a:xfrm flipH="1" rot="10800000">
-            <a:off x="3464100" y="3116725"/>
-            <a:ext cx="901800" cy="1300500"/>
-          </a:xfrm>
-          <a:prstGeom prst="curvedConnector2">
-            <a:avLst/>
-          </a:prstGeom>
-          <a:noFill/>
-          <a:ln cap="flat" cmpd="sng" w="9525">
-            <a:solidFill>
-              <a:srgbClr val="595959"/>
-            </a:solidFill>
-            <a:prstDash val="solid"/>
-            <a:round/>
-            <a:headEnd len="sm" w="sm" type="none"/>
-            <a:tailEnd len="sm" w="sm" type="none"/>
-          </a:ln>
-        </p:spPr>
-      </p:cxnSp>
-      <p:sp>
-        <p:nvSpPr>
-          <p:cNvPr id="149" name="Google Shape;149;p17"/>
-          <p:cNvSpPr/>
-          <p:nvPr/>
-        </p:nvSpPr>
-        <p:spPr>
-          <a:xfrm>
-            <a:off x="3736449" y="2585125"/>
+            <a:off x="3336238" y="2471088"/>
             <a:ext cx="1259100" cy="531600"/>
           </a:xfrm>
           <a:prstGeom prst="roundRect">
@@ -9754,343 +9983,6 @@
                   <a:schemeClr val="dk1"/>
                 </a:solidFill>
               </a:rPr>
-              <a:t>Operacional</a:t>
-            </a:r>
-            <a:endParaRPr b="0" i="0" sz="1000" u="none" cap="none" strike="noStrike">
-              <a:solidFill>
-                <a:srgbClr val="000000"/>
-              </a:solidFill>
-              <a:latin typeface="Arial"/>
-              <a:ea typeface="Arial"/>
-              <a:cs typeface="Arial"/>
-              <a:sym typeface="Arial"/>
-            </a:endParaRPr>
-          </a:p>
-        </p:txBody>
-      </p:sp>
-    </p:spTree>
-  </p:cSld>
-  <p:clrMapOvr>
-    <a:masterClrMapping/>
-  </p:clrMapOvr>
-</p:sld>
-</file>
-
-<file path=ppt/slides/slide6.xml><?xml version="1.0" encoding="utf-8"?>
-<p:sld xmlns:a="http://schemas.openxmlformats.org/drawingml/2006/main" xmlns:r="http://schemas.openxmlformats.org/officeDocument/2006/relationships" xmlns:mc="http://schemas.openxmlformats.org/markup-compatibility/2006" xmlns:mv="urn:schemas-microsoft-com:mac:vml" xmlns:p="http://schemas.openxmlformats.org/presentationml/2006/main" xmlns:c="http://schemas.openxmlformats.org/drawingml/2006/chart" xmlns:dgm="http://schemas.openxmlformats.org/drawingml/2006/diagram" xmlns:o="urn:schemas-microsoft-com:office:office" xmlns:v="urn:schemas-microsoft-com:vml" xmlns:pvml="urn:schemas-microsoft-com:office:powerpoint" xmlns:com="http://schemas.openxmlformats.org/drawingml/2006/compatibility" xmlns:p14="http://schemas.microsoft.com/office/powerpoint/2010/main" xmlns:p15="http://schemas.microsoft.com/office/powerpoint/2012/main">
-  <p:cSld>
-    <p:spTree>
-      <p:nvGrpSpPr>
-        <p:cNvPr id="155" name="Shape 155"/>
-        <p:cNvGrpSpPr/>
-        <p:nvPr/>
-      </p:nvGrpSpPr>
-      <p:grpSpPr>
-        <a:xfrm>
-          <a:off x="0" y="0"/>
-          <a:ext cx="0" cy="0"/>
-          <a:chOff x="0" y="0"/>
-          <a:chExt cx="0" cy="0"/>
-        </a:xfrm>
-      </p:grpSpPr>
-      <p:sp>
-        <p:nvSpPr>
-          <p:cNvPr id="156" name="Google Shape;156;p18"/>
-          <p:cNvSpPr/>
-          <p:nvPr/>
-        </p:nvSpPr>
-        <p:spPr>
-          <a:xfrm>
-            <a:off x="3521850" y="136875"/>
-            <a:ext cx="2100300" cy="802800"/>
-          </a:xfrm>
-          <a:prstGeom prst="wave">
-            <a:avLst>
-              <a:gd fmla="val 12500" name="adj1"/>
-              <a:gd fmla="val 0" name="adj2"/>
-            </a:avLst>
-          </a:prstGeom>
-          <a:solidFill>
-            <a:schemeClr val="lt2"/>
-          </a:solidFill>
-          <a:ln cap="flat" cmpd="sng" w="9525">
-            <a:solidFill>
-              <a:schemeClr val="dk2"/>
-            </a:solidFill>
-            <a:prstDash val="solid"/>
-            <a:round/>
-            <a:headEnd len="sm" w="sm" type="none"/>
-            <a:tailEnd len="sm" w="sm" type="none"/>
-          </a:ln>
-        </p:spPr>
-        <p:txBody>
-          <a:bodyPr anchorCtr="0" anchor="ctr" bIns="91425" lIns="91425" spcFirstLastPara="1" rIns="91425" wrap="square" tIns="91425">
-            <a:noAutofit/>
-          </a:bodyPr>
-          <a:lstStyle/>
-          <a:p>
-            <a:pPr indent="0" lvl="0" marL="0" rtl="0" algn="ctr">
-              <a:spcBef>
-                <a:spcPts val="0"/>
-              </a:spcBef>
-              <a:spcAft>
-                <a:spcPts val="0"/>
-              </a:spcAft>
-              <a:buNone/>
-            </a:pPr>
-            <a:r>
-              <a:rPr lang="pt-BR" sz="1000">
-                <a:solidFill>
-                  <a:schemeClr val="dk1"/>
-                </a:solidFill>
-              </a:rPr>
-              <a:t>Receber relatórios de Estudos</a:t>
-            </a:r>
-            <a:endParaRPr/>
-          </a:p>
-        </p:txBody>
-      </p:sp>
-      <p:sp>
-        <p:nvSpPr>
-          <p:cNvPr id="157" name="Google Shape;157;p18"/>
-          <p:cNvSpPr txBox="1"/>
-          <p:nvPr/>
-        </p:nvSpPr>
-        <p:spPr>
-          <a:xfrm>
-            <a:off x="300750" y="2131525"/>
-            <a:ext cx="8542500" cy="1367400"/>
-          </a:xfrm>
-          <a:prstGeom prst="rect">
-            <a:avLst/>
-          </a:prstGeom>
-          <a:noFill/>
-          <a:ln cap="flat" cmpd="sng" w="9525">
-            <a:solidFill>
-              <a:srgbClr val="FF9900"/>
-            </a:solidFill>
-            <a:prstDash val="solid"/>
-            <a:round/>
-            <a:headEnd len="sm" w="sm" type="none"/>
-            <a:tailEnd len="sm" w="sm" type="none"/>
-          </a:ln>
-        </p:spPr>
-        <p:txBody>
-          <a:bodyPr anchorCtr="0" anchor="t" bIns="91425" lIns="91425" spcFirstLastPara="1" rIns="91425" wrap="square" tIns="91425">
-            <a:noAutofit/>
-          </a:bodyPr>
-          <a:lstStyle/>
-          <a:p>
-            <a:pPr indent="0" lvl="0" marL="0" marR="0" rtl="0" algn="l">
-              <a:lnSpc>
-                <a:spcPct val="100000"/>
-              </a:lnSpc>
-              <a:spcBef>
-                <a:spcPts val="0"/>
-              </a:spcBef>
-              <a:spcAft>
-                <a:spcPts val="0"/>
-              </a:spcAft>
-              <a:buClr>
-                <a:srgbClr val="000000"/>
-              </a:buClr>
-              <a:buSzPts val="1400"/>
-              <a:buFont typeface="Arial"/>
-              <a:buNone/>
-            </a:pPr>
-            <a:r>
-              <a:rPr b="0" i="0" lang="pt-BR" sz="1400" u="none" cap="none" strike="noStrike">
-                <a:solidFill>
-                  <a:srgbClr val="000000"/>
-                </a:solidFill>
-                <a:latin typeface="Arial"/>
-                <a:ea typeface="Arial"/>
-                <a:cs typeface="Arial"/>
-                <a:sym typeface="Arial"/>
-              </a:rPr>
-              <a:t>Nós Operacionais</a:t>
-            </a:r>
-            <a:endParaRPr b="0" i="0" sz="1400" u="none" cap="none" strike="noStrike">
-              <a:solidFill>
-                <a:srgbClr val="000000"/>
-              </a:solidFill>
-              <a:latin typeface="Arial"/>
-              <a:ea typeface="Arial"/>
-              <a:cs typeface="Arial"/>
-              <a:sym typeface="Arial"/>
-            </a:endParaRPr>
-          </a:p>
-        </p:txBody>
-      </p:sp>
-      <p:cxnSp>
-        <p:nvCxnSpPr>
-          <p:cNvPr id="158" name="Google Shape;158;p18"/>
-          <p:cNvCxnSpPr>
-            <a:stCxn id="159" idx="0"/>
-            <a:endCxn id="156" idx="2"/>
-          </p:cNvCxnSpPr>
-          <p:nvPr/>
-        </p:nvCxnSpPr>
-        <p:spPr>
-          <a:xfrm rot="-5400000">
-            <a:off x="3625399" y="1578100"/>
-            <a:ext cx="1685400" cy="207600"/>
-          </a:xfrm>
-          <a:prstGeom prst="curvedConnector3">
-            <a:avLst>
-              <a:gd fmla="val 47132" name="adj1"/>
-            </a:avLst>
-          </a:prstGeom>
-          <a:noFill/>
-          <a:ln cap="flat" cmpd="sng" w="9525">
-            <a:solidFill>
-              <a:srgbClr val="595959"/>
-            </a:solidFill>
-            <a:prstDash val="solid"/>
-            <a:round/>
-            <a:headEnd len="sm" w="sm" type="none"/>
-            <a:tailEnd len="sm" w="sm" type="none"/>
-          </a:ln>
-        </p:spPr>
-      </p:cxnSp>
-      <p:sp>
-        <p:nvSpPr>
-          <p:cNvPr id="160" name="Google Shape;160;p18"/>
-          <p:cNvSpPr txBox="1"/>
-          <p:nvPr/>
-        </p:nvSpPr>
-        <p:spPr>
-          <a:xfrm>
-            <a:off x="300750" y="3498922"/>
-            <a:ext cx="8542500" cy="1367400"/>
-          </a:xfrm>
-          <a:prstGeom prst="rect">
-            <a:avLst/>
-          </a:prstGeom>
-          <a:noFill/>
-          <a:ln cap="flat" cmpd="sng" w="9525">
-            <a:solidFill>
-              <a:srgbClr val="FF9900"/>
-            </a:solidFill>
-            <a:prstDash val="solid"/>
-            <a:round/>
-            <a:headEnd len="sm" w="sm" type="none"/>
-            <a:tailEnd len="sm" w="sm" type="none"/>
-          </a:ln>
-        </p:spPr>
-        <p:txBody>
-          <a:bodyPr anchorCtr="0" anchor="t" bIns="91425" lIns="91425" spcFirstLastPara="1" rIns="91425" wrap="square" tIns="91425">
-            <a:noAutofit/>
-          </a:bodyPr>
-          <a:lstStyle/>
-          <a:p>
-            <a:pPr indent="0" lvl="0" marL="0" marR="0" rtl="0" algn="l">
-              <a:lnSpc>
-                <a:spcPct val="100000"/>
-              </a:lnSpc>
-              <a:spcBef>
-                <a:spcPts val="0"/>
-              </a:spcBef>
-              <a:spcAft>
-                <a:spcPts val="0"/>
-              </a:spcAft>
-              <a:buClr>
-                <a:srgbClr val="000000"/>
-              </a:buClr>
-              <a:buSzPts val="1400"/>
-              <a:buFont typeface="Arial"/>
-              <a:buNone/>
-            </a:pPr>
-            <a:r>
-              <a:rPr b="0" i="0" lang="pt-BR" sz="1400" u="none" cap="none" strike="noStrike">
-                <a:solidFill>
-                  <a:srgbClr val="000000"/>
-                </a:solidFill>
-                <a:latin typeface="Arial"/>
-                <a:ea typeface="Arial"/>
-                <a:cs typeface="Arial"/>
-                <a:sym typeface="Arial"/>
-              </a:rPr>
-              <a:t>Capacidades Operacionais</a:t>
-            </a:r>
-            <a:endParaRPr b="0" i="0" sz="1400" u="none" cap="none" strike="noStrike">
-              <a:solidFill>
-                <a:srgbClr val="000000"/>
-              </a:solidFill>
-              <a:latin typeface="Arial"/>
-              <a:ea typeface="Arial"/>
-              <a:cs typeface="Arial"/>
-              <a:sym typeface="Arial"/>
-            </a:endParaRPr>
-          </a:p>
-        </p:txBody>
-      </p:sp>
-      <p:sp>
-        <p:nvSpPr>
-          <p:cNvPr id="159" name="Google Shape;159;p18"/>
-          <p:cNvSpPr/>
-          <p:nvPr/>
-        </p:nvSpPr>
-        <p:spPr>
-          <a:xfrm>
-            <a:off x="3734749" y="2524600"/>
-            <a:ext cx="1259100" cy="531600"/>
-          </a:xfrm>
-          <a:prstGeom prst="roundRect">
-            <a:avLst>
-              <a:gd fmla="val 16667" name="adj"/>
-            </a:avLst>
-          </a:prstGeom>
-          <a:gradFill>
-            <a:gsLst>
-              <a:gs pos="0">
-                <a:srgbClr val="D4E5F5"/>
-              </a:gs>
-              <a:gs pos="100000">
-                <a:srgbClr val="70A4D5"/>
-              </a:gs>
-            </a:gsLst>
-            <a:path path="circle">
-              <a:fillToRect b="50%" l="50%" r="50%" t="50%"/>
-            </a:path>
-            <a:tileRect/>
-          </a:gradFill>
-          <a:ln cap="flat" cmpd="sng" w="9525">
-            <a:solidFill>
-              <a:srgbClr val="F3F3F3"/>
-            </a:solidFill>
-            <a:prstDash val="solid"/>
-            <a:round/>
-            <a:headEnd len="sm" w="sm" type="none"/>
-            <a:tailEnd len="sm" w="sm" type="none"/>
-          </a:ln>
-        </p:spPr>
-        <p:txBody>
-          <a:bodyPr anchorCtr="0" anchor="ctr" bIns="91425" lIns="91425" spcFirstLastPara="1" rIns="91425" wrap="square" tIns="91425">
-            <a:noAutofit/>
-          </a:bodyPr>
-          <a:lstStyle/>
-          <a:p>
-            <a:pPr indent="0" lvl="0" marL="0" rtl="0" algn="ctr">
-              <a:spcBef>
-                <a:spcPts val="0"/>
-              </a:spcBef>
-              <a:spcAft>
-                <a:spcPts val="0"/>
-              </a:spcAft>
-              <a:buClr>
-                <a:schemeClr val="dk1"/>
-              </a:buClr>
-              <a:buSzPts val="1000"/>
-              <a:buFont typeface="Arial"/>
-              <a:buNone/>
-            </a:pPr>
-            <a:r>
-              <a:rPr lang="pt-BR" sz="1000">
-                <a:solidFill>
-                  <a:schemeClr val="dk1"/>
-                </a:solidFill>
-              </a:rPr>
               <a:t>Administrativo</a:t>
             </a:r>
             <a:endParaRPr b="0" i="0" sz="1000" u="none" cap="none" strike="noStrike">
@@ -10105,21 +9997,128 @@
           </a:p>
         </p:txBody>
       </p:sp>
+      <p:sp>
+        <p:nvSpPr>
+          <p:cNvPr id="152" name="Google Shape;152;p17"/>
+          <p:cNvSpPr/>
+          <p:nvPr/>
+        </p:nvSpPr>
+        <p:spPr>
+          <a:xfrm>
+            <a:off x="1705550" y="3885325"/>
+            <a:ext cx="2723400" cy="698700"/>
+          </a:xfrm>
+          <a:prstGeom prst="bracketPair">
+            <a:avLst/>
+          </a:prstGeom>
+          <a:noFill/>
+          <a:ln cap="flat" cmpd="sng" w="9525">
+            <a:solidFill>
+              <a:srgbClr val="595959"/>
+            </a:solidFill>
+            <a:prstDash val="solid"/>
+            <a:round/>
+            <a:headEnd len="sm" w="sm" type="none"/>
+            <a:tailEnd len="sm" w="sm" type="none"/>
+          </a:ln>
+        </p:spPr>
+        <p:txBody>
+          <a:bodyPr anchorCtr="0" anchor="ctr" bIns="91425" lIns="91425" spcFirstLastPara="1" rIns="91425" wrap="square" tIns="91425">
+            <a:noAutofit/>
+          </a:bodyPr>
+          <a:lstStyle/>
+          <a:p>
+            <a:pPr indent="-298450" lvl="0" marL="457200" marR="0" rtl="0" algn="l">
+              <a:lnSpc>
+                <a:spcPct val="100000"/>
+              </a:lnSpc>
+              <a:spcBef>
+                <a:spcPts val="0"/>
+              </a:spcBef>
+              <a:spcAft>
+                <a:spcPts val="0"/>
+              </a:spcAft>
+              <a:buSzPts val="1100"/>
+              <a:buChar char="●"/>
+            </a:pPr>
+            <a:r>
+              <a:rPr lang="pt-BR" sz="1100"/>
+              <a:t>Realizar análise técnica</a:t>
+            </a:r>
+            <a:endParaRPr sz="1100"/>
+          </a:p>
+          <a:p>
+            <a:pPr indent="-298450" lvl="0" marL="457200" marR="0" rtl="0" algn="l">
+              <a:lnSpc>
+                <a:spcPct val="100000"/>
+              </a:lnSpc>
+              <a:spcBef>
+                <a:spcPts val="0"/>
+              </a:spcBef>
+              <a:spcAft>
+                <a:spcPts val="0"/>
+              </a:spcAft>
+              <a:buSzPts val="1100"/>
+              <a:buChar char="●"/>
+            </a:pPr>
+            <a:r>
+              <a:rPr lang="pt-BR" sz="1100"/>
+              <a:t>Disponibilizar parecer oficial</a:t>
+            </a:r>
+            <a:endParaRPr sz="1100"/>
+          </a:p>
+        </p:txBody>
+      </p:sp>
       <p:cxnSp>
         <p:nvCxnSpPr>
-          <p:cNvPr id="161" name="Google Shape;161;p18"/>
+          <p:cNvPr id="153" name="Google Shape;153;p17"/>
           <p:cNvCxnSpPr>
-            <a:endCxn id="156" idx="2"/>
+            <a:stCxn id="151" idx="2"/>
+            <a:endCxn id="152" idx="3"/>
           </p:cNvCxnSpPr>
           <p:nvPr/>
         </p:nvCxnSpPr>
         <p:spPr>
-          <a:xfrm rot="10800000">
-            <a:off x="4572000" y="839325"/>
-            <a:ext cx="2129400" cy="1560600"/>
+          <a:xfrm flipH="1" rot="-5400000">
+            <a:off x="3581338" y="3387138"/>
+            <a:ext cx="1232100" cy="463200"/>
           </a:xfrm>
-          <a:prstGeom prst="curvedConnector2">
-            <a:avLst/>
+          <a:prstGeom prst="curvedConnector4">
+            <a:avLst>
+              <a:gd fmla="val 35818" name="adj1"/>
+              <a:gd fmla="val 151401" name="adj2"/>
+            </a:avLst>
+          </a:prstGeom>
+          <a:noFill/>
+          <a:ln cap="flat" cmpd="sng" w="9525">
+            <a:solidFill>
+              <a:schemeClr val="dk2"/>
+            </a:solidFill>
+            <a:prstDash val="solid"/>
+            <a:round/>
+            <a:headEnd len="med" w="med" type="none"/>
+            <a:tailEnd len="med" w="med" type="none"/>
+          </a:ln>
+        </p:spPr>
+      </p:cxnSp>
+      <p:cxnSp>
+        <p:nvCxnSpPr>
+          <p:cNvPr id="154" name="Google Shape;154;p17"/>
+          <p:cNvCxnSpPr>
+            <a:stCxn id="151" idx="0"/>
+            <a:endCxn id="135" idx="2"/>
+          </p:cNvCxnSpPr>
+          <p:nvPr/>
+        </p:nvCxnSpPr>
+        <p:spPr>
+          <a:xfrm rot="-5400000">
+            <a:off x="3453088" y="1352088"/>
+            <a:ext cx="1631700" cy="606300"/>
+          </a:xfrm>
+          <a:prstGeom prst="curvedConnector3">
+            <a:avLst>
+              <a:gd fmla="val 47043" name="adj1"/>
+            </a:avLst>
           </a:prstGeom>
           <a:noFill/>
           <a:ln cap="flat" cmpd="sng" w="9525">
@@ -10135,21 +10134,21 @@
       </p:cxnSp>
       <p:grpSp>
         <p:nvGrpSpPr>
-          <p:cNvPr id="162" name="Google Shape;162;p18"/>
+          <p:cNvPr id="155" name="Google Shape;155;p17"/>
           <p:cNvGrpSpPr/>
           <p:nvPr/>
         </p:nvGrpSpPr>
         <p:grpSpPr>
           <a:xfrm>
-            <a:off x="6019750" y="2399976"/>
-            <a:ext cx="1534800" cy="844849"/>
+            <a:off x="1349050" y="2392801"/>
+            <a:ext cx="1364700" cy="844849"/>
             <a:chOff x="6521198" y="3204287"/>
-            <a:chExt cx="1534800" cy="844849"/>
+            <a:chExt cx="1364700" cy="844849"/>
           </a:xfrm>
         </p:grpSpPr>
         <p:grpSp>
           <p:nvGrpSpPr>
-            <p:cNvPr id="163" name="Google Shape;163;p18"/>
+            <p:cNvPr id="156" name="Google Shape;156;p17"/>
             <p:cNvGrpSpPr/>
             <p:nvPr/>
           </p:nvGrpSpPr>
@@ -10163,7 +10162,7 @@
           </p:grpSpPr>
           <p:sp>
             <p:nvSpPr>
-              <p:cNvPr id="164" name="Google Shape;164;p18"/>
+              <p:cNvPr id="157" name="Google Shape;157;p17"/>
               <p:cNvSpPr/>
               <p:nvPr/>
             </p:nvSpPr>
@@ -10228,9 +10227,9 @@
           </p:sp>
           <p:cxnSp>
             <p:nvCxnSpPr>
-              <p:cNvPr id="165" name="Google Shape;165;p18"/>
+              <p:cNvPr id="158" name="Google Shape;158;p17"/>
               <p:cNvCxnSpPr>
-                <a:stCxn id="164" idx="4"/>
+                <a:stCxn id="157" idx="4"/>
               </p:cNvCxnSpPr>
               <p:nvPr/>
             </p:nvCxnSpPr>
@@ -10256,7 +10255,7 @@
           </p:cxnSp>
           <p:cxnSp>
             <p:nvCxnSpPr>
-              <p:cNvPr id="166" name="Google Shape;166;p18"/>
+              <p:cNvPr id="159" name="Google Shape;159;p17"/>
               <p:cNvCxnSpPr/>
               <p:nvPr/>
             </p:nvCxnSpPr>
@@ -10282,7 +10281,7 @@
           </p:cxnSp>
           <p:cxnSp>
             <p:nvCxnSpPr>
-              <p:cNvPr id="167" name="Google Shape;167;p18"/>
+              <p:cNvPr id="160" name="Google Shape;160;p17"/>
               <p:cNvCxnSpPr/>
               <p:nvPr/>
             </p:nvCxnSpPr>
@@ -10308,7 +10307,7 @@
           </p:cxnSp>
           <p:cxnSp>
             <p:nvCxnSpPr>
-              <p:cNvPr id="168" name="Google Shape;168;p18"/>
+              <p:cNvPr id="161" name="Google Shape;161;p17"/>
               <p:cNvCxnSpPr/>
               <p:nvPr/>
             </p:nvCxnSpPr>
@@ -10335,14 +10334,14 @@
         </p:grpSp>
         <p:sp>
           <p:nvSpPr>
-            <p:cNvPr id="169" name="Google Shape;169;p18"/>
+            <p:cNvPr id="162" name="Google Shape;162;p17"/>
             <p:cNvSpPr txBox="1"/>
             <p:nvPr/>
           </p:nvSpPr>
           <p:spPr>
             <a:xfrm>
               <a:off x="6521198" y="3706236"/>
-              <a:ext cx="1534800" cy="342900"/>
+              <a:ext cx="1364700" cy="342900"/>
             </a:xfrm>
             <a:prstGeom prst="rect">
               <a:avLst/>
@@ -10377,11 +10376,11 @@
               </a:pPr>
               <a:r>
                 <a:rPr b="1" lang="pt-BR" sz="1200"/>
-                <a:t> </a:t>
+                <a:t>Prefeit</a:t>
               </a:r>
               <a:r>
                 <a:rPr b="1" lang="pt-BR" sz="1200"/>
-                <a:t>Prefeito</a:t>
+                <a:t>ura</a:t>
               </a:r>
               <a:endParaRPr b="1" i="0" sz="1200" u="none" cap="none" strike="noStrike">
                 <a:solidFill>
@@ -10398,10 +10397,1139 @@
       </p:grpSp>
       <p:cxnSp>
         <p:nvCxnSpPr>
+          <p:cNvPr id="163" name="Google Shape;163;p17"/>
+          <p:cNvCxnSpPr>
+            <a:stCxn id="157" idx="0"/>
+            <a:endCxn id="135" idx="2"/>
+          </p:cNvCxnSpPr>
+          <p:nvPr/>
+        </p:nvCxnSpPr>
+        <p:spPr>
+          <a:xfrm rot="-5400000">
+            <a:off x="2524706" y="345451"/>
+            <a:ext cx="1553400" cy="2541300"/>
+          </a:xfrm>
+          <a:prstGeom prst="curvedConnector3">
+            <a:avLst>
+              <a:gd fmla="val 46894" name="adj1"/>
+            </a:avLst>
+          </a:prstGeom>
+          <a:noFill/>
+          <a:ln cap="flat" cmpd="sng" w="9525">
+            <a:solidFill>
+              <a:schemeClr val="dk2"/>
+            </a:solidFill>
+            <a:prstDash val="solid"/>
+            <a:round/>
+            <a:headEnd len="med" w="med" type="none"/>
+            <a:tailEnd len="med" w="med" type="none"/>
+          </a:ln>
+        </p:spPr>
+      </p:cxnSp>
+    </p:spTree>
+  </p:cSld>
+  <p:clrMapOvr>
+    <a:masterClrMapping/>
+  </p:clrMapOvr>
+</p:sld>
+</file>
+
+<file path=ppt/slides/slide6.xml><?xml version="1.0" encoding="utf-8"?>
+<p:sld xmlns:a="http://schemas.openxmlformats.org/drawingml/2006/main" xmlns:r="http://schemas.openxmlformats.org/officeDocument/2006/relationships" xmlns:mc="http://schemas.openxmlformats.org/markup-compatibility/2006" xmlns:mv="urn:schemas-microsoft-com:mac:vml" xmlns:p="http://schemas.openxmlformats.org/presentationml/2006/main" xmlns:c="http://schemas.openxmlformats.org/drawingml/2006/chart" xmlns:dgm="http://schemas.openxmlformats.org/drawingml/2006/diagram" xmlns:o="urn:schemas-microsoft-com:office:office" xmlns:v="urn:schemas-microsoft-com:vml" xmlns:pvml="urn:schemas-microsoft-com:office:powerpoint" xmlns:com="http://schemas.openxmlformats.org/drawingml/2006/compatibility" xmlns:p14="http://schemas.microsoft.com/office/powerpoint/2010/main" xmlns:p15="http://schemas.microsoft.com/office/powerpoint/2012/main">
+  <p:cSld>
+    <p:spTree>
+      <p:nvGrpSpPr>
+        <p:cNvPr id="167" name="Shape 167"/>
+        <p:cNvGrpSpPr/>
+        <p:nvPr/>
+      </p:nvGrpSpPr>
+      <p:grpSpPr>
+        <a:xfrm>
+          <a:off x="0" y="0"/>
+          <a:ext cx="0" cy="0"/>
+          <a:chOff x="0" y="0"/>
+          <a:chExt cx="0" cy="0"/>
+        </a:xfrm>
+      </p:grpSpPr>
+      <p:sp>
+        <p:nvSpPr>
+          <p:cNvPr id="168" name="Google Shape;168;p18"/>
+          <p:cNvSpPr/>
+          <p:nvPr/>
+        </p:nvSpPr>
+        <p:spPr>
+          <a:xfrm>
+            <a:off x="3521850" y="429525"/>
+            <a:ext cx="2100300" cy="802800"/>
+          </a:xfrm>
+          <a:prstGeom prst="wave">
+            <a:avLst>
+              <a:gd fmla="val 12500" name="adj1"/>
+              <a:gd fmla="val 0" name="adj2"/>
+            </a:avLst>
+          </a:prstGeom>
+          <a:solidFill>
+            <a:srgbClr val="EFEFEF"/>
+          </a:solidFill>
+          <a:ln cap="flat" cmpd="sng" w="9525">
+            <a:solidFill>
+              <a:schemeClr val="dk2"/>
+            </a:solidFill>
+            <a:prstDash val="solid"/>
+            <a:round/>
+            <a:headEnd len="sm" w="sm" type="none"/>
+            <a:tailEnd len="sm" w="sm" type="none"/>
+          </a:ln>
+        </p:spPr>
+        <p:txBody>
+          <a:bodyPr anchorCtr="0" anchor="ctr" bIns="91425" lIns="91425" spcFirstLastPara="1" rIns="91425" wrap="square" tIns="91425">
+            <a:noAutofit/>
+          </a:bodyPr>
+          <a:lstStyle/>
+          <a:p>
+            <a:pPr indent="0" lvl="0" marL="0" rtl="0" algn="ctr">
+              <a:spcBef>
+                <a:spcPts val="0"/>
+              </a:spcBef>
+              <a:spcAft>
+                <a:spcPts val="0"/>
+              </a:spcAft>
+              <a:buNone/>
+            </a:pPr>
+            <a:r>
+              <a:rPr lang="pt-BR" sz="1000">
+                <a:solidFill>
+                  <a:schemeClr val="dk1"/>
+                </a:solidFill>
+              </a:rPr>
+              <a:t>Requisitar</a:t>
+            </a:r>
+            <a:r>
+              <a:rPr lang="pt-BR" sz="1000">
+                <a:solidFill>
+                  <a:schemeClr val="dk1"/>
+                </a:solidFill>
+              </a:rPr>
+              <a:t> assunto para estudo</a:t>
+            </a:r>
+            <a:endParaRPr b="1" sz="1000">
+              <a:solidFill>
+                <a:schemeClr val="dk1"/>
+              </a:solidFill>
+            </a:endParaRPr>
+          </a:p>
+        </p:txBody>
+      </p:sp>
+      <p:sp>
+        <p:nvSpPr>
+          <p:cNvPr id="169" name="Google Shape;169;p18"/>
+          <p:cNvSpPr txBox="1"/>
+          <p:nvPr/>
+        </p:nvSpPr>
+        <p:spPr>
+          <a:xfrm>
+            <a:off x="300750" y="2131525"/>
+            <a:ext cx="8542500" cy="1367400"/>
+          </a:xfrm>
+          <a:prstGeom prst="rect">
+            <a:avLst/>
+          </a:prstGeom>
+          <a:noFill/>
+          <a:ln cap="flat" cmpd="sng" w="9525">
+            <a:solidFill>
+              <a:srgbClr val="FF9900"/>
+            </a:solidFill>
+            <a:prstDash val="solid"/>
+            <a:round/>
+            <a:headEnd len="sm" w="sm" type="none"/>
+            <a:tailEnd len="sm" w="sm" type="none"/>
+          </a:ln>
+        </p:spPr>
+        <p:txBody>
+          <a:bodyPr anchorCtr="0" anchor="t" bIns="91425" lIns="91425" spcFirstLastPara="1" rIns="91425" wrap="square" tIns="91425">
+            <a:noAutofit/>
+          </a:bodyPr>
+          <a:lstStyle/>
+          <a:p>
+            <a:pPr indent="0" lvl="0" marL="0" marR="0" rtl="0" algn="l">
+              <a:lnSpc>
+                <a:spcPct val="100000"/>
+              </a:lnSpc>
+              <a:spcBef>
+                <a:spcPts val="0"/>
+              </a:spcBef>
+              <a:spcAft>
+                <a:spcPts val="0"/>
+              </a:spcAft>
+              <a:buClr>
+                <a:srgbClr val="000000"/>
+              </a:buClr>
+              <a:buSzPts val="1400"/>
+              <a:buFont typeface="Arial"/>
+              <a:buNone/>
+            </a:pPr>
+            <a:r>
+              <a:rPr b="0" i="0" lang="pt-BR" sz="1400" u="none" cap="none" strike="noStrike">
+                <a:solidFill>
+                  <a:srgbClr val="000000"/>
+                </a:solidFill>
+                <a:latin typeface="Arial"/>
+                <a:ea typeface="Arial"/>
+                <a:cs typeface="Arial"/>
+                <a:sym typeface="Arial"/>
+              </a:rPr>
+              <a:t>Nós Operacionais</a:t>
+            </a:r>
+            <a:endParaRPr b="0" i="0" sz="1400" u="none" cap="none" strike="noStrike">
+              <a:solidFill>
+                <a:srgbClr val="000000"/>
+              </a:solidFill>
+              <a:latin typeface="Arial"/>
+              <a:ea typeface="Arial"/>
+              <a:cs typeface="Arial"/>
+              <a:sym typeface="Arial"/>
+            </a:endParaRPr>
+          </a:p>
+        </p:txBody>
+      </p:sp>
+      <p:grpSp>
+        <p:nvGrpSpPr>
           <p:cNvPr id="170" name="Google Shape;170;p18"/>
+          <p:cNvGrpSpPr/>
+          <p:nvPr/>
+        </p:nvGrpSpPr>
+        <p:grpSpPr>
+          <a:xfrm>
+            <a:off x="1503275" y="2574515"/>
+            <a:ext cx="1230900" cy="830485"/>
+            <a:chOff x="2699598" y="3424900"/>
+            <a:chExt cx="1230900" cy="830485"/>
+          </a:xfrm>
+        </p:grpSpPr>
+        <p:grpSp>
+          <p:nvGrpSpPr>
+            <p:cNvPr id="171" name="Google Shape;171;p18"/>
+            <p:cNvGrpSpPr/>
+            <p:nvPr/>
+          </p:nvGrpSpPr>
+          <p:grpSpPr>
+            <a:xfrm>
+              <a:off x="3206356" y="3424900"/>
+              <a:ext cx="308885" cy="587736"/>
+              <a:chOff x="1499725" y="1450825"/>
+              <a:chExt cx="497400" cy="843600"/>
+            </a:xfrm>
+          </p:grpSpPr>
+          <p:sp>
+            <p:nvSpPr>
+              <p:cNvPr id="172" name="Google Shape;172;p18"/>
+              <p:cNvSpPr/>
+              <p:nvPr/>
+            </p:nvSpPr>
+            <p:spPr>
+              <a:xfrm>
+                <a:off x="1597825" y="1450825"/>
+                <a:ext cx="313200" cy="281400"/>
+              </a:xfrm>
+              <a:prstGeom prst="flowChartConnector">
+                <a:avLst/>
+              </a:prstGeom>
+              <a:solidFill>
+                <a:srgbClr val="EEEEEE"/>
+              </a:solidFill>
+              <a:ln cap="flat" cmpd="sng" w="9525">
+                <a:solidFill>
+                  <a:srgbClr val="595959"/>
+                </a:solidFill>
+                <a:prstDash val="solid"/>
+                <a:round/>
+                <a:headEnd len="sm" w="sm" type="none"/>
+                <a:tailEnd len="sm" w="sm" type="none"/>
+              </a:ln>
+            </p:spPr>
+            <p:txBody>
+              <a:bodyPr anchorCtr="0" anchor="ctr" bIns="91425" lIns="91425" spcFirstLastPara="1" rIns="91425" wrap="square" tIns="91425">
+                <a:noAutofit/>
+              </a:bodyPr>
+              <a:lstStyle/>
+              <a:p>
+                <a:pPr indent="0" lvl="0" marL="0" marR="0" rtl="0" algn="l">
+                  <a:lnSpc>
+                    <a:spcPct val="100000"/>
+                  </a:lnSpc>
+                  <a:spcBef>
+                    <a:spcPts val="0"/>
+                  </a:spcBef>
+                  <a:spcAft>
+                    <a:spcPts val="0"/>
+                  </a:spcAft>
+                  <a:buClr>
+                    <a:srgbClr val="000000"/>
+                  </a:buClr>
+                  <a:buSzPts val="1400"/>
+                  <a:buFont typeface="Arial"/>
+                  <a:buNone/>
+                </a:pPr>
+                <a:r>
+                  <a:t/>
+                </a:r>
+                <a:endParaRPr b="0" i="0" sz="1400" u="none" cap="none" strike="noStrike">
+                  <a:solidFill>
+                    <a:srgbClr val="000000"/>
+                  </a:solidFill>
+                  <a:latin typeface="Arial"/>
+                  <a:ea typeface="Arial"/>
+                  <a:cs typeface="Arial"/>
+                  <a:sym typeface="Arial"/>
+                </a:endParaRPr>
+              </a:p>
+            </p:txBody>
+          </p:sp>
+          <p:cxnSp>
+            <p:nvCxnSpPr>
+              <p:cNvPr id="173" name="Google Shape;173;p18"/>
+              <p:cNvCxnSpPr>
+                <a:stCxn id="172" idx="4"/>
+              </p:cNvCxnSpPr>
+              <p:nvPr/>
+            </p:nvCxnSpPr>
+            <p:spPr>
+              <a:xfrm flipH="1">
+                <a:off x="1748725" y="1732225"/>
+                <a:ext cx="5700" cy="293100"/>
+              </a:xfrm>
+              <a:prstGeom prst="straightConnector1">
+                <a:avLst/>
+              </a:prstGeom>
+              <a:noFill/>
+              <a:ln cap="flat" cmpd="sng" w="9525">
+                <a:solidFill>
+                  <a:srgbClr val="595959"/>
+                </a:solidFill>
+                <a:prstDash val="solid"/>
+                <a:round/>
+                <a:headEnd len="sm" w="sm" type="none"/>
+                <a:tailEnd len="sm" w="sm" type="none"/>
+              </a:ln>
+            </p:spPr>
+          </p:cxnSp>
+          <p:cxnSp>
+            <p:nvCxnSpPr>
+              <p:cNvPr id="174" name="Google Shape;174;p18"/>
+              <p:cNvCxnSpPr/>
+              <p:nvPr/>
+            </p:nvCxnSpPr>
+            <p:spPr>
+              <a:xfrm>
+                <a:off x="1527475" y="1858775"/>
+                <a:ext cx="453900" cy="1800"/>
+              </a:xfrm>
+              <a:prstGeom prst="straightConnector1">
+                <a:avLst/>
+              </a:prstGeom>
+              <a:noFill/>
+              <a:ln cap="flat" cmpd="sng" w="9525">
+                <a:solidFill>
+                  <a:srgbClr val="595959"/>
+                </a:solidFill>
+                <a:prstDash val="solid"/>
+                <a:round/>
+                <a:headEnd len="sm" w="sm" type="none"/>
+                <a:tailEnd len="sm" w="sm" type="none"/>
+              </a:ln>
+            </p:spPr>
+          </p:cxnSp>
+          <p:cxnSp>
+            <p:nvCxnSpPr>
+              <p:cNvPr id="175" name="Google Shape;175;p18"/>
+              <p:cNvCxnSpPr/>
+              <p:nvPr/>
+            </p:nvCxnSpPr>
+            <p:spPr>
+              <a:xfrm flipH="1">
+                <a:off x="1499725" y="2022925"/>
+                <a:ext cx="248700" cy="271500"/>
+              </a:xfrm>
+              <a:prstGeom prst="straightConnector1">
+                <a:avLst/>
+              </a:prstGeom>
+              <a:noFill/>
+              <a:ln cap="flat" cmpd="sng" w="9525">
+                <a:solidFill>
+                  <a:srgbClr val="595959"/>
+                </a:solidFill>
+                <a:prstDash val="solid"/>
+                <a:round/>
+                <a:headEnd len="sm" w="sm" type="none"/>
+                <a:tailEnd len="sm" w="sm" type="none"/>
+              </a:ln>
+            </p:spPr>
+          </p:cxnSp>
+          <p:cxnSp>
+            <p:nvCxnSpPr>
+              <p:cNvPr id="176" name="Google Shape;176;p18"/>
+              <p:cNvCxnSpPr/>
+              <p:nvPr/>
+            </p:nvCxnSpPr>
+            <p:spPr>
+              <a:xfrm rot="10800000">
+                <a:off x="1748425" y="2022925"/>
+                <a:ext cx="248700" cy="271500"/>
+              </a:xfrm>
+              <a:prstGeom prst="straightConnector1">
+                <a:avLst/>
+              </a:prstGeom>
+              <a:noFill/>
+              <a:ln cap="flat" cmpd="sng" w="9525">
+                <a:solidFill>
+                  <a:srgbClr val="595959"/>
+                </a:solidFill>
+                <a:prstDash val="solid"/>
+                <a:round/>
+                <a:headEnd len="sm" w="sm" type="none"/>
+                <a:tailEnd len="sm" w="sm" type="none"/>
+              </a:ln>
+            </p:spPr>
+          </p:cxnSp>
+        </p:grpSp>
+        <p:sp>
+          <p:nvSpPr>
+            <p:cNvPr id="177" name="Google Shape;177;p18"/>
+            <p:cNvSpPr txBox="1"/>
+            <p:nvPr/>
+          </p:nvSpPr>
+          <p:spPr>
+            <a:xfrm>
+              <a:off x="2699598" y="3912485"/>
+              <a:ext cx="1230900" cy="342900"/>
+            </a:xfrm>
+            <a:prstGeom prst="rect">
+              <a:avLst/>
+            </a:prstGeom>
+            <a:noFill/>
+            <a:ln>
+              <a:noFill/>
+            </a:ln>
+          </p:spPr>
+          <p:txBody>
+            <a:bodyPr anchorCtr="0" anchor="t" bIns="91425" lIns="91425" spcFirstLastPara="1" rIns="91425" wrap="square" tIns="91425">
+              <a:noAutofit/>
+            </a:bodyPr>
+            <a:lstStyle/>
+            <a:p>
+              <a:pPr indent="0" lvl="0" marL="0" marR="0" rtl="0" algn="l">
+                <a:lnSpc>
+                  <a:spcPct val="100000"/>
+                </a:lnSpc>
+                <a:spcBef>
+                  <a:spcPts val="0"/>
+                </a:spcBef>
+                <a:spcAft>
+                  <a:spcPts val="0"/>
+                </a:spcAft>
+                <a:buClr>
+                  <a:srgbClr val="000000"/>
+                </a:buClr>
+                <a:buSzPts val="1200"/>
+                <a:buFont typeface="Arial"/>
+                <a:buNone/>
+              </a:pPr>
+              <a:r>
+                <a:rPr b="1" lang="pt-BR" sz="1200"/>
+                <a:t>      </a:t>
+              </a:r>
+              <a:r>
+                <a:rPr b="1" lang="pt-BR" sz="1000">
+                  <a:solidFill>
+                    <a:schemeClr val="dk1"/>
+                  </a:solidFill>
+                </a:rPr>
+                <a:t>Prefeitura</a:t>
+              </a:r>
+              <a:endParaRPr b="1" sz="1200"/>
+            </a:p>
+          </p:txBody>
+        </p:sp>
+      </p:grpSp>
+      <p:cxnSp>
+        <p:nvCxnSpPr>
+          <p:cNvPr id="178" name="Google Shape;178;p18"/>
           <p:cNvCxnSpPr>
-            <a:stCxn id="159" idx="2"/>
-            <a:endCxn id="171" idx="1"/>
+            <a:stCxn id="179" idx="0"/>
+            <a:endCxn id="168" idx="2"/>
+          </p:cNvCxnSpPr>
+          <p:nvPr/>
+        </p:nvCxnSpPr>
+        <p:spPr>
+          <a:xfrm rot="-5400000">
+            <a:off x="3863549" y="1840375"/>
+            <a:ext cx="1417500" cy="600"/>
+          </a:xfrm>
+          <a:prstGeom prst="curvedConnector3">
+            <a:avLst>
+              <a:gd fmla="val 46592" name="adj1"/>
+            </a:avLst>
+          </a:prstGeom>
+          <a:noFill/>
+          <a:ln cap="flat" cmpd="sng" w="9525">
+            <a:solidFill>
+              <a:srgbClr val="595959"/>
+            </a:solidFill>
+            <a:prstDash val="solid"/>
+            <a:round/>
+            <a:headEnd len="sm" w="sm" type="none"/>
+            <a:tailEnd len="sm" w="sm" type="none"/>
+          </a:ln>
+        </p:spPr>
+      </p:cxnSp>
+      <p:sp>
+        <p:nvSpPr>
+          <p:cNvPr id="180" name="Google Shape;180;p18"/>
+          <p:cNvSpPr txBox="1"/>
+          <p:nvPr/>
+        </p:nvSpPr>
+        <p:spPr>
+          <a:xfrm>
+            <a:off x="300750" y="3498922"/>
+            <a:ext cx="8542500" cy="1367400"/>
+          </a:xfrm>
+          <a:prstGeom prst="rect">
+            <a:avLst/>
+          </a:prstGeom>
+          <a:noFill/>
+          <a:ln cap="flat" cmpd="sng" w="9525">
+            <a:solidFill>
+              <a:srgbClr val="FF9900"/>
+            </a:solidFill>
+            <a:prstDash val="solid"/>
+            <a:round/>
+            <a:headEnd len="sm" w="sm" type="none"/>
+            <a:tailEnd len="sm" w="sm" type="none"/>
+          </a:ln>
+        </p:spPr>
+        <p:txBody>
+          <a:bodyPr anchorCtr="0" anchor="t" bIns="91425" lIns="91425" spcFirstLastPara="1" rIns="91425" wrap="square" tIns="91425">
+            <a:noAutofit/>
+          </a:bodyPr>
+          <a:lstStyle/>
+          <a:p>
+            <a:pPr indent="0" lvl="0" marL="0" marR="0" rtl="0" algn="l">
+              <a:lnSpc>
+                <a:spcPct val="100000"/>
+              </a:lnSpc>
+              <a:spcBef>
+                <a:spcPts val="0"/>
+              </a:spcBef>
+              <a:spcAft>
+                <a:spcPts val="0"/>
+              </a:spcAft>
+              <a:buClr>
+                <a:srgbClr val="000000"/>
+              </a:buClr>
+              <a:buSzPts val="1400"/>
+              <a:buFont typeface="Arial"/>
+              <a:buNone/>
+            </a:pPr>
+            <a:r>
+              <a:rPr b="0" i="0" lang="pt-BR" sz="1400" u="none" cap="none" strike="noStrike">
+                <a:solidFill>
+                  <a:srgbClr val="000000"/>
+                </a:solidFill>
+                <a:latin typeface="Arial"/>
+                <a:ea typeface="Arial"/>
+                <a:cs typeface="Arial"/>
+                <a:sym typeface="Arial"/>
+              </a:rPr>
+              <a:t>Capacidades Operacionais</a:t>
+            </a:r>
+            <a:endParaRPr b="0" i="0" sz="1400" u="none" cap="none" strike="noStrike">
+              <a:solidFill>
+                <a:srgbClr val="000000"/>
+              </a:solidFill>
+              <a:latin typeface="Arial"/>
+              <a:ea typeface="Arial"/>
+              <a:cs typeface="Arial"/>
+              <a:sym typeface="Arial"/>
+            </a:endParaRPr>
+          </a:p>
+        </p:txBody>
+      </p:sp>
+      <p:cxnSp>
+        <p:nvCxnSpPr>
+          <p:cNvPr id="181" name="Google Shape;181;p18"/>
+          <p:cNvCxnSpPr>
+            <a:stCxn id="172" idx="0"/>
+            <a:endCxn id="168" idx="2"/>
+          </p:cNvCxnSpPr>
+          <p:nvPr/>
+        </p:nvCxnSpPr>
+        <p:spPr>
+          <a:xfrm rot="-5400000">
+            <a:off x="2648952" y="651365"/>
+            <a:ext cx="1442400" cy="2403900"/>
+          </a:xfrm>
+          <a:prstGeom prst="curvedConnector3">
+            <a:avLst>
+              <a:gd fmla="val 46658" name="adj1"/>
+            </a:avLst>
+          </a:prstGeom>
+          <a:noFill/>
+          <a:ln cap="flat" cmpd="sng" w="9525">
+            <a:solidFill>
+              <a:srgbClr val="595959"/>
+            </a:solidFill>
+            <a:prstDash val="solid"/>
+            <a:round/>
+            <a:headEnd len="sm" w="sm" type="none"/>
+            <a:tailEnd len="sm" w="sm" type="none"/>
+          </a:ln>
+        </p:spPr>
+      </p:cxnSp>
+      <p:sp>
+        <p:nvSpPr>
+          <p:cNvPr id="182" name="Google Shape;182;p18"/>
+          <p:cNvSpPr/>
+          <p:nvPr/>
+        </p:nvSpPr>
+        <p:spPr>
+          <a:xfrm>
+            <a:off x="5764000" y="4002550"/>
+            <a:ext cx="2346000" cy="711600"/>
+          </a:xfrm>
+          <a:prstGeom prst="bracketPair">
+            <a:avLst/>
+          </a:prstGeom>
+          <a:noFill/>
+          <a:ln cap="flat" cmpd="sng" w="9525">
+            <a:solidFill>
+              <a:srgbClr val="595959"/>
+            </a:solidFill>
+            <a:prstDash val="solid"/>
+            <a:round/>
+            <a:headEnd len="sm" w="sm" type="none"/>
+            <a:tailEnd len="sm" w="sm" type="none"/>
+          </a:ln>
+        </p:spPr>
+        <p:txBody>
+          <a:bodyPr anchorCtr="0" anchor="ctr" bIns="91425" lIns="91425" spcFirstLastPara="1" rIns="91425" wrap="square" tIns="91425">
+            <a:noAutofit/>
+          </a:bodyPr>
+          <a:lstStyle/>
+          <a:p>
+            <a:pPr indent="-304800" lvl="0" marL="457200" marR="0" rtl="0" algn="l">
+              <a:lnSpc>
+                <a:spcPct val="100000"/>
+              </a:lnSpc>
+              <a:spcBef>
+                <a:spcPts val="0"/>
+              </a:spcBef>
+              <a:spcAft>
+                <a:spcPts val="0"/>
+              </a:spcAft>
+              <a:buClr>
+                <a:schemeClr val="dk1"/>
+              </a:buClr>
+              <a:buSzPts val="1200"/>
+              <a:buChar char="●"/>
+            </a:pPr>
+            <a:r>
+              <a:rPr lang="pt-BR" sz="1200">
+                <a:solidFill>
+                  <a:schemeClr val="dk1"/>
+                </a:solidFill>
+              </a:rPr>
+              <a:t>Criar Pasta solicitada</a:t>
+            </a:r>
+            <a:endParaRPr sz="1200">
+              <a:solidFill>
+                <a:schemeClr val="dk1"/>
+              </a:solidFill>
+            </a:endParaRPr>
+          </a:p>
+        </p:txBody>
+      </p:sp>
+      <p:sp>
+        <p:nvSpPr>
+          <p:cNvPr id="179" name="Google Shape;179;p18"/>
+          <p:cNvSpPr/>
+          <p:nvPr/>
+        </p:nvSpPr>
+        <p:spPr>
+          <a:xfrm>
+            <a:off x="3942449" y="2549425"/>
+            <a:ext cx="1259100" cy="531600"/>
+          </a:xfrm>
+          <a:prstGeom prst="roundRect">
+            <a:avLst>
+              <a:gd fmla="val 0" name="adj"/>
+            </a:avLst>
+          </a:prstGeom>
+          <a:gradFill>
+            <a:gsLst>
+              <a:gs pos="0">
+                <a:srgbClr val="D4E5F5"/>
+              </a:gs>
+              <a:gs pos="100000">
+                <a:srgbClr val="70A4D5"/>
+              </a:gs>
+            </a:gsLst>
+            <a:path path="circle">
+              <a:fillToRect b="50%" l="50%" r="50%" t="50%"/>
+            </a:path>
+            <a:tileRect/>
+          </a:gradFill>
+          <a:ln cap="flat" cmpd="sng" w="9525">
+            <a:solidFill>
+              <a:srgbClr val="F3F3F3"/>
+            </a:solidFill>
+            <a:prstDash val="solid"/>
+            <a:round/>
+            <a:headEnd len="sm" w="sm" type="none"/>
+            <a:tailEnd len="sm" w="sm" type="none"/>
+          </a:ln>
+        </p:spPr>
+        <p:txBody>
+          <a:bodyPr anchorCtr="0" anchor="ctr" bIns="91425" lIns="91425" spcFirstLastPara="1" rIns="91425" wrap="square" tIns="91425">
+            <a:noAutofit/>
+          </a:bodyPr>
+          <a:lstStyle/>
+          <a:p>
+            <a:pPr indent="0" lvl="0" marL="0" marR="0" rtl="0" algn="ctr">
+              <a:lnSpc>
+                <a:spcPct val="100000"/>
+              </a:lnSpc>
+              <a:spcBef>
+                <a:spcPts val="0"/>
+              </a:spcBef>
+              <a:spcAft>
+                <a:spcPts val="0"/>
+              </a:spcAft>
+              <a:buClr>
+                <a:srgbClr val="000000"/>
+              </a:buClr>
+              <a:buSzPts val="1000"/>
+              <a:buFont typeface="Arial"/>
+              <a:buNone/>
+            </a:pPr>
+            <a:r>
+              <a:rPr lang="pt-BR" sz="1000"/>
+              <a:t>Administrativo</a:t>
+            </a:r>
+            <a:endParaRPr b="0" i="0" sz="1000" u="none" cap="none" strike="noStrike">
+              <a:solidFill>
+                <a:srgbClr val="000000"/>
+              </a:solidFill>
+              <a:latin typeface="Arial"/>
+              <a:ea typeface="Arial"/>
+              <a:cs typeface="Arial"/>
+              <a:sym typeface="Arial"/>
+            </a:endParaRPr>
+          </a:p>
+        </p:txBody>
+      </p:sp>
+      <p:cxnSp>
+        <p:nvCxnSpPr>
+          <p:cNvPr id="183" name="Google Shape;183;p18"/>
+          <p:cNvCxnSpPr>
+            <a:stCxn id="182" idx="1"/>
+            <a:endCxn id="179" idx="2"/>
+          </p:cNvCxnSpPr>
+          <p:nvPr/>
+        </p:nvCxnSpPr>
+        <p:spPr>
+          <a:xfrm rot="10800000">
+            <a:off x="4572100" y="3080950"/>
+            <a:ext cx="1191900" cy="1277400"/>
+          </a:xfrm>
+          <a:prstGeom prst="curvedConnector2">
+            <a:avLst/>
+          </a:prstGeom>
+          <a:noFill/>
+          <a:ln cap="flat" cmpd="sng" w="9525">
+            <a:solidFill>
+              <a:schemeClr val="dk2"/>
+            </a:solidFill>
+            <a:prstDash val="solid"/>
+            <a:round/>
+            <a:headEnd len="med" w="med" type="none"/>
+            <a:tailEnd len="med" w="med" type="none"/>
+          </a:ln>
+        </p:spPr>
+      </p:cxnSp>
+    </p:spTree>
+  </p:cSld>
+  <p:clrMapOvr>
+    <a:masterClrMapping/>
+  </p:clrMapOvr>
+</p:sld>
+</file>
+
+<file path=ppt/slides/slide7.xml><?xml version="1.0" encoding="utf-8"?>
+<p:sld xmlns:a="http://schemas.openxmlformats.org/drawingml/2006/main" xmlns:r="http://schemas.openxmlformats.org/officeDocument/2006/relationships" xmlns:mc="http://schemas.openxmlformats.org/markup-compatibility/2006" xmlns:mv="urn:schemas-microsoft-com:mac:vml" xmlns:p="http://schemas.openxmlformats.org/presentationml/2006/main" xmlns:c="http://schemas.openxmlformats.org/drawingml/2006/chart" xmlns:dgm="http://schemas.openxmlformats.org/drawingml/2006/diagram" xmlns:o="urn:schemas-microsoft-com:office:office" xmlns:v="urn:schemas-microsoft-com:vml" xmlns:pvml="urn:schemas-microsoft-com:office:powerpoint" xmlns:com="http://schemas.openxmlformats.org/drawingml/2006/compatibility" xmlns:p14="http://schemas.microsoft.com/office/powerpoint/2010/main" xmlns:p15="http://schemas.microsoft.com/office/powerpoint/2012/main">
+  <p:cSld>
+    <p:spTree>
+      <p:nvGrpSpPr>
+        <p:cNvPr id="187" name="Shape 187"/>
+        <p:cNvGrpSpPr/>
+        <p:nvPr/>
+      </p:nvGrpSpPr>
+      <p:grpSpPr>
+        <a:xfrm>
+          <a:off x="0" y="0"/>
+          <a:ext cx="0" cy="0"/>
+          <a:chOff x="0" y="0"/>
+          <a:chExt cx="0" cy="0"/>
+        </a:xfrm>
+      </p:grpSpPr>
+      <p:sp>
+        <p:nvSpPr>
+          <p:cNvPr id="188" name="Google Shape;188;p19"/>
+          <p:cNvSpPr/>
+          <p:nvPr/>
+        </p:nvSpPr>
+        <p:spPr>
+          <a:xfrm>
+            <a:off x="3521850" y="136875"/>
+            <a:ext cx="2100300" cy="802800"/>
+          </a:xfrm>
+          <a:prstGeom prst="wave">
+            <a:avLst>
+              <a:gd fmla="val 12500" name="adj1"/>
+              <a:gd fmla="val 0" name="adj2"/>
+            </a:avLst>
+          </a:prstGeom>
+          <a:solidFill>
+            <a:schemeClr val="lt2"/>
+          </a:solidFill>
+          <a:ln cap="flat" cmpd="sng" w="9525">
+            <a:solidFill>
+              <a:schemeClr val="dk2"/>
+            </a:solidFill>
+            <a:prstDash val="solid"/>
+            <a:round/>
+            <a:headEnd len="sm" w="sm" type="none"/>
+            <a:tailEnd len="sm" w="sm" type="none"/>
+          </a:ln>
+        </p:spPr>
+        <p:txBody>
+          <a:bodyPr anchorCtr="0" anchor="ctr" bIns="91425" lIns="91425" spcFirstLastPara="1" rIns="91425" wrap="square" tIns="91425">
+            <a:noAutofit/>
+          </a:bodyPr>
+          <a:lstStyle/>
+          <a:p>
+            <a:pPr indent="0" lvl="0" marL="0" rtl="0" algn="ctr">
+              <a:spcBef>
+                <a:spcPts val="0"/>
+              </a:spcBef>
+              <a:spcAft>
+                <a:spcPts val="0"/>
+              </a:spcAft>
+              <a:buNone/>
+            </a:pPr>
+            <a:r>
+              <a:rPr lang="pt-BR" sz="1000">
+                <a:solidFill>
+                  <a:schemeClr val="dk1"/>
+                </a:solidFill>
+              </a:rPr>
+              <a:t>Receber relatório de estudo</a:t>
+            </a:r>
+            <a:endParaRPr/>
+          </a:p>
+        </p:txBody>
+      </p:sp>
+      <p:sp>
+        <p:nvSpPr>
+          <p:cNvPr id="189" name="Google Shape;189;p19"/>
+          <p:cNvSpPr txBox="1"/>
+          <p:nvPr/>
+        </p:nvSpPr>
+        <p:spPr>
+          <a:xfrm>
+            <a:off x="300750" y="2131525"/>
+            <a:ext cx="8542500" cy="1367400"/>
+          </a:xfrm>
+          <a:prstGeom prst="rect">
+            <a:avLst/>
+          </a:prstGeom>
+          <a:noFill/>
+          <a:ln cap="flat" cmpd="sng" w="9525">
+            <a:solidFill>
+              <a:srgbClr val="FF9900"/>
+            </a:solidFill>
+            <a:prstDash val="solid"/>
+            <a:round/>
+            <a:headEnd len="sm" w="sm" type="none"/>
+            <a:tailEnd len="sm" w="sm" type="none"/>
+          </a:ln>
+        </p:spPr>
+        <p:txBody>
+          <a:bodyPr anchorCtr="0" anchor="t" bIns="91425" lIns="91425" spcFirstLastPara="1" rIns="91425" wrap="square" tIns="91425">
+            <a:noAutofit/>
+          </a:bodyPr>
+          <a:lstStyle/>
+          <a:p>
+            <a:pPr indent="0" lvl="0" marL="0" marR="0" rtl="0" algn="l">
+              <a:lnSpc>
+                <a:spcPct val="100000"/>
+              </a:lnSpc>
+              <a:spcBef>
+                <a:spcPts val="0"/>
+              </a:spcBef>
+              <a:spcAft>
+                <a:spcPts val="0"/>
+              </a:spcAft>
+              <a:buClr>
+                <a:srgbClr val="000000"/>
+              </a:buClr>
+              <a:buSzPts val="1400"/>
+              <a:buFont typeface="Arial"/>
+              <a:buNone/>
+            </a:pPr>
+            <a:r>
+              <a:rPr b="0" i="0" lang="pt-BR" sz="1400" u="none" cap="none" strike="noStrike">
+                <a:solidFill>
+                  <a:srgbClr val="000000"/>
+                </a:solidFill>
+                <a:latin typeface="Arial"/>
+                <a:ea typeface="Arial"/>
+                <a:cs typeface="Arial"/>
+                <a:sym typeface="Arial"/>
+              </a:rPr>
+              <a:t>Nós Operacionais</a:t>
+            </a:r>
+            <a:endParaRPr b="0" i="0" sz="1400" u="none" cap="none" strike="noStrike">
+              <a:solidFill>
+                <a:srgbClr val="000000"/>
+              </a:solidFill>
+              <a:latin typeface="Arial"/>
+              <a:ea typeface="Arial"/>
+              <a:cs typeface="Arial"/>
+              <a:sym typeface="Arial"/>
+            </a:endParaRPr>
+          </a:p>
+        </p:txBody>
+      </p:sp>
+      <p:cxnSp>
+        <p:nvCxnSpPr>
+          <p:cNvPr id="190" name="Google Shape;190;p19"/>
+          <p:cNvCxnSpPr>
+            <a:stCxn id="191" idx="0"/>
+            <a:endCxn id="188" idx="2"/>
+          </p:cNvCxnSpPr>
+          <p:nvPr/>
+        </p:nvCxnSpPr>
+        <p:spPr>
+          <a:xfrm rot="-5400000">
+            <a:off x="3625399" y="1578100"/>
+            <a:ext cx="1685400" cy="207600"/>
+          </a:xfrm>
+          <a:prstGeom prst="curvedConnector3">
+            <a:avLst>
+              <a:gd fmla="val 47132" name="adj1"/>
+            </a:avLst>
+          </a:prstGeom>
+          <a:noFill/>
+          <a:ln cap="flat" cmpd="sng" w="9525">
+            <a:solidFill>
+              <a:srgbClr val="595959"/>
+            </a:solidFill>
+            <a:prstDash val="solid"/>
+            <a:round/>
+            <a:headEnd len="sm" w="sm" type="none"/>
+            <a:tailEnd len="sm" w="sm" type="none"/>
+          </a:ln>
+        </p:spPr>
+      </p:cxnSp>
+      <p:sp>
+        <p:nvSpPr>
+          <p:cNvPr id="192" name="Google Shape;192;p19"/>
+          <p:cNvSpPr txBox="1"/>
+          <p:nvPr/>
+        </p:nvSpPr>
+        <p:spPr>
+          <a:xfrm>
+            <a:off x="300750" y="3498922"/>
+            <a:ext cx="8542500" cy="1367400"/>
+          </a:xfrm>
+          <a:prstGeom prst="rect">
+            <a:avLst/>
+          </a:prstGeom>
+          <a:noFill/>
+          <a:ln cap="flat" cmpd="sng" w="9525">
+            <a:solidFill>
+              <a:srgbClr val="FF9900"/>
+            </a:solidFill>
+            <a:prstDash val="solid"/>
+            <a:round/>
+            <a:headEnd len="sm" w="sm" type="none"/>
+            <a:tailEnd len="sm" w="sm" type="none"/>
+          </a:ln>
+        </p:spPr>
+        <p:txBody>
+          <a:bodyPr anchorCtr="0" anchor="t" bIns="91425" lIns="91425" spcFirstLastPara="1" rIns="91425" wrap="square" tIns="91425">
+            <a:noAutofit/>
+          </a:bodyPr>
+          <a:lstStyle/>
+          <a:p>
+            <a:pPr indent="0" lvl="0" marL="0" marR="0" rtl="0" algn="l">
+              <a:lnSpc>
+                <a:spcPct val="100000"/>
+              </a:lnSpc>
+              <a:spcBef>
+                <a:spcPts val="0"/>
+              </a:spcBef>
+              <a:spcAft>
+                <a:spcPts val="0"/>
+              </a:spcAft>
+              <a:buClr>
+                <a:srgbClr val="000000"/>
+              </a:buClr>
+              <a:buSzPts val="1400"/>
+              <a:buFont typeface="Arial"/>
+              <a:buNone/>
+            </a:pPr>
+            <a:r>
+              <a:rPr b="0" i="0" lang="pt-BR" sz="1400" u="none" cap="none" strike="noStrike">
+                <a:solidFill>
+                  <a:srgbClr val="000000"/>
+                </a:solidFill>
+                <a:latin typeface="Arial"/>
+                <a:ea typeface="Arial"/>
+                <a:cs typeface="Arial"/>
+                <a:sym typeface="Arial"/>
+              </a:rPr>
+              <a:t>Capacidades Operacionais</a:t>
+            </a:r>
+            <a:endParaRPr b="0" i="0" sz="1400" u="none" cap="none" strike="noStrike">
+              <a:solidFill>
+                <a:srgbClr val="000000"/>
+              </a:solidFill>
+              <a:latin typeface="Arial"/>
+              <a:ea typeface="Arial"/>
+              <a:cs typeface="Arial"/>
+              <a:sym typeface="Arial"/>
+            </a:endParaRPr>
+          </a:p>
+        </p:txBody>
+      </p:sp>
+      <p:sp>
+        <p:nvSpPr>
+          <p:cNvPr id="191" name="Google Shape;191;p19"/>
+          <p:cNvSpPr/>
+          <p:nvPr/>
+        </p:nvSpPr>
+        <p:spPr>
+          <a:xfrm>
+            <a:off x="3734749" y="2524600"/>
+            <a:ext cx="1259100" cy="531600"/>
+          </a:xfrm>
+          <a:prstGeom prst="roundRect">
+            <a:avLst>
+              <a:gd fmla="val 16667" name="adj"/>
+            </a:avLst>
+          </a:prstGeom>
+          <a:gradFill>
+            <a:gsLst>
+              <a:gs pos="0">
+                <a:srgbClr val="D4E5F5"/>
+              </a:gs>
+              <a:gs pos="100000">
+                <a:srgbClr val="70A4D5"/>
+              </a:gs>
+            </a:gsLst>
+            <a:path path="circle">
+              <a:fillToRect b="50%" l="50%" r="50%" t="50%"/>
+            </a:path>
+            <a:tileRect/>
+          </a:gradFill>
+          <a:ln cap="flat" cmpd="sng" w="9525">
+            <a:solidFill>
+              <a:srgbClr val="F3F3F3"/>
+            </a:solidFill>
+            <a:prstDash val="solid"/>
+            <a:round/>
+            <a:headEnd len="sm" w="sm" type="none"/>
+            <a:tailEnd len="sm" w="sm" type="none"/>
+          </a:ln>
+        </p:spPr>
+        <p:txBody>
+          <a:bodyPr anchorCtr="0" anchor="ctr" bIns="91425" lIns="91425" spcFirstLastPara="1" rIns="91425" wrap="square" tIns="91425">
+            <a:noAutofit/>
+          </a:bodyPr>
+          <a:lstStyle/>
+          <a:p>
+            <a:pPr indent="0" lvl="0" marL="0" rtl="0" algn="ctr">
+              <a:spcBef>
+                <a:spcPts val="0"/>
+              </a:spcBef>
+              <a:spcAft>
+                <a:spcPts val="0"/>
+              </a:spcAft>
+              <a:buClr>
+                <a:schemeClr val="dk1"/>
+              </a:buClr>
+              <a:buSzPts val="1000"/>
+              <a:buFont typeface="Arial"/>
+              <a:buNone/>
+            </a:pPr>
+            <a:r>
+              <a:rPr lang="pt-BR" sz="1000">
+                <a:solidFill>
+                  <a:schemeClr val="dk1"/>
+                </a:solidFill>
+              </a:rPr>
+              <a:t>Administrativo</a:t>
+            </a:r>
+            <a:endParaRPr b="0" i="0" sz="1000" u="none" cap="none" strike="noStrike">
+              <a:solidFill>
+                <a:srgbClr val="000000"/>
+              </a:solidFill>
+              <a:latin typeface="Arial"/>
+              <a:ea typeface="Arial"/>
+              <a:cs typeface="Arial"/>
+              <a:sym typeface="Arial"/>
+            </a:endParaRPr>
+          </a:p>
+        </p:txBody>
+      </p:sp>
+      <p:cxnSp>
+        <p:nvCxnSpPr>
+          <p:cNvPr id="193" name="Google Shape;193;p19"/>
+          <p:cNvCxnSpPr>
+            <a:stCxn id="194" idx="0"/>
+            <a:endCxn id="188" idx="2"/>
+          </p:cNvCxnSpPr>
+          <p:nvPr/>
+        </p:nvCxnSpPr>
+        <p:spPr>
+          <a:xfrm flipH="1" rot="5400000">
+            <a:off x="4913427" y="497828"/>
+            <a:ext cx="1560600" cy="2243700"/>
+          </a:xfrm>
+          <a:prstGeom prst="curvedConnector3">
+            <a:avLst>
+              <a:gd fmla="val 46908" name="adj1"/>
+            </a:avLst>
+          </a:prstGeom>
+          <a:noFill/>
+          <a:ln cap="flat" cmpd="sng" w="9525">
+            <a:solidFill>
+              <a:srgbClr val="595959"/>
+            </a:solidFill>
+            <a:prstDash val="solid"/>
+            <a:round/>
+            <a:headEnd len="sm" w="sm" type="none"/>
+            <a:tailEnd len="sm" w="sm" type="none"/>
+          </a:ln>
+        </p:spPr>
+      </p:cxnSp>
+      <p:cxnSp>
+        <p:nvCxnSpPr>
+          <p:cNvPr id="195" name="Google Shape;195;p19"/>
+          <p:cNvCxnSpPr>
+            <a:stCxn id="191" idx="2"/>
+            <a:endCxn id="196" idx="1"/>
           </p:cNvCxnSpPr>
           <p:nvPr/>
         </p:nvCxnSpPr>
@@ -10427,7 +11555,7 @@
       </p:cxnSp>
       <p:sp>
         <p:nvSpPr>
-          <p:cNvPr id="171" name="Google Shape;171;p18"/>
+          <p:cNvPr id="196" name="Google Shape;196;p19"/>
           <p:cNvSpPr/>
           <p:nvPr/>
         </p:nvSpPr>
@@ -10485,6 +11613,265 @@
           </a:p>
         </p:txBody>
       </p:sp>
+      <p:grpSp>
+        <p:nvGrpSpPr>
+          <p:cNvPr id="197" name="Google Shape;197;p19"/>
+          <p:cNvGrpSpPr/>
+          <p:nvPr/>
+        </p:nvGrpSpPr>
+        <p:grpSpPr>
+          <a:xfrm>
+            <a:off x="6150650" y="2399978"/>
+            <a:ext cx="1230900" cy="830485"/>
+            <a:chOff x="2699598" y="3424900"/>
+            <a:chExt cx="1230900" cy="830485"/>
+          </a:xfrm>
+        </p:grpSpPr>
+        <p:grpSp>
+          <p:nvGrpSpPr>
+            <p:cNvPr id="198" name="Google Shape;198;p19"/>
+            <p:cNvGrpSpPr/>
+            <p:nvPr/>
+          </p:nvGrpSpPr>
+          <p:grpSpPr>
+            <a:xfrm>
+              <a:off x="3206356" y="3424900"/>
+              <a:ext cx="308885" cy="587736"/>
+              <a:chOff x="1499725" y="1450825"/>
+              <a:chExt cx="497400" cy="843600"/>
+            </a:xfrm>
+          </p:grpSpPr>
+          <p:sp>
+            <p:nvSpPr>
+              <p:cNvPr id="194" name="Google Shape;194;p19"/>
+              <p:cNvSpPr/>
+              <p:nvPr/>
+            </p:nvSpPr>
+            <p:spPr>
+              <a:xfrm>
+                <a:off x="1597825" y="1450825"/>
+                <a:ext cx="313200" cy="281400"/>
+              </a:xfrm>
+              <a:prstGeom prst="flowChartConnector">
+                <a:avLst/>
+              </a:prstGeom>
+              <a:solidFill>
+                <a:srgbClr val="EEEEEE"/>
+              </a:solidFill>
+              <a:ln cap="flat" cmpd="sng" w="9525">
+                <a:solidFill>
+                  <a:srgbClr val="595959"/>
+                </a:solidFill>
+                <a:prstDash val="solid"/>
+                <a:round/>
+                <a:headEnd len="sm" w="sm" type="none"/>
+                <a:tailEnd len="sm" w="sm" type="none"/>
+              </a:ln>
+            </p:spPr>
+            <p:txBody>
+              <a:bodyPr anchorCtr="0" anchor="ctr" bIns="91425" lIns="91425" spcFirstLastPara="1" rIns="91425" wrap="square" tIns="91425">
+                <a:noAutofit/>
+              </a:bodyPr>
+              <a:lstStyle/>
+              <a:p>
+                <a:pPr indent="0" lvl="0" marL="0" marR="0" rtl="0" algn="l">
+                  <a:lnSpc>
+                    <a:spcPct val="100000"/>
+                  </a:lnSpc>
+                  <a:spcBef>
+                    <a:spcPts val="0"/>
+                  </a:spcBef>
+                  <a:spcAft>
+                    <a:spcPts val="0"/>
+                  </a:spcAft>
+                  <a:buClr>
+                    <a:srgbClr val="000000"/>
+                  </a:buClr>
+                  <a:buSzPts val="1400"/>
+                  <a:buFont typeface="Arial"/>
+                  <a:buNone/>
+                </a:pPr>
+                <a:r>
+                  <a:t/>
+                </a:r>
+                <a:endParaRPr b="0" i="0" sz="1400" u="none" cap="none" strike="noStrike">
+                  <a:solidFill>
+                    <a:srgbClr val="000000"/>
+                  </a:solidFill>
+                  <a:latin typeface="Arial"/>
+                  <a:ea typeface="Arial"/>
+                  <a:cs typeface="Arial"/>
+                  <a:sym typeface="Arial"/>
+                </a:endParaRPr>
+              </a:p>
+            </p:txBody>
+          </p:sp>
+          <p:cxnSp>
+            <p:nvCxnSpPr>
+              <p:cNvPr id="199" name="Google Shape;199;p19"/>
+              <p:cNvCxnSpPr>
+                <a:stCxn id="194" idx="4"/>
+              </p:cNvCxnSpPr>
+              <p:nvPr/>
+            </p:nvCxnSpPr>
+            <p:spPr>
+              <a:xfrm flipH="1">
+                <a:off x="1748725" y="1732225"/>
+                <a:ext cx="5700" cy="293100"/>
+              </a:xfrm>
+              <a:prstGeom prst="straightConnector1">
+                <a:avLst/>
+              </a:prstGeom>
+              <a:noFill/>
+              <a:ln cap="flat" cmpd="sng" w="9525">
+                <a:solidFill>
+                  <a:srgbClr val="595959"/>
+                </a:solidFill>
+                <a:prstDash val="solid"/>
+                <a:round/>
+                <a:headEnd len="sm" w="sm" type="none"/>
+                <a:tailEnd len="sm" w="sm" type="none"/>
+              </a:ln>
+            </p:spPr>
+          </p:cxnSp>
+          <p:cxnSp>
+            <p:nvCxnSpPr>
+              <p:cNvPr id="200" name="Google Shape;200;p19"/>
+              <p:cNvCxnSpPr/>
+              <p:nvPr/>
+            </p:nvCxnSpPr>
+            <p:spPr>
+              <a:xfrm>
+                <a:off x="1527475" y="1858775"/>
+                <a:ext cx="453900" cy="1800"/>
+              </a:xfrm>
+              <a:prstGeom prst="straightConnector1">
+                <a:avLst/>
+              </a:prstGeom>
+              <a:noFill/>
+              <a:ln cap="flat" cmpd="sng" w="9525">
+                <a:solidFill>
+                  <a:srgbClr val="595959"/>
+                </a:solidFill>
+                <a:prstDash val="solid"/>
+                <a:round/>
+                <a:headEnd len="sm" w="sm" type="none"/>
+                <a:tailEnd len="sm" w="sm" type="none"/>
+              </a:ln>
+            </p:spPr>
+          </p:cxnSp>
+          <p:cxnSp>
+            <p:nvCxnSpPr>
+              <p:cNvPr id="201" name="Google Shape;201;p19"/>
+              <p:cNvCxnSpPr/>
+              <p:nvPr/>
+            </p:nvCxnSpPr>
+            <p:spPr>
+              <a:xfrm flipH="1">
+                <a:off x="1499725" y="2022925"/>
+                <a:ext cx="248700" cy="271500"/>
+              </a:xfrm>
+              <a:prstGeom prst="straightConnector1">
+                <a:avLst/>
+              </a:prstGeom>
+              <a:noFill/>
+              <a:ln cap="flat" cmpd="sng" w="9525">
+                <a:solidFill>
+                  <a:srgbClr val="595959"/>
+                </a:solidFill>
+                <a:prstDash val="solid"/>
+                <a:round/>
+                <a:headEnd len="sm" w="sm" type="none"/>
+                <a:tailEnd len="sm" w="sm" type="none"/>
+              </a:ln>
+            </p:spPr>
+          </p:cxnSp>
+          <p:cxnSp>
+            <p:nvCxnSpPr>
+              <p:cNvPr id="202" name="Google Shape;202;p19"/>
+              <p:cNvCxnSpPr/>
+              <p:nvPr/>
+            </p:nvCxnSpPr>
+            <p:spPr>
+              <a:xfrm rot="10800000">
+                <a:off x="1748425" y="2022925"/>
+                <a:ext cx="248700" cy="271500"/>
+              </a:xfrm>
+              <a:prstGeom prst="straightConnector1">
+                <a:avLst/>
+              </a:prstGeom>
+              <a:noFill/>
+              <a:ln cap="flat" cmpd="sng" w="9525">
+                <a:solidFill>
+                  <a:srgbClr val="595959"/>
+                </a:solidFill>
+                <a:prstDash val="solid"/>
+                <a:round/>
+                <a:headEnd len="sm" w="sm" type="none"/>
+                <a:tailEnd len="sm" w="sm" type="none"/>
+              </a:ln>
+            </p:spPr>
+          </p:cxnSp>
+        </p:grpSp>
+        <p:sp>
+          <p:nvSpPr>
+            <p:cNvPr id="203" name="Google Shape;203;p19"/>
+            <p:cNvSpPr txBox="1"/>
+            <p:nvPr/>
+          </p:nvSpPr>
+          <p:spPr>
+            <a:xfrm>
+              <a:off x="2699598" y="3912485"/>
+              <a:ext cx="1230900" cy="342900"/>
+            </a:xfrm>
+            <a:prstGeom prst="rect">
+              <a:avLst/>
+            </a:prstGeom>
+            <a:noFill/>
+            <a:ln>
+              <a:noFill/>
+            </a:ln>
+          </p:spPr>
+          <p:txBody>
+            <a:bodyPr anchorCtr="0" anchor="t" bIns="91425" lIns="91425" spcFirstLastPara="1" rIns="91425" wrap="square" tIns="91425">
+              <a:noAutofit/>
+            </a:bodyPr>
+            <a:lstStyle/>
+            <a:p>
+              <a:pPr indent="0" lvl="0" marL="0" marR="0" rtl="0" algn="l">
+                <a:lnSpc>
+                  <a:spcPct val="100000"/>
+                </a:lnSpc>
+                <a:spcBef>
+                  <a:spcPts val="0"/>
+                </a:spcBef>
+                <a:spcAft>
+                  <a:spcPts val="0"/>
+                </a:spcAft>
+                <a:buClr>
+                  <a:srgbClr val="000000"/>
+                </a:buClr>
+                <a:buSzPts val="1200"/>
+                <a:buFont typeface="Arial"/>
+                <a:buNone/>
+              </a:pPr>
+              <a:r>
+                <a:rPr b="1" lang="pt-BR" sz="1200"/>
+                <a:t>      </a:t>
+              </a:r>
+              <a:r>
+                <a:rPr b="1" lang="pt-BR" sz="1000">
+                  <a:solidFill>
+                    <a:schemeClr val="dk1"/>
+                  </a:solidFill>
+                </a:rPr>
+                <a:t>Prefeitura</a:t>
+              </a:r>
+              <a:endParaRPr b="1" sz="1200"/>
+            </a:p>
+          </p:txBody>
+        </p:sp>
+      </p:grpSp>
     </p:spTree>
   </p:cSld>
   <p:clrMapOvr>
@@ -10494,6 +11881,285 @@
 </file>
 
 <file path=ppt/theme/theme1.xml><?xml version="1.0" encoding="utf-8"?>
+<a:theme xmlns:a="http://schemas.openxmlformats.org/drawingml/2006/main" xmlns:r="http://schemas.openxmlformats.org/officeDocument/2006/relationships">
+  <a:themeElements>
+    <a:clrScheme name="Default">
+      <a:dk1>
+        <a:srgbClr val="000000"/>
+      </a:dk1>
+      <a:lt1>
+        <a:srgbClr val="FFFFFF"/>
+      </a:lt1>
+      <a:dk2>
+        <a:srgbClr val="158158"/>
+      </a:dk2>
+      <a:lt2>
+        <a:srgbClr val="F3F3F3"/>
+      </a:lt2>
+      <a:accent1>
+        <a:srgbClr val="058DC7"/>
+      </a:accent1>
+      <a:accent2>
+        <a:srgbClr val="50B432"/>
+      </a:accent2>
+      <a:accent3>
+        <a:srgbClr val="ED561B"/>
+      </a:accent3>
+      <a:accent4>
+        <a:srgbClr val="EDEF00"/>
+      </a:accent4>
+      <a:accent5>
+        <a:srgbClr val="24CBE5"/>
+      </a:accent5>
+      <a:accent6>
+        <a:srgbClr val="64E572"/>
+      </a:accent6>
+      <a:hlink>
+        <a:srgbClr val="2200CC"/>
+      </a:hlink>
+      <a:folHlink>
+        <a:srgbClr val="551A8B"/>
+      </a:folHlink>
+    </a:clrScheme>
+    <a:fontScheme name="Office">
+      <a:majorFont>
+        <a:latin typeface="Arial"/>
+        <a:ea typeface=""/>
+        <a:cs typeface=""/>
+        <a:font script="Jpan" typeface="ＭＳ Ｐゴシック"/>
+        <a:font script="Hang" typeface="맑은 고딕"/>
+        <a:font script="Hans" typeface="宋体"/>
+        <a:font script="Hant" typeface="新細明體"/>
+        <a:font script="Arab" typeface="Times New Roman"/>
+        <a:font script="Hebr" typeface="Times New Roman"/>
+        <a:font script="Thai" typeface="Angsana New"/>
+        <a:font script="Ethi" typeface="Nyala"/>
+        <a:font script="Beng" typeface="Vrinda"/>
+        <a:font script="Gujr" typeface="Shruti"/>
+        <a:font script="Khmr" typeface="MoolBoran"/>
+        <a:font script="Knda" typeface="Tunga"/>
+        <a:font script="Guru" typeface="Raavi"/>
+        <a:font script="Cans" typeface="Euphemia"/>
+        <a:font script="Cher" typeface="Plantagenet Cherokee"/>
+        <a:font script="Yiii" typeface="Microsoft Yi Baiti"/>
+        <a:font script="Tibt" typeface="Microsoft Himalaya"/>
+        <a:font script="Thaa" typeface="MV Boli"/>
+        <a:font script="Deva" typeface="Mangal"/>
+        <a:font script="Telu" typeface="Gautami"/>
+        <a:font script="Taml" typeface="Latha"/>
+        <a:font script="Syrc" typeface="Estrangelo Edessa"/>
+        <a:font script="Orya" typeface="Kalinga"/>
+        <a:font script="Mlym" typeface="Kartika"/>
+        <a:font script="Laoo" typeface="DokChampa"/>
+        <a:font script="Sinh" typeface="Iskoola Pota"/>
+        <a:font script="Mong" typeface="Mongolian Baiti"/>
+        <a:font script="Viet" typeface="Times New Roman"/>
+        <a:font script="Uigh" typeface="Microsoft Uighur"/>
+        <a:font script="Geor" typeface="Sylfaen"/>
+      </a:majorFont>
+      <a:minorFont>
+        <a:latin typeface="Arial"/>
+        <a:ea typeface=""/>
+        <a:cs typeface=""/>
+        <a:font script="Jpan" typeface="ＭＳ Ｐゴシック"/>
+        <a:font script="Hang" typeface="맑은 고딕"/>
+        <a:font script="Hans" typeface="宋体"/>
+        <a:font script="Hant" typeface="新細明體"/>
+        <a:font script="Arab" typeface="Arial"/>
+        <a:font script="Hebr" typeface="Arial"/>
+        <a:font script="Thai" typeface="Cordia New"/>
+        <a:font script="Ethi" typeface="Nyala"/>
+        <a:font script="Beng" typeface="Vrinda"/>
+        <a:font script="Gujr" typeface="Shruti"/>
+        <a:font script="Khmr" typeface="DaunPenh"/>
+        <a:font script="Knda" typeface="Tunga"/>
+        <a:font script="Guru" typeface="Raavi"/>
+        <a:font script="Cans" typeface="Euphemia"/>
+        <a:font script="Cher" typeface="Plantagenet Cherokee"/>
+        <a:font script="Yiii" typeface="Microsoft Yi Baiti"/>
+        <a:font script="Tibt" typeface="Microsoft Himalaya"/>
+        <a:font script="Thaa" typeface="MV Boli"/>
+        <a:font script="Deva" typeface="Mangal"/>
+        <a:font script="Telu" typeface="Gautami"/>
+        <a:font script="Taml" typeface="Latha"/>
+        <a:font script="Syrc" typeface="Estrangelo Edessa"/>
+        <a:font script="Orya" typeface="Kalinga"/>
+        <a:font script="Mlym" typeface="Kartika"/>
+        <a:font script="Laoo" typeface="DokChampa"/>
+        <a:font script="Sinh" typeface="Iskoola Pota"/>
+        <a:font script="Mong" typeface="Mongolian Baiti"/>
+        <a:font script="Viet" typeface="Arial"/>
+        <a:font script="Uigh" typeface="Microsoft Uighur"/>
+        <a:font script="Geor" typeface="Sylfaen"/>
+      </a:minorFont>
+    </a:fontScheme>
+    <a:fmtScheme name="Office">
+      <a:fillStyleLst>
+        <a:solidFill>
+          <a:schemeClr val="phClr"/>
+        </a:solidFill>
+        <a:gradFill rotWithShape="1">
+          <a:gsLst>
+            <a:gs pos="0">
+              <a:schemeClr val="phClr">
+                <a:tint val="50000"/>
+                <a:satMod val="300000"/>
+              </a:schemeClr>
+            </a:gs>
+            <a:gs pos="35000">
+              <a:schemeClr val="phClr">
+                <a:tint val="37000"/>
+                <a:satMod val="300000"/>
+              </a:schemeClr>
+            </a:gs>
+            <a:gs pos="100000">
+              <a:schemeClr val="phClr">
+                <a:tint val="15000"/>
+                <a:satMod val="350000"/>
+              </a:schemeClr>
+            </a:gs>
+          </a:gsLst>
+          <a:lin ang="16200000" scaled="1"/>
+        </a:gradFill>
+        <a:gradFill rotWithShape="1">
+          <a:gsLst>
+            <a:gs pos="0">
+              <a:schemeClr val="phClr">
+                <a:tint val="100000"/>
+                <a:shade val="100000"/>
+                <a:satMod val="130000"/>
+              </a:schemeClr>
+            </a:gs>
+            <a:gs pos="100000">
+              <a:schemeClr val="phClr">
+                <a:tint val="50000"/>
+                <a:shade val="100000"/>
+                <a:satMod val="350000"/>
+              </a:schemeClr>
+            </a:gs>
+          </a:gsLst>
+          <a:lin ang="16200000" scaled="0"/>
+        </a:gradFill>
+      </a:fillStyleLst>
+      <a:lnStyleLst>
+        <a:ln w="9525" cap="flat" cmpd="sng" algn="ctr">
+          <a:solidFill>
+            <a:schemeClr val="phClr">
+              <a:shade val="95000"/>
+              <a:satMod val="105000"/>
+            </a:schemeClr>
+          </a:solidFill>
+          <a:prstDash val="solid"/>
+        </a:ln>
+        <a:ln w="25400" cap="flat" cmpd="sng" algn="ctr">
+          <a:solidFill>
+            <a:schemeClr val="phClr"/>
+          </a:solidFill>
+          <a:prstDash val="solid"/>
+        </a:ln>
+        <a:ln w="38100" cap="flat" cmpd="sng" algn="ctr">
+          <a:solidFill>
+            <a:schemeClr val="phClr"/>
+          </a:solidFill>
+          <a:prstDash val="solid"/>
+        </a:ln>
+      </a:lnStyleLst>
+      <a:effectStyleLst>
+        <a:effectStyle>
+          <a:effectLst>
+            <a:outerShdw blurRad="40000" dist="20000" dir="5400000" rotWithShape="0">
+              <a:srgbClr val="000000">
+                <a:alpha val="38000"/>
+              </a:srgbClr>
+            </a:outerShdw>
+          </a:effectLst>
+        </a:effectStyle>
+        <a:effectStyle>
+          <a:effectLst>
+            <a:outerShdw blurRad="40000" dist="23000" dir="5400000" rotWithShape="0">
+              <a:srgbClr val="000000">
+                <a:alpha val="35000"/>
+              </a:srgbClr>
+            </a:outerShdw>
+          </a:effectLst>
+        </a:effectStyle>
+        <a:effectStyle>
+          <a:effectLst>
+            <a:outerShdw blurRad="40000" dist="23000" dir="5400000" rotWithShape="0">
+              <a:srgbClr val="000000">
+                <a:alpha val="35000"/>
+              </a:srgbClr>
+            </a:outerShdw>
+          </a:effectLst>
+          <a:scene3d>
+            <a:camera prst="orthographicFront">
+              <a:rot lat="0" lon="0" rev="0"/>
+            </a:camera>
+            <a:lightRig rig="threePt" dir="t">
+              <a:rot lat="0" lon="0" rev="1200000"/>
+            </a:lightRig>
+          </a:scene3d>
+          <a:sp3d>
+            <a:bevelT w="63500" h="25400"/>
+          </a:sp3d>
+        </a:effectStyle>
+      </a:effectStyleLst>
+      <a:bgFillStyleLst>
+        <a:solidFill>
+          <a:schemeClr val="phClr"/>
+        </a:solidFill>
+        <a:gradFill rotWithShape="1">
+          <a:gsLst>
+            <a:gs pos="0">
+              <a:schemeClr val="phClr">
+                <a:tint val="40000"/>
+                <a:satMod val="350000"/>
+              </a:schemeClr>
+            </a:gs>
+            <a:gs pos="40000">
+              <a:schemeClr val="phClr">
+                <a:tint val="45000"/>
+                <a:shade val="99000"/>
+                <a:satMod val="350000"/>
+              </a:schemeClr>
+            </a:gs>
+            <a:gs pos="100000">
+              <a:schemeClr val="phClr">
+                <a:shade val="20000"/>
+                <a:satMod val="255000"/>
+              </a:schemeClr>
+            </a:gs>
+          </a:gsLst>
+          <a:path path="circle">
+            <a:fillToRect l="50000" t="-80000" r="50000" b="180000"/>
+          </a:path>
+        </a:gradFill>
+        <a:gradFill rotWithShape="1">
+          <a:gsLst>
+            <a:gs pos="0">
+              <a:schemeClr val="phClr">
+                <a:tint val="80000"/>
+                <a:satMod val="300000"/>
+              </a:schemeClr>
+            </a:gs>
+            <a:gs pos="100000">
+              <a:schemeClr val="phClr">
+                <a:shade val="30000"/>
+                <a:satMod val="200000"/>
+              </a:schemeClr>
+            </a:gs>
+          </a:gsLst>
+          <a:path path="circle">
+            <a:fillToRect l="50000" t="50000" r="50000" b="50000"/>
+          </a:path>
+        </a:gradFill>
+      </a:bgFillStyleLst>
+    </a:fmtScheme>
+  </a:themeElements>
+</a:theme>
+</file>
+
+<file path=ppt/theme/theme2.xml><?xml version="1.0" encoding="utf-8"?>
 <a:theme xmlns:a="http://schemas.openxmlformats.org/drawingml/2006/main" xmlns:r="http://schemas.openxmlformats.org/officeDocument/2006/relationships" name="Simple Light">
   <a:themeElements>
     <a:clrScheme name="Simple Light">
@@ -10770,283 +12436,4 @@
     </a:fmtScheme>
   </a:themeElements>
 </a:theme>
-</file>
-
-<file path=ppt/theme/theme2.xml><?xml version="1.0" encoding="utf-8"?>
-<a:theme xmlns:a="http://schemas.openxmlformats.org/drawingml/2006/main" xmlns:r="http://schemas.openxmlformats.org/officeDocument/2006/relationships">
-  <a:themeElements>
-    <a:clrScheme name="Default">
-      <a:dk1>
-        <a:srgbClr val="000000"/>
-      </a:dk1>
-      <a:lt1>
-        <a:srgbClr val="FFFFFF"/>
-      </a:lt1>
-      <a:dk2>
-        <a:srgbClr val="158158"/>
-      </a:dk2>
-      <a:lt2>
-        <a:srgbClr val="F3F3F3"/>
-      </a:lt2>
-      <a:accent1>
-        <a:srgbClr val="058DC7"/>
-      </a:accent1>
-      <a:accent2>
-        <a:srgbClr val="50B432"/>
-      </a:accent2>
-      <a:accent3>
-        <a:srgbClr val="ED561B"/>
-      </a:accent3>
-      <a:accent4>
-        <a:srgbClr val="EDEF00"/>
-      </a:accent4>
-      <a:accent5>
-        <a:srgbClr val="24CBE5"/>
-      </a:accent5>
-      <a:accent6>
-        <a:srgbClr val="64E572"/>
-      </a:accent6>
-      <a:hlink>
-        <a:srgbClr val="2200CC"/>
-      </a:hlink>
-      <a:folHlink>
-        <a:srgbClr val="551A8B"/>
-      </a:folHlink>
-    </a:clrScheme>
-    <a:fontScheme name="Office">
-      <a:majorFont>
-        <a:latin typeface="Arial"/>
-        <a:ea typeface=""/>
-        <a:cs typeface=""/>
-        <a:font script="Jpan" typeface="ＭＳ Ｐゴシック"/>
-        <a:font script="Hang" typeface="맑은 고딕"/>
-        <a:font script="Hans" typeface="宋体"/>
-        <a:font script="Hant" typeface="新細明體"/>
-        <a:font script="Arab" typeface="Times New Roman"/>
-        <a:font script="Hebr" typeface="Times New Roman"/>
-        <a:font script="Thai" typeface="Angsana New"/>
-        <a:font script="Ethi" typeface="Nyala"/>
-        <a:font script="Beng" typeface="Vrinda"/>
-        <a:font script="Gujr" typeface="Shruti"/>
-        <a:font script="Khmr" typeface="MoolBoran"/>
-        <a:font script="Knda" typeface="Tunga"/>
-        <a:font script="Guru" typeface="Raavi"/>
-        <a:font script="Cans" typeface="Euphemia"/>
-        <a:font script="Cher" typeface="Plantagenet Cherokee"/>
-        <a:font script="Yiii" typeface="Microsoft Yi Baiti"/>
-        <a:font script="Tibt" typeface="Microsoft Himalaya"/>
-        <a:font script="Thaa" typeface="MV Boli"/>
-        <a:font script="Deva" typeface="Mangal"/>
-        <a:font script="Telu" typeface="Gautami"/>
-        <a:font script="Taml" typeface="Latha"/>
-        <a:font script="Syrc" typeface="Estrangelo Edessa"/>
-        <a:font script="Orya" typeface="Kalinga"/>
-        <a:font script="Mlym" typeface="Kartika"/>
-        <a:font script="Laoo" typeface="DokChampa"/>
-        <a:font script="Sinh" typeface="Iskoola Pota"/>
-        <a:font script="Mong" typeface="Mongolian Baiti"/>
-        <a:font script="Viet" typeface="Times New Roman"/>
-        <a:font script="Uigh" typeface="Microsoft Uighur"/>
-        <a:font script="Geor" typeface="Sylfaen"/>
-      </a:majorFont>
-      <a:minorFont>
-        <a:latin typeface="Arial"/>
-        <a:ea typeface=""/>
-        <a:cs typeface=""/>
-        <a:font script="Jpan" typeface="ＭＳ Ｐゴシック"/>
-        <a:font script="Hang" typeface="맑은 고딕"/>
-        <a:font script="Hans" typeface="宋体"/>
-        <a:font script="Hant" typeface="新細明體"/>
-        <a:font script="Arab" typeface="Arial"/>
-        <a:font script="Hebr" typeface="Arial"/>
-        <a:font script="Thai" typeface="Cordia New"/>
-        <a:font script="Ethi" typeface="Nyala"/>
-        <a:font script="Beng" typeface="Vrinda"/>
-        <a:font script="Gujr" typeface="Shruti"/>
-        <a:font script="Khmr" typeface="DaunPenh"/>
-        <a:font script="Knda" typeface="Tunga"/>
-        <a:font script="Guru" typeface="Raavi"/>
-        <a:font script="Cans" typeface="Euphemia"/>
-        <a:font script="Cher" typeface="Plantagenet Cherokee"/>
-        <a:font script="Yiii" typeface="Microsoft Yi Baiti"/>
-        <a:font script="Tibt" typeface="Microsoft Himalaya"/>
-        <a:font script="Thaa" typeface="MV Boli"/>
-        <a:font script="Deva" typeface="Mangal"/>
-        <a:font script="Telu" typeface="Gautami"/>
-        <a:font script="Taml" typeface="Latha"/>
-        <a:font script="Syrc" typeface="Estrangelo Edessa"/>
-        <a:font script="Orya" typeface="Kalinga"/>
-        <a:font script="Mlym" typeface="Kartika"/>
-        <a:font script="Laoo" typeface="DokChampa"/>
-        <a:font script="Sinh" typeface="Iskoola Pota"/>
-        <a:font script="Mong" typeface="Mongolian Baiti"/>
-        <a:font script="Viet" typeface="Arial"/>
-        <a:font script="Uigh" typeface="Microsoft Uighur"/>
-        <a:font script="Geor" typeface="Sylfaen"/>
-      </a:minorFont>
-    </a:fontScheme>
-    <a:fmtScheme name="Office">
-      <a:fillStyleLst>
-        <a:solidFill>
-          <a:schemeClr val="phClr"/>
-        </a:solidFill>
-        <a:gradFill rotWithShape="1">
-          <a:gsLst>
-            <a:gs pos="0">
-              <a:schemeClr val="phClr">
-                <a:tint val="50000"/>
-                <a:satMod val="300000"/>
-              </a:schemeClr>
-            </a:gs>
-            <a:gs pos="35000">
-              <a:schemeClr val="phClr">
-                <a:tint val="37000"/>
-                <a:satMod val="300000"/>
-              </a:schemeClr>
-            </a:gs>
-            <a:gs pos="100000">
-              <a:schemeClr val="phClr">
-                <a:tint val="15000"/>
-                <a:satMod val="350000"/>
-              </a:schemeClr>
-            </a:gs>
-          </a:gsLst>
-          <a:lin ang="16200000" scaled="1"/>
-        </a:gradFill>
-        <a:gradFill rotWithShape="1">
-          <a:gsLst>
-            <a:gs pos="0">
-              <a:schemeClr val="phClr">
-                <a:tint val="100000"/>
-                <a:shade val="100000"/>
-                <a:satMod val="130000"/>
-              </a:schemeClr>
-            </a:gs>
-            <a:gs pos="100000">
-              <a:schemeClr val="phClr">
-                <a:tint val="50000"/>
-                <a:shade val="100000"/>
-                <a:satMod val="350000"/>
-              </a:schemeClr>
-            </a:gs>
-          </a:gsLst>
-          <a:lin ang="16200000" scaled="0"/>
-        </a:gradFill>
-      </a:fillStyleLst>
-      <a:lnStyleLst>
-        <a:ln w="9525" cap="flat" cmpd="sng" algn="ctr">
-          <a:solidFill>
-            <a:schemeClr val="phClr">
-              <a:shade val="95000"/>
-              <a:satMod val="105000"/>
-            </a:schemeClr>
-          </a:solidFill>
-          <a:prstDash val="solid"/>
-        </a:ln>
-        <a:ln w="25400" cap="flat" cmpd="sng" algn="ctr">
-          <a:solidFill>
-            <a:schemeClr val="phClr"/>
-          </a:solidFill>
-          <a:prstDash val="solid"/>
-        </a:ln>
-        <a:ln w="38100" cap="flat" cmpd="sng" algn="ctr">
-          <a:solidFill>
-            <a:schemeClr val="phClr"/>
-          </a:solidFill>
-          <a:prstDash val="solid"/>
-        </a:ln>
-      </a:lnStyleLst>
-      <a:effectStyleLst>
-        <a:effectStyle>
-          <a:effectLst>
-            <a:outerShdw blurRad="40000" dist="20000" dir="5400000" rotWithShape="0">
-              <a:srgbClr val="000000">
-                <a:alpha val="38000"/>
-              </a:srgbClr>
-            </a:outerShdw>
-          </a:effectLst>
-        </a:effectStyle>
-        <a:effectStyle>
-          <a:effectLst>
-            <a:outerShdw blurRad="40000" dist="23000" dir="5400000" rotWithShape="0">
-              <a:srgbClr val="000000">
-                <a:alpha val="35000"/>
-              </a:srgbClr>
-            </a:outerShdw>
-          </a:effectLst>
-        </a:effectStyle>
-        <a:effectStyle>
-          <a:effectLst>
-            <a:outerShdw blurRad="40000" dist="23000" dir="5400000" rotWithShape="0">
-              <a:srgbClr val="000000">
-                <a:alpha val="35000"/>
-              </a:srgbClr>
-            </a:outerShdw>
-          </a:effectLst>
-          <a:scene3d>
-            <a:camera prst="orthographicFront">
-              <a:rot lat="0" lon="0" rev="0"/>
-            </a:camera>
-            <a:lightRig rig="threePt" dir="t">
-              <a:rot lat="0" lon="0" rev="1200000"/>
-            </a:lightRig>
-          </a:scene3d>
-          <a:sp3d>
-            <a:bevelT w="63500" h="25400"/>
-          </a:sp3d>
-        </a:effectStyle>
-      </a:effectStyleLst>
-      <a:bgFillStyleLst>
-        <a:solidFill>
-          <a:schemeClr val="phClr"/>
-        </a:solidFill>
-        <a:gradFill rotWithShape="1">
-          <a:gsLst>
-            <a:gs pos="0">
-              <a:schemeClr val="phClr">
-                <a:tint val="40000"/>
-                <a:satMod val="350000"/>
-              </a:schemeClr>
-            </a:gs>
-            <a:gs pos="40000">
-              <a:schemeClr val="phClr">
-                <a:tint val="45000"/>
-                <a:shade val="99000"/>
-                <a:satMod val="350000"/>
-              </a:schemeClr>
-            </a:gs>
-            <a:gs pos="100000">
-              <a:schemeClr val="phClr">
-                <a:shade val="20000"/>
-                <a:satMod val="255000"/>
-              </a:schemeClr>
-            </a:gs>
-          </a:gsLst>
-          <a:path path="circle">
-            <a:fillToRect l="50000" t="-80000" r="50000" b="180000"/>
-          </a:path>
-        </a:gradFill>
-        <a:gradFill rotWithShape="1">
-          <a:gsLst>
-            <a:gs pos="0">
-              <a:schemeClr val="phClr">
-                <a:tint val="80000"/>
-                <a:satMod val="300000"/>
-              </a:schemeClr>
-            </a:gs>
-            <a:gs pos="100000">
-              <a:schemeClr val="phClr">
-                <a:shade val="30000"/>
-                <a:satMod val="200000"/>
-              </a:schemeClr>
-            </a:gs>
-          </a:gsLst>
-          <a:path path="circle">
-            <a:fillToRect l="50000" t="50000" r="50000" b="50000"/>
-          </a:path>
-        </a:gradFill>
-      </a:bgFillStyleLst>
-    </a:fmtScheme>
-  </a:themeElements>
-</a:theme>
 </file>
</xml_diff>